<commit_message>
First presentation draft modified
</commit_message>
<xml_diff>
--- a/kojak_work/Metis Kojak.pptx
+++ b/kojak_work/Metis Kojak.pptx
@@ -5,14 +5,15 @@
     <p:sldMasterId id="2147483648" r:id="rId1"/>
   </p:sldMasterIdLst>
   <p:notesMasterIdLst>
-    <p:notesMasterId r:id="rId7"/>
+    <p:notesMasterId r:id="rId8"/>
   </p:notesMasterIdLst>
   <p:sldIdLst>
     <p:sldId id="256" r:id="rId2"/>
     <p:sldId id="257" r:id="rId3"/>
     <p:sldId id="258" r:id="rId4"/>
     <p:sldId id="268" r:id="rId5"/>
-    <p:sldId id="259" r:id="rId6"/>
+    <p:sldId id="269" r:id="rId6"/>
+    <p:sldId id="259" r:id="rId7"/>
   </p:sldIdLst>
   <p:sldSz cx="9144000" cy="6858000" type="screen4x3"/>
   <p:notesSz cx="6858000" cy="9144000"/>
@@ -539,6 +540,90 @@
     <p:extLst>
       <p:ext uri="{BB962C8B-B14F-4D97-AF65-F5344CB8AC3E}">
         <p14:creationId xmlns:p14="http://schemas.microsoft.com/office/powerpoint/2010/main" val="956989759"/>
+      </p:ext>
+    </p:extLst>
+  </p:cSld>
+  <p:clrMapOvr>
+    <a:masterClrMapping/>
+  </p:clrMapOvr>
+</p:notes>
+</file>
+
+<file path=ppt/notesSlides/notesSlide2.xml><?xml version="1.0" encoding="utf-8"?>
+<p:notes xmlns:a="http://schemas.openxmlformats.org/drawingml/2006/main" xmlns:r="http://schemas.openxmlformats.org/officeDocument/2006/relationships" xmlns:p="http://schemas.openxmlformats.org/presentationml/2006/main">
+  <p:cSld>
+    <p:spTree>
+      <p:nvGrpSpPr>
+        <p:cNvPr id="1" name=""/>
+        <p:cNvGrpSpPr/>
+        <p:nvPr/>
+      </p:nvGrpSpPr>
+      <p:grpSpPr>
+        <a:xfrm>
+          <a:off x="0" y="0"/>
+          <a:ext cx="0" cy="0"/>
+          <a:chOff x="0" y="0"/>
+          <a:chExt cx="0" cy="0"/>
+        </a:xfrm>
+      </p:grpSpPr>
+      <p:sp>
+        <p:nvSpPr>
+          <p:cNvPr id="2" name="Segnaposto immagine diapositiva 1"/>
+          <p:cNvSpPr>
+            <a:spLocks noGrp="1" noRot="1" noChangeAspect="1"/>
+          </p:cNvSpPr>
+          <p:nvPr>
+            <p:ph type="sldImg"/>
+          </p:nvPr>
+        </p:nvSpPr>
+        <p:spPr/>
+      </p:sp>
+      <p:sp>
+        <p:nvSpPr>
+          <p:cNvPr id="3" name="Segnaposto note 2"/>
+          <p:cNvSpPr>
+            <a:spLocks noGrp="1"/>
+          </p:cNvSpPr>
+          <p:nvPr>
+            <p:ph type="body" idx="1"/>
+          </p:nvPr>
+        </p:nvSpPr>
+        <p:spPr/>
+        <p:txBody>
+          <a:bodyPr/>
+          <a:lstStyle/>
+          <a:p>
+            <a:endParaRPr lang="it-IT" dirty="0"/>
+          </a:p>
+        </p:txBody>
+      </p:sp>
+      <p:sp>
+        <p:nvSpPr>
+          <p:cNvPr id="4" name="Segnaposto numero diapositiva 3"/>
+          <p:cNvSpPr>
+            <a:spLocks noGrp="1"/>
+          </p:cNvSpPr>
+          <p:nvPr>
+            <p:ph type="sldNum" sz="quarter" idx="10"/>
+          </p:nvPr>
+        </p:nvSpPr>
+        <p:spPr/>
+        <p:txBody>
+          <a:bodyPr/>
+          <a:lstStyle/>
+          <a:p>
+            <a:fld id="{1242F90E-5F4C-DF4D-8DD5-862EFF08E26B}" type="slidenum">
+              <a:rPr lang="it-IT" smtClean="0"/>
+              <a:t>6</a:t>
+            </a:fld>
+            <a:endParaRPr lang="it-IT"/>
+          </a:p>
+        </p:txBody>
+      </p:sp>
+    </p:spTree>
+    <p:extLst>
+      <p:ext uri="{BB962C8B-B14F-4D97-AF65-F5344CB8AC3E}">
+        <p14:creationId xmlns:p14="http://schemas.microsoft.com/office/powerpoint/2010/main" val="718291008"/>
       </p:ext>
     </p:extLst>
   </p:cSld>
@@ -3547,7 +3632,7 @@
         <p:spPr>
           <a:xfrm>
             <a:off x="457200" y="416789"/>
-            <a:ext cx="8229600" cy="1143000"/>
+            <a:ext cx="8123035" cy="1113323"/>
           </a:xfrm>
           <a:prstGeom prst="rect">
             <a:avLst/>
@@ -3555,7 +3640,7 @@
         </p:spPr>
         <p:txBody>
           <a:bodyPr vert="horz" lIns="91440" tIns="45720" rIns="91440" bIns="45720" rtlCol="0" anchor="ctr">
-            <a:normAutofit fontScale="92500"/>
+            <a:normAutofit fontScale="85000" lnSpcReduction="20000"/>
           </a:bodyPr>
           <a:lstStyle>
             <a:lvl1pPr algn="ctr" defTabSz="457200" rtl="0" eaLnBrk="1" latinLnBrk="0" hangingPunct="1">
@@ -3639,6 +3724,22 @@
             <a:r>
               <a:rPr lang="it-IT" sz="3200" dirty="0" err="1" smtClean="0"/>
               <a:t>options</a:t>
+            </a:r>
+            <a:r>
+              <a:rPr lang="it-IT" sz="3200" dirty="0" smtClean="0"/>
+              <a:t> on </a:t>
+            </a:r>
+            <a:r>
+              <a:rPr lang="it-IT" sz="3200" dirty="0" err="1" smtClean="0"/>
+              <a:t>financial</a:t>
+            </a:r>
+            <a:r>
+              <a:rPr lang="it-IT" sz="3200" dirty="0" smtClean="0"/>
+              <a:t> </a:t>
+            </a:r>
+            <a:r>
+              <a:rPr lang="it-IT" sz="3200" dirty="0" err="1" smtClean="0"/>
+              <a:t>markets</a:t>
             </a:r>
             <a:r>
               <a:rPr lang="it-IT" sz="3200" dirty="0" smtClean="0"/>
@@ -3670,7 +3771,7 @@
         </p:blipFill>
         <p:spPr>
           <a:xfrm>
-            <a:off x="1244600" y="2114349"/>
+            <a:off x="1254600" y="2194357"/>
             <a:ext cx="6645499" cy="4082603"/>
           </a:xfrm>
           <a:prstGeom prst="rect">
@@ -3902,7 +4003,7 @@
             </a:r>
             <a:r>
               <a:rPr lang="it-IT" sz="2000" dirty="0" err="1" smtClean="0"/>
-              <a:t>month</a:t>
+              <a:t>expiration</a:t>
             </a:r>
             <a:r>
               <a:rPr lang="it-IT" sz="2000" dirty="0" smtClean="0"/>
@@ -4081,6 +4182,14 @@
             <a:r>
               <a:rPr lang="it-IT" sz="2000" dirty="0" smtClean="0"/>
               <a:t>with data </a:t>
+            </a:r>
+            <a:r>
+              <a:rPr lang="it-IT" sz="2000" dirty="0" err="1" smtClean="0"/>
+              <a:t>all</a:t>
+            </a:r>
+            <a:r>
+              <a:rPr lang="it-IT" sz="2000" dirty="0" smtClean="0"/>
+              <a:t> </a:t>
             </a:r>
             <a:r>
               <a:rPr lang="it-IT" sz="2000" dirty="0" err="1" smtClean="0"/>
@@ -4183,263 +4292,286 @@
         </p:nvSpPr>
         <p:spPr>
           <a:xfrm>
-            <a:off x="860575" y="2288861"/>
-            <a:ext cx="7489654" cy="3671637"/>
+            <a:off x="1080581" y="2098847"/>
+            <a:ext cx="6409624" cy="3671637"/>
           </a:xfrm>
         </p:spPr>
         <p:txBody>
           <a:bodyPr>
-            <a:normAutofit/>
+            <a:normAutofit fontScale="92500" lnSpcReduction="20000"/>
           </a:bodyPr>
           <a:lstStyle/>
           <a:p>
+            <a:pPr marL="0" indent="0" algn="ctr">
+              <a:buNone/>
+            </a:pPr>
+            <a:r>
+              <a:rPr lang="it-IT" sz="2400" dirty="0" smtClean="0"/>
+              <a:t>4 </a:t>
+            </a:r>
+            <a:r>
+              <a:rPr lang="it-IT" sz="2400" dirty="0" err="1" smtClean="0"/>
+              <a:t>independent</a:t>
+            </a:r>
+            <a:r>
+              <a:rPr lang="it-IT" sz="2400" dirty="0" smtClean="0"/>
+              <a:t> </a:t>
+            </a:r>
+            <a:r>
+              <a:rPr lang="it-IT" sz="2400" dirty="0" err="1" smtClean="0"/>
+              <a:t>regression</a:t>
+            </a:r>
+            <a:r>
+              <a:rPr lang="it-IT" sz="2400" dirty="0" smtClean="0"/>
+              <a:t> </a:t>
+            </a:r>
+            <a:r>
+              <a:rPr lang="it-IT" sz="2400" dirty="0" err="1" smtClean="0"/>
+              <a:t>models</a:t>
+            </a:r>
+            <a:r>
+              <a:rPr lang="it-IT" sz="2400" dirty="0" smtClean="0"/>
+              <a:t>:</a:t>
+            </a:r>
+          </a:p>
+          <a:p>
             <a:pPr marL="0" indent="0" algn="just">
               <a:buNone/>
             </a:pPr>
-            <a:r>
-              <a:rPr lang="it-IT" sz="2000" dirty="0" smtClean="0"/>
-              <a:t>4 </a:t>
-            </a:r>
-            <a:r>
-              <a:rPr lang="it-IT" sz="2000" dirty="0" err="1" smtClean="0"/>
-              <a:t>concurrent</a:t>
-            </a:r>
-            <a:r>
-              <a:rPr lang="it-IT" sz="2000" dirty="0"/>
-              <a:t> </a:t>
-            </a:r>
-            <a:r>
-              <a:rPr lang="it-IT" sz="2000" dirty="0" err="1" smtClean="0"/>
-              <a:t>regression</a:t>
-            </a:r>
-            <a:r>
-              <a:rPr lang="it-IT" sz="2000" dirty="0" smtClean="0"/>
-              <a:t> </a:t>
-            </a:r>
-            <a:r>
-              <a:rPr lang="it-IT" sz="2000" dirty="0" err="1" smtClean="0"/>
-              <a:t>models</a:t>
-            </a:r>
-            <a:r>
-              <a:rPr lang="it-IT" sz="2000" dirty="0" smtClean="0"/>
-              <a:t>:</a:t>
-            </a:r>
+            <a:endParaRPr lang="it-IT" sz="2400" dirty="0" smtClean="0"/>
           </a:p>
           <a:p>
             <a:pPr marL="0" indent="0" algn="just">
               <a:buNone/>
             </a:pPr>
-            <a:endParaRPr lang="it-IT" sz="2000" dirty="0" smtClean="0"/>
+            <a:r>
+              <a:rPr lang="it-IT" sz="2400" dirty="0" err="1" smtClean="0"/>
+              <a:t>Guess</a:t>
+            </a:r>
+            <a:r>
+              <a:rPr lang="it-IT" sz="2400" dirty="0" smtClean="0"/>
+              <a:t> the </a:t>
+            </a:r>
+            <a:r>
+              <a:rPr lang="it-IT" sz="2400" dirty="0" err="1" smtClean="0"/>
+              <a:t>price</a:t>
+            </a:r>
+            <a:r>
+              <a:rPr lang="it-IT" sz="2400" dirty="0" smtClean="0"/>
+              <a:t> </a:t>
+            </a:r>
+            <a:r>
+              <a:rPr lang="it-IT" sz="2400" dirty="0" err="1" smtClean="0"/>
+              <a:t>upper</a:t>
+            </a:r>
+            <a:r>
+              <a:rPr lang="it-IT" sz="2400" dirty="0" smtClean="0"/>
+              <a:t> </a:t>
+            </a:r>
+            <a:r>
+              <a:rPr lang="it-IT" sz="2400" dirty="0" err="1" smtClean="0"/>
+              <a:t>limit</a:t>
+            </a:r>
+            <a:endParaRPr lang="it-IT" sz="2400" dirty="0" smtClean="0"/>
           </a:p>
           <a:p>
             <a:pPr marL="0" indent="0" algn="just">
               <a:buNone/>
             </a:pPr>
             <a:r>
-              <a:rPr lang="it-IT" sz="2000" dirty="0" err="1" smtClean="0"/>
+              <a:rPr lang="it-IT" sz="2400" dirty="0" err="1" smtClean="0"/>
               <a:t>Guess</a:t>
             </a:r>
             <a:r>
-              <a:rPr lang="it-IT" sz="2000" dirty="0" smtClean="0"/>
+              <a:rPr lang="it-IT" sz="2400" dirty="0" smtClean="0"/>
               <a:t> the </a:t>
             </a:r>
             <a:r>
-              <a:rPr lang="it-IT" sz="2000" dirty="0" err="1" smtClean="0"/>
+              <a:rPr lang="it-IT" sz="2400" dirty="0" err="1" smtClean="0"/>
               <a:t>price</a:t>
             </a:r>
             <a:r>
-              <a:rPr lang="it-IT" sz="2000" dirty="0" smtClean="0"/>
-              <a:t> </a:t>
-            </a:r>
-            <a:r>
-              <a:rPr lang="it-IT" sz="2000" dirty="0" err="1" smtClean="0"/>
-              <a:t>upper</a:t>
-            </a:r>
-            <a:r>
-              <a:rPr lang="it-IT" sz="2000" dirty="0" smtClean="0"/>
-              <a:t> </a:t>
-            </a:r>
-            <a:r>
-              <a:rPr lang="it-IT" sz="2000" dirty="0" err="1" smtClean="0"/>
+              <a:rPr lang="it-IT" sz="2400" dirty="0" smtClean="0"/>
+              <a:t> </a:t>
+            </a:r>
+            <a:r>
+              <a:rPr lang="it-IT" sz="2400" dirty="0" err="1" smtClean="0"/>
+              <a:t>lower</a:t>
+            </a:r>
+            <a:r>
+              <a:rPr lang="it-IT" sz="2400" dirty="0" smtClean="0"/>
+              <a:t> </a:t>
+            </a:r>
+            <a:r>
+              <a:rPr lang="it-IT" sz="2400" dirty="0" err="1" smtClean="0"/>
               <a:t>limit</a:t>
             </a:r>
-            <a:endParaRPr lang="it-IT" sz="2000" dirty="0" smtClean="0"/>
+            <a:endParaRPr lang="it-IT" sz="2400" dirty="0" smtClean="0"/>
           </a:p>
           <a:p>
             <a:pPr marL="0" indent="0" algn="just">
               <a:buNone/>
             </a:pPr>
             <a:r>
-              <a:rPr lang="it-IT" sz="2000" dirty="0" err="1" smtClean="0"/>
+              <a:rPr lang="it-IT" sz="2400" dirty="0" err="1" smtClean="0"/>
               <a:t>Guess</a:t>
             </a:r>
             <a:r>
-              <a:rPr lang="it-IT" sz="2000" dirty="0" smtClean="0"/>
+              <a:rPr lang="it-IT" sz="2400" dirty="0" smtClean="0"/>
               <a:t> the </a:t>
             </a:r>
             <a:r>
-              <a:rPr lang="it-IT" sz="2000" dirty="0" err="1" smtClean="0"/>
+              <a:rPr lang="it-IT" sz="2400" dirty="0" err="1" smtClean="0"/>
+              <a:t>extent</a:t>
+            </a:r>
+            <a:r>
+              <a:rPr lang="it-IT" sz="2400" dirty="0" smtClean="0"/>
+              <a:t> of the </a:t>
+            </a:r>
+            <a:r>
+              <a:rPr lang="it-IT" sz="2400" dirty="0" err="1" smtClean="0"/>
               <a:t>price</a:t>
             </a:r>
             <a:r>
-              <a:rPr lang="it-IT" sz="2000" dirty="0" smtClean="0"/>
-              <a:t> </a:t>
-            </a:r>
-            <a:r>
-              <a:rPr lang="it-IT" sz="2000" dirty="0" err="1" smtClean="0"/>
-              <a:t>lower</a:t>
-            </a:r>
-            <a:r>
-              <a:rPr lang="it-IT" sz="2000" dirty="0" smtClean="0"/>
-              <a:t> </a:t>
-            </a:r>
-            <a:r>
-              <a:rPr lang="it-IT" sz="2000" dirty="0" err="1" smtClean="0"/>
-              <a:t>limit</a:t>
-            </a:r>
-            <a:endParaRPr lang="it-IT" sz="2000" dirty="0" smtClean="0"/>
+              <a:rPr lang="it-IT" sz="2400" dirty="0" smtClean="0"/>
+              <a:t> </a:t>
+            </a:r>
+            <a:r>
+              <a:rPr lang="it-IT" sz="2400" dirty="0" err="1" smtClean="0"/>
+              <a:t>movement</a:t>
+            </a:r>
+            <a:endParaRPr lang="it-IT" sz="2400" dirty="0" smtClean="0"/>
           </a:p>
           <a:p>
             <a:pPr marL="0" indent="0" algn="just">
               <a:buNone/>
             </a:pPr>
             <a:r>
-              <a:rPr lang="it-IT" sz="2000" dirty="0" err="1" smtClean="0"/>
+              <a:rPr lang="it-IT" sz="2400" dirty="0" err="1" smtClean="0"/>
               <a:t>Guess</a:t>
             </a:r>
             <a:r>
-              <a:rPr lang="it-IT" sz="2000" dirty="0" smtClean="0"/>
+              <a:rPr lang="it-IT" sz="2400" dirty="0" smtClean="0"/>
               <a:t> the </a:t>
             </a:r>
             <a:r>
-              <a:rPr lang="it-IT" sz="2000" dirty="0" err="1" smtClean="0"/>
-              <a:t>extent</a:t>
-            </a:r>
-            <a:r>
-              <a:rPr lang="it-IT" sz="2000" dirty="0" smtClean="0"/>
+              <a:rPr lang="it-IT" sz="2400" dirty="0" err="1" smtClean="0"/>
+              <a:t>central</a:t>
+            </a:r>
+            <a:r>
+              <a:rPr lang="it-IT" sz="2400" dirty="0" smtClean="0"/>
+              <a:t> </a:t>
+            </a:r>
+            <a:r>
+              <a:rPr lang="it-IT" sz="2400" dirty="0" err="1" smtClean="0"/>
+              <a:t>point</a:t>
+            </a:r>
+            <a:r>
+              <a:rPr lang="it-IT" sz="2400" dirty="0" smtClean="0"/>
               <a:t> of the </a:t>
             </a:r>
             <a:r>
-              <a:rPr lang="it-IT" sz="2000" dirty="0" err="1" smtClean="0"/>
+              <a:rPr lang="it-IT" sz="2400" dirty="0" err="1" smtClean="0"/>
               <a:t>price</a:t>
             </a:r>
             <a:r>
-              <a:rPr lang="it-IT" sz="2000" dirty="0" smtClean="0"/>
-              <a:t> </a:t>
-            </a:r>
-            <a:r>
-              <a:rPr lang="it-IT" sz="2000" dirty="0" err="1" smtClean="0"/>
+              <a:rPr lang="it-IT" sz="2400" dirty="0" smtClean="0"/>
+              <a:t> </a:t>
+            </a:r>
+            <a:r>
+              <a:rPr lang="it-IT" sz="2400" dirty="0" err="1" smtClean="0"/>
               <a:t>movement</a:t>
             </a:r>
-            <a:endParaRPr lang="it-IT" sz="2000" dirty="0" smtClean="0"/>
+            <a:endParaRPr lang="it-IT" sz="2400" dirty="0" smtClean="0"/>
           </a:p>
           <a:p>
             <a:pPr marL="0" indent="0" algn="just">
               <a:buNone/>
             </a:pPr>
-            <a:r>
-              <a:rPr lang="it-IT" sz="2000" dirty="0" err="1" smtClean="0"/>
-              <a:t>Guess</a:t>
-            </a:r>
-            <a:r>
-              <a:rPr lang="it-IT" sz="2000" dirty="0" smtClean="0"/>
-              <a:t> the </a:t>
-            </a:r>
-            <a:r>
-              <a:rPr lang="it-IT" sz="2000" dirty="0" err="1" smtClean="0"/>
-              <a:t>central</a:t>
-            </a:r>
-            <a:r>
-              <a:rPr lang="it-IT" sz="2000" dirty="0" smtClean="0"/>
-              <a:t> </a:t>
-            </a:r>
-            <a:r>
-              <a:rPr lang="it-IT" sz="2000" dirty="0" err="1" smtClean="0"/>
-              <a:t>point</a:t>
-            </a:r>
-            <a:r>
-              <a:rPr lang="it-IT" sz="2000" dirty="0" smtClean="0"/>
-              <a:t> of the </a:t>
-            </a:r>
-            <a:r>
-              <a:rPr lang="it-IT" sz="2000" dirty="0" err="1" smtClean="0"/>
-              <a:t>price</a:t>
-            </a:r>
-            <a:r>
-              <a:rPr lang="it-IT" sz="2000" dirty="0" smtClean="0"/>
-              <a:t> </a:t>
-            </a:r>
-            <a:r>
-              <a:rPr lang="it-IT" sz="2000" dirty="0" err="1" smtClean="0"/>
-              <a:t>movement</a:t>
-            </a:r>
-            <a:endParaRPr lang="it-IT" sz="2000" dirty="0" smtClean="0"/>
+            <a:endParaRPr lang="it-IT" sz="2400" dirty="0"/>
           </a:p>
           <a:p>
             <a:pPr marL="0" indent="0" algn="just">
               <a:buNone/>
             </a:pPr>
-            <a:endParaRPr lang="it-IT" sz="2000" dirty="0"/>
+            <a:r>
+              <a:rPr lang="it-IT" sz="2400" dirty="0" err="1" smtClean="0"/>
+              <a:t>Any</a:t>
+            </a:r>
+            <a:r>
+              <a:rPr lang="it-IT" sz="2400" dirty="0" smtClean="0"/>
+              <a:t> </a:t>
+            </a:r>
+            <a:r>
+              <a:rPr lang="it-IT" sz="2400" dirty="0" err="1" smtClean="0"/>
+              <a:t>intersection</a:t>
+            </a:r>
+            <a:r>
+              <a:rPr lang="it-IT" sz="2400" dirty="0" smtClean="0"/>
+              <a:t> of </a:t>
+            </a:r>
+            <a:r>
+              <a:rPr lang="it-IT" sz="2400" dirty="0" err="1" smtClean="0"/>
+              <a:t>these</a:t>
+            </a:r>
+            <a:r>
+              <a:rPr lang="it-IT" sz="2400" dirty="0" smtClean="0"/>
+              <a:t> </a:t>
+            </a:r>
+            <a:r>
+              <a:rPr lang="it-IT" sz="2400" dirty="0" err="1" smtClean="0"/>
+              <a:t>two</a:t>
+            </a:r>
+            <a:r>
+              <a:rPr lang="it-IT" sz="2400" dirty="0" smtClean="0"/>
+              <a:t> </a:t>
+            </a:r>
+            <a:r>
+              <a:rPr lang="it-IT" sz="2400" dirty="0" err="1" smtClean="0"/>
+              <a:t>ranges</a:t>
+            </a:r>
+            <a:r>
+              <a:rPr lang="it-IT" sz="2400" dirty="0" smtClean="0"/>
+              <a:t> </a:t>
+            </a:r>
+            <a:r>
+              <a:rPr lang="it-IT" sz="2400" dirty="0" err="1" smtClean="0"/>
+              <a:t>is</a:t>
+            </a:r>
+            <a:r>
+              <a:rPr lang="it-IT" sz="2400" dirty="0" smtClean="0"/>
+              <a:t> </a:t>
+            </a:r>
+            <a:r>
+              <a:rPr lang="it-IT" sz="2400" dirty="0" err="1" smtClean="0"/>
+              <a:t>our</a:t>
+            </a:r>
+            <a:r>
+              <a:rPr lang="it-IT" sz="2400" dirty="0" smtClean="0"/>
+              <a:t> target</a:t>
+            </a:r>
           </a:p>
           <a:p>
             <a:pPr marL="0" indent="0" algn="just">
               <a:buNone/>
             </a:pPr>
-            <a:r>
-              <a:rPr lang="it-IT" sz="2000" dirty="0" err="1" smtClean="0"/>
-              <a:t>Any</a:t>
-            </a:r>
-            <a:r>
-              <a:rPr lang="it-IT" sz="2000" dirty="0" smtClean="0"/>
-              <a:t> </a:t>
-            </a:r>
-            <a:r>
-              <a:rPr lang="it-IT" sz="2000" dirty="0" err="1" smtClean="0"/>
-              <a:t>intersection</a:t>
-            </a:r>
-            <a:r>
-              <a:rPr lang="it-IT" sz="2000" dirty="0" smtClean="0"/>
-              <a:t> of </a:t>
-            </a:r>
-            <a:r>
-              <a:rPr lang="it-IT" sz="2000" dirty="0" err="1" smtClean="0"/>
-              <a:t>these</a:t>
-            </a:r>
-            <a:r>
-              <a:rPr lang="it-IT" sz="2000" dirty="0" smtClean="0"/>
-              <a:t> </a:t>
-            </a:r>
-            <a:r>
-              <a:rPr lang="it-IT" sz="2000" dirty="0" err="1" smtClean="0"/>
-              <a:t>two</a:t>
-            </a:r>
-            <a:r>
-              <a:rPr lang="it-IT" sz="2000" dirty="0" smtClean="0"/>
-              <a:t> </a:t>
-            </a:r>
-            <a:r>
-              <a:rPr lang="it-IT" sz="2000" dirty="0" err="1" smtClean="0"/>
-              <a:t>ranges</a:t>
-            </a:r>
-            <a:r>
-              <a:rPr lang="it-IT" sz="2000" dirty="0" smtClean="0"/>
-              <a:t> </a:t>
-            </a:r>
-            <a:r>
-              <a:rPr lang="it-IT" sz="2000" dirty="0" err="1" smtClean="0"/>
-              <a:t>is</a:t>
-            </a:r>
-            <a:r>
-              <a:rPr lang="it-IT" sz="2000" dirty="0" smtClean="0"/>
-              <a:t> </a:t>
-            </a:r>
-            <a:r>
-              <a:rPr lang="it-IT" sz="2000" dirty="0" err="1" smtClean="0"/>
-              <a:t>our</a:t>
-            </a:r>
-            <a:r>
-              <a:rPr lang="it-IT" sz="2000" dirty="0" smtClean="0"/>
-              <a:t> target</a:t>
+            <a:endParaRPr lang="it-IT" sz="2400" dirty="0"/>
+          </a:p>
+          <a:p>
+            <a:pPr marL="0" indent="0" algn="ctr">
+              <a:buNone/>
+            </a:pPr>
+            <a:r>
+              <a:rPr lang="it-IT" sz="2600" dirty="0" smtClean="0"/>
+              <a:t>Some </a:t>
+            </a:r>
+            <a:r>
+              <a:rPr lang="it-IT" sz="2600" dirty="0" err="1" smtClean="0"/>
+              <a:t>Graph</a:t>
+            </a:r>
+            <a:r>
+              <a:rPr lang="it-IT" sz="2600" dirty="0" smtClean="0"/>
+              <a:t>?</a:t>
             </a:r>
           </a:p>
         </p:txBody>
@@ -4521,7 +4653,7 @@
             </a:r>
             <a:r>
               <a:rPr lang="it-IT" sz="3200" dirty="0" smtClean="0"/>
-              <a:t>… </a:t>
+              <a:t> </a:t>
             </a:r>
             <a:endParaRPr lang="it-IT" sz="3200" dirty="0"/>
           </a:p>
@@ -4545,7 +4677,7 @@
         </p:spPr>
         <p:txBody>
           <a:bodyPr>
-            <a:normAutofit/>
+            <a:normAutofit lnSpcReduction="10000"/>
           </a:bodyPr>
           <a:lstStyle/>
           <a:p>
@@ -4694,11 +4826,102 @@
             </a:r>
             <a:r>
               <a:rPr lang="it-IT" sz="2000" dirty="0" smtClean="0"/>
-              <a:t>, </a:t>
-            </a:r>
-            <a:r>
-              <a:rPr lang="it-IT" sz="2000" dirty="0" err="1" smtClean="0"/>
-              <a:t>those</a:t>
+              <a:t>: </a:t>
+            </a:r>
+            <a:r>
+              <a:rPr lang="it-IT" sz="2000" dirty="0" err="1" smtClean="0"/>
+              <a:t>how</a:t>
+            </a:r>
+            <a:r>
+              <a:rPr lang="it-IT" sz="2000" dirty="0" smtClean="0"/>
+              <a:t> </a:t>
+            </a:r>
+            <a:r>
+              <a:rPr lang="it-IT" sz="2000" dirty="0" err="1" smtClean="0"/>
+              <a:t>much</a:t>
+            </a:r>
+            <a:r>
+              <a:rPr lang="it-IT" sz="2000" dirty="0" smtClean="0"/>
+              <a:t> </a:t>
+            </a:r>
+            <a:r>
+              <a:rPr lang="it-IT" sz="2000" dirty="0" err="1" smtClean="0"/>
+              <a:t>they’re</a:t>
+            </a:r>
+            <a:r>
+              <a:rPr lang="it-IT" sz="2000" dirty="0" smtClean="0"/>
+              <a:t> </a:t>
+            </a:r>
+            <a:r>
+              <a:rPr lang="it-IT" sz="2000" dirty="0" err="1" smtClean="0"/>
+              <a:t>going</a:t>
+            </a:r>
+            <a:r>
+              <a:rPr lang="it-IT" sz="2000" dirty="0" smtClean="0"/>
+              <a:t> to </a:t>
+            </a:r>
+            <a:r>
+              <a:rPr lang="it-IT" sz="2000" dirty="0" err="1" smtClean="0"/>
+              <a:t>lose</a:t>
+            </a:r>
+            <a:r>
+              <a:rPr lang="it-IT" sz="2000" dirty="0" smtClean="0"/>
+              <a:t> with </a:t>
+            </a:r>
+            <a:r>
+              <a:rPr lang="it-IT" sz="2000" dirty="0" err="1" smtClean="0"/>
+              <a:t>that</a:t>
+            </a:r>
+            <a:r>
+              <a:rPr lang="it-IT" sz="2000" dirty="0" smtClean="0"/>
+              <a:t> </a:t>
+            </a:r>
+            <a:r>
+              <a:rPr lang="it-IT" sz="2000" dirty="0" err="1" smtClean="0"/>
+              <a:t>price</a:t>
+            </a:r>
+            <a:r>
+              <a:rPr lang="it-IT" sz="2000" dirty="0" smtClean="0"/>
+              <a:t> </a:t>
+            </a:r>
+            <a:r>
+              <a:rPr lang="it-IT" sz="2000" dirty="0" err="1" smtClean="0"/>
+              <a:t>at</a:t>
+            </a:r>
+            <a:r>
+              <a:rPr lang="it-IT" sz="2000" dirty="0" smtClean="0"/>
+              <a:t> </a:t>
+            </a:r>
+            <a:r>
+              <a:rPr lang="it-IT" sz="2000" dirty="0" err="1" smtClean="0"/>
+              <a:t>expiration</a:t>
+            </a:r>
+            <a:r>
+              <a:rPr lang="it-IT" sz="2000" dirty="0" smtClean="0"/>
+              <a:t> date.</a:t>
+            </a:r>
+          </a:p>
+          <a:p>
+            <a:pPr marL="0" indent="0" algn="just">
+              <a:buNone/>
+            </a:pPr>
+            <a:endParaRPr lang="it-IT" sz="2000" dirty="0" smtClean="0"/>
+          </a:p>
+          <a:p>
+            <a:pPr marL="0" indent="0" algn="just">
+              <a:buNone/>
+            </a:pPr>
+            <a:r>
+              <a:rPr lang="it-IT" sz="2000" dirty="0" err="1" smtClean="0"/>
+              <a:t>These</a:t>
+            </a:r>
+            <a:r>
+              <a:rPr lang="it-IT" sz="2000" dirty="0" smtClean="0"/>
+              <a:t> </a:t>
+            </a:r>
+            <a:r>
+              <a:rPr lang="it-IT" sz="2000" dirty="0" err="1" smtClean="0"/>
+              <a:t>investors</a:t>
             </a:r>
             <a:r>
               <a:rPr lang="it-IT" sz="2000" dirty="0" smtClean="0"/>
@@ -4726,11 +4949,43 @@
             </a:r>
             <a:r>
               <a:rPr lang="it-IT" sz="2000" dirty="0" smtClean="0"/>
-              <a:t> (</a:t>
-            </a:r>
-            <a:r>
-              <a:rPr lang="it-IT" sz="2000" dirty="0" err="1" smtClean="0"/>
-              <a:t>mostly</a:t>
+              <a:t>; </a:t>
+            </a:r>
+            <a:r>
+              <a:rPr lang="it-IT" sz="2000" dirty="0" err="1" smtClean="0"/>
+              <a:t>you</a:t>
+            </a:r>
+            <a:r>
+              <a:rPr lang="it-IT" sz="2000" dirty="0" smtClean="0"/>
+              <a:t> can </a:t>
+            </a:r>
+            <a:r>
+              <a:rPr lang="it-IT" sz="2000" dirty="0" err="1" smtClean="0"/>
+              <a:t>see</a:t>
+            </a:r>
+            <a:r>
+              <a:rPr lang="it-IT" sz="2000" dirty="0" smtClean="0"/>
+              <a:t> </a:t>
+            </a:r>
+            <a:r>
+              <a:rPr lang="it-IT" sz="2000" dirty="0" err="1" smtClean="0"/>
+              <a:t>clear</a:t>
+            </a:r>
+            <a:r>
+              <a:rPr lang="it-IT" sz="2000" dirty="0" smtClean="0"/>
+              <a:t> </a:t>
+            </a:r>
+            <a:r>
+              <a:rPr lang="it-IT" sz="2000" dirty="0" err="1" smtClean="0"/>
+              <a:t>samples</a:t>
+            </a:r>
+            <a:r>
+              <a:rPr lang="it-IT" sz="2000" dirty="0" smtClean="0"/>
+              <a:t> of </a:t>
+            </a:r>
+            <a:r>
+              <a:rPr lang="it-IT" sz="2000" dirty="0" err="1" smtClean="0"/>
+              <a:t>that</a:t>
             </a:r>
             <a:r>
               <a:rPr lang="it-IT" sz="2000" dirty="0" smtClean="0"/>
@@ -4742,6 +4997,14 @@
             </a:r>
             <a:r>
               <a:rPr lang="it-IT" sz="2000" dirty="0" smtClean="0"/>
+              <a:t> time </a:t>
+            </a:r>
+            <a:r>
+              <a:rPr lang="it-IT" sz="2000" dirty="0" err="1" smtClean="0"/>
+              <a:t>is</a:t>
+            </a:r>
+            <a:r>
+              <a:rPr lang="it-IT" sz="2000" dirty="0" smtClean="0"/>
               <a:t> </a:t>
             </a:r>
             <a:r>
@@ -4750,7 +5013,7 @@
             </a:r>
             <a:r>
               <a:rPr lang="it-IT" sz="2000" dirty="0" smtClean="0"/>
-              <a:t> to </a:t>
+              <a:t> </a:t>
             </a:r>
             <a:r>
               <a:rPr lang="it-IT" sz="2000" dirty="0" err="1" smtClean="0"/>
@@ -4887,154 +5150,19 @@
               <a:buNone/>
             </a:pPr>
             <a:r>
-              <a:rPr lang="it-IT" sz="2000" dirty="0" err="1" smtClean="0"/>
-              <a:t>It</a:t>
-            </a:r>
-            <a:r>
-              <a:rPr lang="it-IT" sz="2000" dirty="0" smtClean="0"/>
-              <a:t> </a:t>
-            </a:r>
-            <a:r>
-              <a:rPr lang="it-IT" sz="2000" dirty="0" err="1" smtClean="0"/>
-              <a:t>doesn’t</a:t>
-            </a:r>
-            <a:r>
-              <a:rPr lang="it-IT" sz="2000" dirty="0" smtClean="0"/>
-              <a:t> </a:t>
-            </a:r>
-            <a:r>
-              <a:rPr lang="it-IT" sz="2000" dirty="0" err="1" smtClean="0"/>
-              <a:t>happens</a:t>
-            </a:r>
-            <a:r>
-              <a:rPr lang="it-IT" sz="2000" dirty="0" smtClean="0"/>
-              <a:t> for </a:t>
-            </a:r>
-            <a:r>
-              <a:rPr lang="it-IT" sz="2000" dirty="0" err="1" smtClean="0"/>
-              <a:t>each</a:t>
-            </a:r>
-            <a:r>
-              <a:rPr lang="it-IT" sz="2000" dirty="0" smtClean="0"/>
-              <a:t> </a:t>
-            </a:r>
-            <a:r>
-              <a:rPr lang="it-IT" sz="2000" dirty="0" err="1" smtClean="0"/>
-              <a:t>quarter</a:t>
+              <a:rPr lang="it-IT" sz="2000" dirty="0" err="1"/>
+              <a:t>Samples</a:t>
             </a:r>
             <a:r>
               <a:rPr lang="it-IT" sz="2000" dirty="0"/>
-              <a:t> </a:t>
-            </a:r>
-            <a:r>
-              <a:rPr lang="it-IT" sz="2000" dirty="0" smtClean="0"/>
-              <a:t>(</a:t>
-            </a:r>
-            <a:r>
-              <a:rPr lang="it-IT" sz="2000" dirty="0" err="1" smtClean="0"/>
-              <a:t>about</a:t>
-            </a:r>
-            <a:r>
-              <a:rPr lang="it-IT" sz="2000" dirty="0" smtClean="0"/>
-              <a:t> 50%), </a:t>
-            </a:r>
-            <a:r>
-              <a:rPr lang="it-IT" sz="2000" dirty="0" err="1" smtClean="0"/>
-              <a:t>but</a:t>
-            </a:r>
-            <a:r>
-              <a:rPr lang="it-IT" sz="2000" dirty="0" smtClean="0"/>
-              <a:t> </a:t>
-            </a:r>
-            <a:r>
-              <a:rPr lang="it-IT" sz="2000" dirty="0" err="1" smtClean="0"/>
-              <a:t>when</a:t>
-            </a:r>
-            <a:r>
-              <a:rPr lang="it-IT" sz="2000" dirty="0" smtClean="0"/>
-              <a:t> </a:t>
-            </a:r>
-            <a:r>
-              <a:rPr lang="it-IT" sz="2000" dirty="0" err="1" smtClean="0"/>
-              <a:t>it</a:t>
-            </a:r>
-            <a:r>
-              <a:rPr lang="it-IT" sz="2000" dirty="0" smtClean="0"/>
-              <a:t> </a:t>
-            </a:r>
-            <a:r>
-              <a:rPr lang="it-IT" sz="2000" dirty="0" err="1" smtClean="0"/>
-              <a:t>happens</a:t>
-            </a:r>
-            <a:r>
-              <a:rPr lang="it-IT" sz="2000" dirty="0" smtClean="0"/>
-              <a:t> </a:t>
-            </a:r>
-            <a:r>
-              <a:rPr lang="it-IT" sz="2000" dirty="0" err="1" smtClean="0"/>
-              <a:t>you</a:t>
-            </a:r>
-            <a:r>
-              <a:rPr lang="it-IT" sz="2000" dirty="0" smtClean="0"/>
-              <a:t> </a:t>
-            </a:r>
-            <a:r>
-              <a:rPr lang="it-IT" sz="2000" dirty="0" err="1" smtClean="0"/>
-              <a:t>always</a:t>
-            </a:r>
-            <a:r>
-              <a:rPr lang="it-IT" sz="2000" dirty="0" smtClean="0"/>
-              <a:t> take home </a:t>
-            </a:r>
-            <a:r>
-              <a:rPr lang="it-IT" sz="2000" dirty="0" err="1" smtClean="0"/>
-              <a:t>all</a:t>
-            </a:r>
-            <a:r>
-              <a:rPr lang="it-IT" sz="2000" dirty="0" smtClean="0"/>
-              <a:t> </a:t>
-            </a:r>
-            <a:r>
-              <a:rPr lang="it-IT" sz="2000" dirty="0" err="1" smtClean="0"/>
-              <a:t>your</a:t>
-            </a:r>
-            <a:r>
-              <a:rPr lang="it-IT" sz="2000" dirty="0" smtClean="0"/>
-              <a:t> </a:t>
-            </a:r>
-            <a:r>
-              <a:rPr lang="it-IT" sz="2000" dirty="0" err="1" smtClean="0"/>
-              <a:t>expected</a:t>
-            </a:r>
-            <a:r>
-              <a:rPr lang="it-IT" sz="2000" dirty="0" smtClean="0"/>
-              <a:t> profit</a:t>
-            </a:r>
-          </a:p>
-          <a:p>
-            <a:pPr marL="0" indent="0" algn="just">
-              <a:buNone/>
-            </a:pPr>
-            <a:endParaRPr lang="it-IT" sz="2000" dirty="0"/>
-          </a:p>
-          <a:p>
-            <a:pPr marL="0" indent="0" algn="just">
-              <a:buNone/>
-            </a:pPr>
-            <a:r>
-              <a:rPr lang="it-IT" sz="2000" dirty="0" err="1" smtClean="0"/>
-              <a:t>Samples</a:t>
-            </a:r>
-            <a:r>
-              <a:rPr lang="it-IT" sz="2000" dirty="0" smtClean="0"/>
               <a:t>: March 9th 2009, </a:t>
             </a:r>
             <a:r>
-              <a:rPr lang="it-IT" sz="2000" dirty="0" err="1" smtClean="0"/>
+              <a:rPr lang="it-IT" sz="2000" dirty="0" err="1"/>
               <a:t>June</a:t>
             </a:r>
             <a:r>
-              <a:rPr lang="it-IT" sz="2000" dirty="0" smtClean="0"/>
+              <a:rPr lang="it-IT" sz="2000" dirty="0"/>
               <a:t> 8th 2015,… </a:t>
             </a:r>
           </a:p>
@@ -5079,18 +5207,18 @@
       </p:grpSpPr>
       <p:sp>
         <p:nvSpPr>
-          <p:cNvPr id="3" name="Segnaposto contenuto 2"/>
-          <p:cNvSpPr>
-            <a:spLocks noGrp="1"/>
-          </p:cNvSpPr>
-          <p:nvPr>
-            <p:ph idx="1"/>
+          <p:cNvPr id="2" name="Titolo 1"/>
+          <p:cNvSpPr>
+            <a:spLocks noGrp="1"/>
+          </p:cNvSpPr>
+          <p:nvPr>
+            <p:ph type="title"/>
           </p:nvPr>
         </p:nvSpPr>
         <p:spPr>
           <a:xfrm>
-            <a:off x="1799319" y="2252109"/>
-            <a:ext cx="5550882" cy="3398303"/>
+            <a:off x="457200" y="526803"/>
+            <a:ext cx="8229600" cy="1143000"/>
           </a:xfrm>
         </p:spPr>
         <p:txBody>
@@ -5099,6 +5227,461 @@
           </a:bodyPr>
           <a:lstStyle/>
           <a:p>
+            <a:r>
+              <a:rPr lang="it-IT" sz="3200" dirty="0" smtClean="0"/>
+              <a:t>Model </a:t>
+            </a:r>
+            <a:r>
+              <a:rPr lang="it-IT" sz="3200" dirty="0" err="1" smtClean="0"/>
+              <a:t>outcomes</a:t>
+            </a:r>
+            <a:r>
+              <a:rPr lang="it-IT" sz="3200" dirty="0" smtClean="0"/>
+              <a:t> </a:t>
+            </a:r>
+            <a:endParaRPr lang="it-IT" sz="3200" dirty="0"/>
+          </a:p>
+        </p:txBody>
+      </p:sp>
+      <p:sp>
+        <p:nvSpPr>
+          <p:cNvPr id="3" name="Segnaposto contenuto 2"/>
+          <p:cNvSpPr>
+            <a:spLocks noGrp="1"/>
+          </p:cNvSpPr>
+          <p:nvPr>
+            <p:ph idx="1"/>
+          </p:nvPr>
+        </p:nvSpPr>
+        <p:spPr>
+          <a:xfrm>
+            <a:off x="1140583" y="2390174"/>
+            <a:ext cx="6599629" cy="3310242"/>
+          </a:xfrm>
+        </p:spPr>
+        <p:txBody>
+          <a:bodyPr>
+            <a:normAutofit fontScale="92500"/>
+          </a:bodyPr>
+          <a:lstStyle/>
+          <a:p>
+            <a:pPr marL="0" indent="0" algn="just">
+              <a:buNone/>
+            </a:pPr>
+            <a:r>
+              <a:rPr lang="it-IT" sz="2000" dirty="0" err="1" smtClean="0"/>
+              <a:t>This</a:t>
+            </a:r>
+            <a:r>
+              <a:rPr lang="it-IT" sz="2000" dirty="0" smtClean="0"/>
+              <a:t> </a:t>
+            </a:r>
+            <a:r>
+              <a:rPr lang="it-IT" sz="2000" dirty="0" err="1" smtClean="0"/>
+              <a:t>perfect</a:t>
+            </a:r>
+            <a:r>
+              <a:rPr lang="it-IT" sz="2000" dirty="0" smtClean="0"/>
+              <a:t> scenario </a:t>
+            </a:r>
+            <a:r>
+              <a:rPr lang="it-IT" sz="2000" dirty="0" err="1" smtClean="0"/>
+              <a:t>happens</a:t>
+            </a:r>
+            <a:r>
+              <a:rPr lang="it-IT" sz="2000" dirty="0" smtClean="0"/>
+              <a:t> in </a:t>
+            </a:r>
+            <a:r>
+              <a:rPr lang="it-IT" sz="2000" dirty="0" err="1" smtClean="0"/>
+              <a:t>almost</a:t>
+            </a:r>
+            <a:r>
+              <a:rPr lang="it-IT" sz="2000" dirty="0" smtClean="0"/>
+              <a:t> 50% of </a:t>
+            </a:r>
+            <a:r>
+              <a:rPr lang="it-IT" sz="2000" dirty="0" err="1" smtClean="0"/>
+              <a:t>analyzed</a:t>
+            </a:r>
+            <a:r>
+              <a:rPr lang="it-IT" sz="2000" dirty="0" smtClean="0"/>
+              <a:t> </a:t>
+            </a:r>
+            <a:r>
+              <a:rPr lang="it-IT" sz="2000" dirty="0" err="1" smtClean="0"/>
+              <a:t>samples</a:t>
+            </a:r>
+            <a:endParaRPr lang="it-IT" sz="2000" dirty="0" smtClean="0"/>
+          </a:p>
+          <a:p>
+            <a:pPr marL="0" indent="0" algn="just">
+              <a:buNone/>
+            </a:pPr>
+            <a:endParaRPr lang="it-IT" sz="2000" dirty="0"/>
+          </a:p>
+          <a:p>
+            <a:pPr marL="0" indent="0" algn="ctr">
+              <a:buNone/>
+            </a:pPr>
+            <a:r>
+              <a:rPr lang="it-IT" sz="2000" dirty="0" smtClean="0"/>
+              <a:t>So, </a:t>
+            </a:r>
+            <a:r>
+              <a:rPr lang="it-IT" sz="2000" dirty="0" err="1" smtClean="0"/>
+              <a:t>how</a:t>
+            </a:r>
+            <a:r>
+              <a:rPr lang="it-IT" sz="2000" dirty="0" smtClean="0"/>
+              <a:t> </a:t>
+            </a:r>
+            <a:r>
+              <a:rPr lang="it-IT" sz="2000" dirty="0" err="1" smtClean="0"/>
+              <a:t>much</a:t>
+            </a:r>
+            <a:r>
+              <a:rPr lang="it-IT" sz="2000" dirty="0"/>
+              <a:t> </a:t>
+            </a:r>
+            <a:r>
+              <a:rPr lang="it-IT" sz="2000" dirty="0" smtClean="0"/>
+              <a:t>profit from </a:t>
+            </a:r>
+            <a:r>
+              <a:rPr lang="it-IT" sz="2000" dirty="0" err="1" smtClean="0"/>
+              <a:t>analyzed</a:t>
+            </a:r>
+            <a:r>
+              <a:rPr lang="it-IT" sz="2000" dirty="0" smtClean="0"/>
+              <a:t> </a:t>
+            </a:r>
+            <a:r>
+              <a:rPr lang="it-IT" sz="2000" dirty="0" err="1" smtClean="0"/>
+              <a:t>samples</a:t>
+            </a:r>
+            <a:r>
+              <a:rPr lang="it-IT" sz="2000" dirty="0" smtClean="0"/>
+              <a:t>? </a:t>
+            </a:r>
+          </a:p>
+          <a:p>
+            <a:pPr marL="0" indent="0" algn="just">
+              <a:buNone/>
+            </a:pPr>
+            <a:r>
+              <a:rPr lang="it-IT" sz="2000" dirty="0" smtClean="0"/>
+              <a:t>Your can </a:t>
+            </a:r>
+            <a:r>
+              <a:rPr lang="it-IT" sz="2000" dirty="0" err="1" smtClean="0"/>
+              <a:t>keep</a:t>
+            </a:r>
+            <a:r>
+              <a:rPr lang="it-IT" sz="2000" dirty="0" smtClean="0"/>
+              <a:t> the </a:t>
+            </a:r>
+            <a:r>
+              <a:rPr lang="it-IT" sz="2000" dirty="0" err="1" smtClean="0"/>
+              <a:t>whole</a:t>
+            </a:r>
+            <a:r>
+              <a:rPr lang="it-IT" sz="2000" dirty="0" smtClean="0"/>
+              <a:t> profit from an OTM </a:t>
+            </a:r>
+            <a:r>
+              <a:rPr lang="it-IT" sz="2000" dirty="0" err="1" smtClean="0"/>
+              <a:t>sold</a:t>
+            </a:r>
+            <a:r>
+              <a:rPr lang="it-IT" sz="2000" dirty="0" smtClean="0"/>
+              <a:t> option sale, or </a:t>
+            </a:r>
+            <a:r>
+              <a:rPr lang="it-IT" sz="2000" dirty="0" err="1" smtClean="0"/>
+              <a:t>lock</a:t>
+            </a:r>
+            <a:r>
+              <a:rPr lang="it-IT" sz="2000" dirty="0" smtClean="0"/>
+              <a:t> in </a:t>
+            </a:r>
+            <a:r>
+              <a:rPr lang="it-IT" sz="2000" dirty="0" err="1" smtClean="0"/>
+              <a:t>your</a:t>
+            </a:r>
+            <a:r>
+              <a:rPr lang="it-IT" sz="2000" dirty="0" smtClean="0"/>
+              <a:t> </a:t>
+            </a:r>
+            <a:r>
+              <a:rPr lang="it-IT" sz="2000" dirty="0" err="1" smtClean="0"/>
+              <a:t>profits</a:t>
+            </a:r>
+            <a:r>
+              <a:rPr lang="it-IT" sz="2000" dirty="0" smtClean="0"/>
+              <a:t> from </a:t>
+            </a:r>
+            <a:r>
+              <a:rPr lang="it-IT" sz="2000" dirty="0" err="1" smtClean="0"/>
+              <a:t>your</a:t>
+            </a:r>
+            <a:r>
+              <a:rPr lang="it-IT" sz="2000" dirty="0" smtClean="0"/>
+              <a:t> </a:t>
+            </a:r>
+            <a:r>
+              <a:rPr lang="it-IT" sz="2000" dirty="0" err="1" smtClean="0"/>
+              <a:t>hedged</a:t>
+            </a:r>
+            <a:r>
+              <a:rPr lang="it-IT" sz="2000" dirty="0" smtClean="0"/>
+              <a:t> positions, so… </a:t>
+            </a:r>
+            <a:r>
+              <a:rPr lang="it-IT" sz="2000" dirty="0" err="1"/>
+              <a:t>c</a:t>
+            </a:r>
+            <a:r>
+              <a:rPr lang="it-IT" sz="2000" dirty="0" err="1" smtClean="0"/>
+              <a:t>hoose</a:t>
+            </a:r>
+            <a:r>
+              <a:rPr lang="it-IT" sz="2000" dirty="0" smtClean="0"/>
+              <a:t> the </a:t>
+            </a:r>
+            <a:r>
+              <a:rPr lang="it-IT" sz="2000" dirty="0" err="1" smtClean="0"/>
+              <a:t>kind</a:t>
+            </a:r>
+            <a:r>
+              <a:rPr lang="it-IT" sz="2000" dirty="0" smtClean="0"/>
+              <a:t> of </a:t>
+            </a:r>
+            <a:r>
+              <a:rPr lang="it-IT" sz="2000" dirty="0" err="1" smtClean="0"/>
+              <a:t>trade</a:t>
+            </a:r>
+            <a:r>
+              <a:rPr lang="it-IT" sz="2000" dirty="0" smtClean="0"/>
+              <a:t> </a:t>
+            </a:r>
+            <a:r>
+              <a:rPr lang="it-IT" sz="2000" dirty="0" err="1" smtClean="0"/>
+              <a:t>you</a:t>
+            </a:r>
+            <a:r>
+              <a:rPr lang="it-IT" sz="2000" dirty="0" smtClean="0"/>
+              <a:t> </a:t>
+            </a:r>
+            <a:r>
+              <a:rPr lang="it-IT" sz="2000" dirty="0" err="1" smtClean="0"/>
+              <a:t>need</a:t>
+            </a:r>
+            <a:r>
+              <a:rPr lang="it-IT" sz="2000" dirty="0" smtClean="0"/>
+              <a:t>, and just </a:t>
+            </a:r>
+            <a:r>
+              <a:rPr lang="it-IT" sz="2000" dirty="0" err="1" smtClean="0"/>
+              <a:t>add</a:t>
+            </a:r>
+            <a:r>
+              <a:rPr lang="it-IT" sz="2000" dirty="0" smtClean="0"/>
+              <a:t> </a:t>
+            </a:r>
+            <a:r>
+              <a:rPr lang="it-IT" sz="2000" dirty="0" err="1" smtClean="0"/>
+              <a:t>money</a:t>
+            </a:r>
+            <a:r>
+              <a:rPr lang="it-IT" sz="2000" dirty="0" smtClean="0"/>
+              <a:t>!</a:t>
+            </a:r>
+          </a:p>
+          <a:p>
+            <a:pPr marL="0" indent="0" algn="just">
+              <a:buNone/>
+            </a:pPr>
+            <a:endParaRPr lang="it-IT" sz="2000" dirty="0" smtClean="0"/>
+          </a:p>
+          <a:p>
+            <a:pPr marL="0" indent="0" algn="just">
+              <a:buNone/>
+            </a:pPr>
+            <a:r>
+              <a:rPr lang="it-IT" sz="2000" dirty="0" err="1" smtClean="0"/>
+              <a:t>But</a:t>
+            </a:r>
+            <a:r>
+              <a:rPr lang="it-IT" sz="2000" dirty="0" smtClean="0"/>
+              <a:t> the </a:t>
+            </a:r>
+            <a:r>
+              <a:rPr lang="it-IT" sz="2000" dirty="0" err="1" smtClean="0"/>
+              <a:t>models</a:t>
+            </a:r>
+            <a:r>
+              <a:rPr lang="it-IT" sz="2000" dirty="0" smtClean="0"/>
+              <a:t> and the </a:t>
+            </a:r>
+            <a:r>
+              <a:rPr lang="it-IT" sz="2000" dirty="0" err="1" smtClean="0"/>
+              <a:t>indicator</a:t>
+            </a:r>
+            <a:r>
+              <a:rPr lang="it-IT" sz="2000" dirty="0" smtClean="0"/>
+              <a:t> help </a:t>
+            </a:r>
+            <a:r>
+              <a:rPr lang="it-IT" sz="2000" dirty="0" err="1" smtClean="0"/>
+              <a:t>very</a:t>
+            </a:r>
+            <a:r>
+              <a:rPr lang="it-IT" sz="2000" dirty="0" smtClean="0"/>
+              <a:t> </a:t>
+            </a:r>
+            <a:r>
+              <a:rPr lang="it-IT" sz="2000" dirty="0" err="1" smtClean="0"/>
+              <a:t>much</a:t>
+            </a:r>
+            <a:r>
+              <a:rPr lang="it-IT" sz="2000" dirty="0" smtClean="0"/>
+              <a:t> in </a:t>
+            </a:r>
+            <a:r>
+              <a:rPr lang="it-IT" sz="2000" dirty="0" err="1" smtClean="0"/>
+              <a:t>supporting</a:t>
+            </a:r>
+            <a:r>
+              <a:rPr lang="it-IT" sz="2000" dirty="0" smtClean="0"/>
+              <a:t> the trading </a:t>
+            </a:r>
+            <a:r>
+              <a:rPr lang="it-IT" sz="2000" dirty="0" err="1" smtClean="0"/>
+              <a:t>decisions</a:t>
+            </a:r>
+            <a:r>
+              <a:rPr lang="it-IT" sz="2000" dirty="0" smtClean="0"/>
+              <a:t> </a:t>
+            </a:r>
+            <a:r>
+              <a:rPr lang="it-IT" sz="2000" dirty="0" err="1" smtClean="0"/>
+              <a:t>even</a:t>
+            </a:r>
+            <a:r>
+              <a:rPr lang="it-IT" sz="2000" dirty="0" smtClean="0"/>
+              <a:t> </a:t>
+            </a:r>
+            <a:r>
+              <a:rPr lang="it-IT" sz="2000" dirty="0" err="1" smtClean="0"/>
+              <a:t>when</a:t>
+            </a:r>
+            <a:r>
+              <a:rPr lang="it-IT" sz="2000" dirty="0" smtClean="0"/>
+              <a:t> </a:t>
+            </a:r>
+            <a:r>
+              <a:rPr lang="it-IT" sz="2000" dirty="0" err="1" smtClean="0"/>
+              <a:t>you</a:t>
+            </a:r>
+            <a:r>
+              <a:rPr lang="it-IT" sz="2000" dirty="0" smtClean="0"/>
+              <a:t> </a:t>
+            </a:r>
+            <a:r>
+              <a:rPr lang="it-IT" sz="2000" dirty="0" err="1" smtClean="0"/>
+              <a:t>don’t</a:t>
+            </a:r>
+            <a:r>
+              <a:rPr lang="it-IT" sz="2000" dirty="0" smtClean="0"/>
+              <a:t> </a:t>
+            </a:r>
+            <a:r>
+              <a:rPr lang="it-IT" sz="2000" dirty="0" err="1" smtClean="0"/>
+              <a:t>get</a:t>
+            </a:r>
+            <a:r>
+              <a:rPr lang="it-IT" sz="2000" dirty="0" smtClean="0"/>
+              <a:t> </a:t>
+            </a:r>
+            <a:r>
+              <a:rPr lang="it-IT" sz="2000" dirty="0" err="1" smtClean="0"/>
+              <a:t>this</a:t>
+            </a:r>
+            <a:r>
+              <a:rPr lang="it-IT" sz="2000" dirty="0" smtClean="0"/>
+              <a:t> “</a:t>
+            </a:r>
+            <a:r>
+              <a:rPr lang="it-IT" sz="2000" dirty="0" err="1" smtClean="0"/>
+              <a:t>perfect</a:t>
+            </a:r>
+            <a:r>
+              <a:rPr lang="it-IT" sz="2000" dirty="0" smtClean="0"/>
+              <a:t>” scenario</a:t>
+            </a:r>
+          </a:p>
+        </p:txBody>
+      </p:sp>
+    </p:spTree>
+    <p:extLst>
+      <p:ext uri="{BB962C8B-B14F-4D97-AF65-F5344CB8AC3E}">
+        <p14:creationId xmlns:p14="http://schemas.microsoft.com/office/powerpoint/2010/main" val="2233191408"/>
+      </p:ext>
+    </p:extLst>
+  </p:cSld>
+  <p:clrMapOvr>
+    <a:masterClrMapping/>
+  </p:clrMapOvr>
+  <p:timing>
+    <p:tnLst>
+      <p:par>
+        <p:cTn xmlns:p14="http://schemas.microsoft.com/office/powerpoint/2010/main" id="1" dur="indefinite" restart="never" nodeType="tmRoot"/>
+      </p:par>
+    </p:tnLst>
+  </p:timing>
+</p:sld>
+</file>
+
+<file path=ppt/slides/slide6.xml><?xml version="1.0" encoding="utf-8"?>
+<p:sld xmlns:a="http://schemas.openxmlformats.org/drawingml/2006/main" xmlns:r="http://schemas.openxmlformats.org/officeDocument/2006/relationships" xmlns:p="http://schemas.openxmlformats.org/presentationml/2006/main">
+  <p:cSld>
+    <p:spTree>
+      <p:nvGrpSpPr>
+        <p:cNvPr id="1" name=""/>
+        <p:cNvGrpSpPr/>
+        <p:nvPr/>
+      </p:nvGrpSpPr>
+      <p:grpSpPr>
+        <a:xfrm>
+          <a:off x="0" y="0"/>
+          <a:ext cx="0" cy="0"/>
+          <a:chOff x="0" y="0"/>
+          <a:chExt cx="0" cy="0"/>
+        </a:xfrm>
+      </p:grpSpPr>
+      <p:sp>
+        <p:nvSpPr>
+          <p:cNvPr id="3" name="Segnaposto contenuto 2"/>
+          <p:cNvSpPr>
+            <a:spLocks noGrp="1"/>
+          </p:cNvSpPr>
+          <p:nvPr>
+            <p:ph idx="1"/>
+          </p:nvPr>
+        </p:nvSpPr>
+        <p:spPr>
+          <a:xfrm>
+            <a:off x="1639314" y="1694012"/>
+            <a:ext cx="6160899" cy="3398303"/>
+          </a:xfrm>
+        </p:spPr>
+        <p:txBody>
+          <a:bodyPr>
+            <a:normAutofit/>
+          </a:bodyPr>
+          <a:lstStyle/>
+          <a:p>
             <a:pPr marL="0" indent="0" algn="just">
               <a:buNone/>
             </a:pPr>
@@ -5136,7 +5719,15 @@
             </a:r>
             <a:r>
               <a:rPr lang="it-IT" sz="3600" dirty="0" smtClean="0"/>
-              <a:t> </a:t>
+              <a:t> (</a:t>
+            </a:r>
+            <a:r>
+              <a:rPr lang="it-IT" sz="3600" dirty="0" err="1" smtClean="0"/>
+              <a:t>much</a:t>
+            </a:r>
+            <a:r>
+              <a:rPr lang="it-IT" sz="3600" dirty="0" smtClean="0"/>
+              <a:t>) </a:t>
             </a:r>
             <a:r>
               <a:rPr lang="it-IT" sz="3600" dirty="0" err="1" smtClean="0"/>
@@ -5170,9 +5761,23 @@
               <a:rPr lang="it-IT" sz="3600" dirty="0" smtClean="0"/>
               <a:t>!</a:t>
             </a:r>
+          </a:p>
+          <a:p>
+            <a:pPr marL="0" indent="0" algn="just">
+              <a:buNone/>
+            </a:pPr>
             <a:r>
               <a:rPr lang="it-IT" sz="3600" dirty="0" smtClean="0"/>
-              <a:t> (single </a:t>
+              <a:t> </a:t>
+            </a:r>
+          </a:p>
+          <a:p>
+            <a:pPr marL="0" indent="0" algn="just">
+              <a:buNone/>
+            </a:pPr>
+            <a:r>
+              <a:rPr lang="it-IT" sz="3600" dirty="0" smtClean="0"/>
+              <a:t>single </a:t>
             </a:r>
             <a:r>
               <a:rPr lang="it-IT" sz="3600" dirty="0" err="1" smtClean="0"/>
@@ -5184,7 +5789,7 @@
             </a:r>
             <a:r>
               <a:rPr lang="it-IT" sz="3600" dirty="0" err="1" smtClean="0"/>
-              <a:t>currencies</a:t>
+              <a:t>Forex</a:t>
             </a:r>
             <a:r>
               <a:rPr lang="it-IT" sz="3600" dirty="0" smtClean="0"/>
@@ -5196,7 +5801,7 @@
             </a:r>
             <a:r>
               <a:rPr lang="it-IT" sz="3600" dirty="0" smtClean="0"/>
-              <a:t>,…)</a:t>
+              <a:t>,…</a:t>
             </a:r>
             <a:endParaRPr lang="it-IT" sz="3600" dirty="0"/>
           </a:p>

</xml_diff>

<commit_message>
remastering modeling section - halfway
</commit_message>
<xml_diff>
--- a/kojak_work/Metis Kojak.pptx
+++ b/kojak_work/Metis Kojak.pptx
@@ -4341,9 +4341,7 @@
             <a:endParaRPr lang="it-IT" sz="2400" dirty="0" smtClean="0"/>
           </a:p>
           <a:p>
-            <a:pPr marL="0" indent="0" algn="just">
-              <a:buNone/>
-            </a:pPr>
+            <a:pPr algn="just"/>
             <a:r>
               <a:rPr lang="it-IT" sz="2400" dirty="0" err="1" smtClean="0"/>
               <a:t>Guess</a:t>
@@ -4375,9 +4373,7 @@
             <a:endParaRPr lang="it-IT" sz="2400" dirty="0" smtClean="0"/>
           </a:p>
           <a:p>
-            <a:pPr marL="0" indent="0" algn="just">
-              <a:buNone/>
-            </a:pPr>
+            <a:pPr algn="just"/>
             <a:r>
               <a:rPr lang="it-IT" sz="2400" dirty="0" err="1" smtClean="0"/>
               <a:t>Guess</a:t>
@@ -4409,9 +4405,7 @@
             <a:endParaRPr lang="it-IT" sz="2400" dirty="0" smtClean="0"/>
           </a:p>
           <a:p>
-            <a:pPr marL="0" indent="0" algn="just">
-              <a:buNone/>
-            </a:pPr>
+            <a:pPr algn="just"/>
             <a:r>
               <a:rPr lang="it-IT" sz="2400" dirty="0" err="1" smtClean="0"/>
               <a:t>Guess</a:t>
@@ -4443,9 +4437,7 @@
             <a:endParaRPr lang="it-IT" sz="2400" dirty="0" smtClean="0"/>
           </a:p>
           <a:p>
-            <a:pPr marL="0" indent="0" algn="just">
-              <a:buNone/>
-            </a:pPr>
+            <a:pPr algn="just"/>
             <a:r>
               <a:rPr lang="it-IT" sz="2400" dirty="0" err="1" smtClean="0"/>
               <a:t>Guess</a:t>
@@ -4677,7 +4669,7 @@
         </p:spPr>
         <p:txBody>
           <a:bodyPr>
-            <a:normAutofit lnSpcReduction="10000"/>
+            <a:normAutofit fontScale="92500" lnSpcReduction="10000"/>
           </a:bodyPr>
           <a:lstStyle/>
           <a:p>
@@ -4802,19 +4794,11 @@
             </a:r>
             <a:r>
               <a:rPr lang="it-IT" sz="2000" dirty="0" smtClean="0"/>
-              <a:t> by </a:t>
-            </a:r>
-            <a:r>
-              <a:rPr lang="it-IT" sz="2000" dirty="0" err="1" smtClean="0"/>
-              <a:t>most</a:t>
-            </a:r>
-            <a:r>
-              <a:rPr lang="it-IT" sz="2000" dirty="0" smtClean="0"/>
-              <a:t> </a:t>
-            </a:r>
-            <a:r>
-              <a:rPr lang="it-IT" sz="2000" dirty="0" err="1" smtClean="0"/>
-              <a:t>important</a:t>
+              <a:t> of the </a:t>
+            </a:r>
+            <a:r>
+              <a:rPr lang="it-IT" sz="2000" dirty="0" err="1" smtClean="0"/>
+              <a:t>biggest</a:t>
             </a:r>
             <a:r>
               <a:rPr lang="it-IT" sz="2000" dirty="0" smtClean="0"/>
@@ -4866,7 +4850,31 @@
             </a:r>
             <a:r>
               <a:rPr lang="it-IT" sz="2000" dirty="0" smtClean="0"/>
-              <a:t> with </a:t>
+              <a:t> </a:t>
+            </a:r>
+            <a:r>
+              <a:rPr lang="it-IT" sz="2000" dirty="0" err="1" smtClean="0"/>
+              <a:t>at</a:t>
+            </a:r>
+            <a:r>
+              <a:rPr lang="it-IT" sz="2000" dirty="0" smtClean="0"/>
+              <a:t> the </a:t>
+            </a:r>
+            <a:r>
+              <a:rPr lang="it-IT" sz="2000" dirty="0" err="1" smtClean="0"/>
+              <a:t>expiration</a:t>
+            </a:r>
+            <a:r>
+              <a:rPr lang="it-IT" sz="2000" dirty="0" smtClean="0"/>
+              <a:t> date </a:t>
+            </a:r>
+            <a:r>
+              <a:rPr lang="it-IT" sz="2000" dirty="0" err="1" smtClean="0"/>
+              <a:t>at</a:t>
+            </a:r>
+            <a:r>
+              <a:rPr lang="it-IT" sz="2000" dirty="0" smtClean="0"/>
+              <a:t> </a:t>
             </a:r>
             <a:r>
               <a:rPr lang="it-IT" sz="2000" dirty="0" err="1" smtClean="0"/>
@@ -4882,23 +4890,7 @@
             </a:r>
             <a:r>
               <a:rPr lang="it-IT" sz="2000" dirty="0" smtClean="0"/>
-              <a:t> </a:t>
-            </a:r>
-            <a:r>
-              <a:rPr lang="it-IT" sz="2000" dirty="0" err="1" smtClean="0"/>
-              <a:t>at</a:t>
-            </a:r>
-            <a:r>
-              <a:rPr lang="it-IT" sz="2000" dirty="0" smtClean="0"/>
-              <a:t> </a:t>
-            </a:r>
-            <a:r>
-              <a:rPr lang="it-IT" sz="2000" dirty="0" err="1" smtClean="0"/>
-              <a:t>expiration</a:t>
-            </a:r>
-            <a:r>
-              <a:rPr lang="it-IT" sz="2000" dirty="0" smtClean="0"/>
-              <a:t> date.</a:t>
+              <a:t>.</a:t>
             </a:r>
           </a:p>
           <a:p>
@@ -5096,7 +5088,47 @@
             </a:r>
             <a:r>
               <a:rPr lang="it-IT" sz="2000" dirty="0" smtClean="0"/>
-              <a:t> </a:t>
+              <a:t>, to be </a:t>
+            </a:r>
+            <a:r>
+              <a:rPr lang="it-IT" sz="2000" dirty="0" err="1" smtClean="0"/>
+              <a:t>checked</a:t>
+            </a:r>
+            <a:r>
+              <a:rPr lang="it-IT" sz="2000" dirty="0" smtClean="0"/>
+              <a:t> </a:t>
+            </a:r>
+            <a:r>
+              <a:rPr lang="it-IT" sz="2000" dirty="0" err="1" smtClean="0"/>
+              <a:t>day</a:t>
+            </a:r>
+            <a:r>
+              <a:rPr lang="it-IT" sz="2000" dirty="0" smtClean="0"/>
+              <a:t> by </a:t>
+            </a:r>
+            <a:r>
+              <a:rPr lang="it-IT" sz="2000" dirty="0" err="1" smtClean="0"/>
+              <a:t>day</a:t>
+            </a:r>
+            <a:r>
+              <a:rPr lang="it-IT" sz="2000" dirty="0" smtClean="0"/>
+              <a:t> </a:t>
+            </a:r>
+            <a:r>
+              <a:rPr lang="it-IT" sz="2000" dirty="0" err="1" smtClean="0"/>
+              <a:t>through</a:t>
+            </a:r>
+            <a:r>
+              <a:rPr lang="it-IT" sz="2000" dirty="0" smtClean="0"/>
+              <a:t> the 2 </a:t>
+            </a:r>
+            <a:r>
+              <a:rPr lang="it-IT" sz="2000" dirty="0" err="1" smtClean="0"/>
+              <a:t>months</a:t>
+            </a:r>
+            <a:r>
+              <a:rPr lang="it-IT" sz="2000" dirty="0" smtClean="0"/>
+              <a:t>, </a:t>
             </a:r>
             <a:r>
               <a:rPr lang="it-IT" sz="2000" dirty="0" err="1" smtClean="0"/>
@@ -5104,7 +5136,15 @@
             </a:r>
             <a:r>
               <a:rPr lang="it-IT" sz="2000" dirty="0" smtClean="0"/>
-              <a:t> to the </a:t>
+              <a:t> in the </a:t>
+            </a:r>
+            <a:r>
+              <a:rPr lang="it-IT" sz="2000" dirty="0" err="1" smtClean="0"/>
+              <a:t>directions</a:t>
+            </a:r>
+            <a:r>
+              <a:rPr lang="it-IT" sz="2000" dirty="0" smtClean="0"/>
+              <a:t> of the </a:t>
             </a:r>
             <a:r>
               <a:rPr lang="it-IT" sz="2000" dirty="0" err="1" smtClean="0"/>
@@ -5138,6 +5178,30 @@
               <a:rPr lang="it-IT" sz="2000" dirty="0" smtClean="0"/>
               <a:t>.</a:t>
             </a:r>
+          </a:p>
+          <a:p>
+            <a:pPr marL="0" indent="0" algn="just">
+              <a:buNone/>
+            </a:pPr>
+            <a:endParaRPr lang="it-IT" sz="2000" dirty="0" smtClean="0"/>
+          </a:p>
+          <a:p>
+            <a:pPr marL="0" indent="0" algn="ctr">
+              <a:buNone/>
+            </a:pPr>
+            <a:r>
+              <a:rPr lang="it-IT" sz="2000" dirty="0" smtClean="0"/>
+              <a:t>Some </a:t>
+            </a:r>
+            <a:r>
+              <a:rPr lang="it-IT" sz="2000" dirty="0" err="1" smtClean="0"/>
+              <a:t>graphs</a:t>
+            </a:r>
+            <a:r>
+              <a:rPr lang="it-IT" sz="2000" dirty="0" smtClean="0"/>
+              <a:t>…</a:t>
+            </a:r>
+            <a:endParaRPr lang="it-IT" sz="2000" dirty="0"/>
           </a:p>
           <a:p>
             <a:pPr marL="0" indent="0" algn="just">
@@ -5255,13 +5319,13 @@
         </p:nvSpPr>
         <p:spPr>
           <a:xfrm>
-            <a:off x="1140583" y="2390174"/>
-            <a:ext cx="6599629" cy="3310242"/>
+            <a:off x="1140583" y="2110154"/>
+            <a:ext cx="6599629" cy="3590262"/>
           </a:xfrm>
         </p:spPr>
         <p:txBody>
           <a:bodyPr>
-            <a:normAutofit fontScale="92500"/>
+            <a:normAutofit fontScale="92500" lnSpcReduction="10000"/>
           </a:bodyPr>
           <a:lstStyle/>
           <a:p>
@@ -5286,7 +5350,7 @@
             </a:r>
             <a:r>
               <a:rPr lang="it-IT" sz="2000" dirty="0" err="1" smtClean="0"/>
-              <a:t>happens</a:t>
+              <a:t>occurs</a:t>
             </a:r>
             <a:r>
               <a:rPr lang="it-IT" sz="2000" dirty="0" smtClean="0"/>
@@ -5294,7 +5358,7 @@
             </a:r>
             <a:r>
               <a:rPr lang="it-IT" sz="2000" dirty="0" err="1" smtClean="0"/>
-              <a:t>almost</a:t>
+              <a:t>roughly</a:t>
             </a:r>
             <a:r>
               <a:rPr lang="it-IT" sz="2000" dirty="0" smtClean="0"/>
@@ -5364,6 +5428,12 @@
               <a:rPr lang="it-IT" sz="2000" dirty="0" smtClean="0"/>
               <a:t>? </a:t>
             </a:r>
+          </a:p>
+          <a:p>
+            <a:pPr marL="0" indent="0" algn="ctr">
+              <a:buNone/>
+            </a:pPr>
+            <a:endParaRPr lang="it-IT" sz="2000" dirty="0" smtClean="0"/>
           </a:p>
           <a:p>
             <a:pPr marL="0" indent="0" algn="just">
@@ -5772,16 +5842,24 @@
             </a:r>
           </a:p>
           <a:p>
-            <a:pPr marL="0" indent="0" algn="just">
+            <a:pPr marL="0" indent="0" algn="ctr">
               <a:buNone/>
             </a:pPr>
             <a:r>
+              <a:rPr lang="it-IT" sz="3600" dirty="0"/>
+              <a:t>S</a:t>
+            </a:r>
+            <a:r>
               <a:rPr lang="it-IT" sz="3600" dirty="0" smtClean="0"/>
-              <a:t>single </a:t>
+              <a:t>ingle </a:t>
+            </a:r>
+            <a:r>
+              <a:rPr lang="it-IT" sz="3600" dirty="0" err="1"/>
+              <a:t>S</a:t>
             </a:r>
             <a:r>
               <a:rPr lang="it-IT" sz="3600" dirty="0" err="1" smtClean="0"/>
-              <a:t>stocks</a:t>
+              <a:t>tocks</a:t>
             </a:r>
             <a:r>
               <a:rPr lang="it-IT" sz="3600" dirty="0" smtClean="0"/>
@@ -5796,8 +5874,12 @@
               <a:t>, </a:t>
             </a:r>
             <a:r>
+              <a:rPr lang="it-IT" sz="3600" dirty="0" err="1"/>
+              <a:t>C</a:t>
+            </a:r>
+            <a:r>
               <a:rPr lang="it-IT" sz="3600" dirty="0" err="1" smtClean="0"/>
-              <a:t>commodities</a:t>
+              <a:t>ommodities</a:t>
             </a:r>
             <a:r>
               <a:rPr lang="it-IT" sz="3600" dirty="0" smtClean="0"/>

</xml_diff>

<commit_message>
presentation remastered with pyton plots
</commit_message>
<xml_diff>
--- a/kojak_work/Metis Kojak.pptx
+++ b/kojak_work/Metis Kojak.pptx
@@ -5,10 +5,10 @@
     <p:sldMasterId id="2147483648" r:id="rId1"/>
   </p:sldMasterIdLst>
   <p:notesMasterIdLst>
-    <p:notesMasterId r:id="rId10"/>
+    <p:notesMasterId r:id="rId11"/>
   </p:notesMasterIdLst>
   <p:handoutMasterIdLst>
-    <p:handoutMasterId r:id="rId11"/>
+    <p:handoutMasterId r:id="rId12"/>
   </p:handoutMasterIdLst>
   <p:sldIdLst>
     <p:sldId id="256" r:id="rId2"/>
@@ -19,6 +19,7 @@
     <p:sldId id="273" r:id="rId7"/>
     <p:sldId id="275" r:id="rId8"/>
     <p:sldId id="277" r:id="rId9"/>
+    <p:sldId id="278" r:id="rId10"/>
   </p:sldIdLst>
   <p:sldSz cx="9144000" cy="6858000" type="screen4x3"/>
   <p:notesSz cx="6858000" cy="9144000"/>
@@ -1309,6 +1310,90 @@
 </p:notes>
 </file>
 
+<file path=ppt/notesSlides/notesSlide9.xml><?xml version="1.0" encoding="utf-8"?>
+<p:notes xmlns:a="http://schemas.openxmlformats.org/drawingml/2006/main" xmlns:r="http://schemas.openxmlformats.org/officeDocument/2006/relationships" xmlns:p="http://schemas.openxmlformats.org/presentationml/2006/main">
+  <p:cSld>
+    <p:spTree>
+      <p:nvGrpSpPr>
+        <p:cNvPr id="1" name=""/>
+        <p:cNvGrpSpPr/>
+        <p:nvPr/>
+      </p:nvGrpSpPr>
+      <p:grpSpPr>
+        <a:xfrm>
+          <a:off x="0" y="0"/>
+          <a:ext cx="0" cy="0"/>
+          <a:chOff x="0" y="0"/>
+          <a:chExt cx="0" cy="0"/>
+        </a:xfrm>
+      </p:grpSpPr>
+      <p:sp>
+        <p:nvSpPr>
+          <p:cNvPr id="2" name="Segnaposto immagine diapositiva 1"/>
+          <p:cNvSpPr>
+            <a:spLocks noGrp="1" noRot="1" noChangeAspect="1"/>
+          </p:cNvSpPr>
+          <p:nvPr>
+            <p:ph type="sldImg"/>
+          </p:nvPr>
+        </p:nvSpPr>
+        <p:spPr/>
+      </p:sp>
+      <p:sp>
+        <p:nvSpPr>
+          <p:cNvPr id="3" name="Segnaposto note 2"/>
+          <p:cNvSpPr>
+            <a:spLocks noGrp="1"/>
+          </p:cNvSpPr>
+          <p:nvPr>
+            <p:ph type="body" idx="1"/>
+          </p:nvPr>
+        </p:nvSpPr>
+        <p:spPr/>
+        <p:txBody>
+          <a:bodyPr/>
+          <a:lstStyle/>
+          <a:p>
+            <a:endParaRPr lang="it-IT"/>
+          </a:p>
+        </p:txBody>
+      </p:sp>
+      <p:sp>
+        <p:nvSpPr>
+          <p:cNvPr id="4" name="Segnaposto numero diapositiva 3"/>
+          <p:cNvSpPr>
+            <a:spLocks noGrp="1"/>
+          </p:cNvSpPr>
+          <p:nvPr>
+            <p:ph type="sldNum" sz="quarter" idx="10"/>
+          </p:nvPr>
+        </p:nvSpPr>
+        <p:spPr/>
+        <p:txBody>
+          <a:bodyPr/>
+          <a:lstStyle/>
+          <a:p>
+            <a:fld id="{1242F90E-5F4C-DF4D-8DD5-862EFF08E26B}" type="slidenum">
+              <a:rPr lang="it-IT" smtClean="0"/>
+              <a:t>9</a:t>
+            </a:fld>
+            <a:endParaRPr lang="it-IT"/>
+          </a:p>
+        </p:txBody>
+      </p:sp>
+    </p:spTree>
+    <p:extLst>
+      <p:ext uri="{BB962C8B-B14F-4D97-AF65-F5344CB8AC3E}">
+        <p14:creationId xmlns:p14="http://schemas.microsoft.com/office/powerpoint/2010/main" val="1702243826"/>
+      </p:ext>
+    </p:extLst>
+  </p:cSld>
+  <p:clrMapOvr>
+    <a:masterClrMapping/>
+  </p:clrMapOvr>
+</p:notes>
+</file>
+
 <file path=ppt/slideLayouts/slideLayout1.xml><?xml version="1.0" encoding="utf-8"?>
 <p:sldLayout xmlns:a="http://schemas.openxmlformats.org/drawingml/2006/main" xmlns:r="http://schemas.openxmlformats.org/officeDocument/2006/relationships" xmlns:p="http://schemas.openxmlformats.org/presentationml/2006/main" type="title" preserve="1">
   <p:cSld name="Diapositiva titolo">
@@ -1489,7 +1574,7 @@
           <a:lstStyle/>
           <a:p>
             <a:fld id="{04F99F54-0049-5244-953B-4E00BBA61D33}" type="datetime1">
-              <a:rPr lang="Zyyy" smtClean="0"/>
+              <a:rPr lang="x-none" smtClean="0"/>
               <a:t>23/06/15</a:t>
             </a:fld>
             <a:endParaRPr lang="it-IT"/>
@@ -1663,7 +1748,7 @@
           <a:lstStyle/>
           <a:p>
             <a:fld id="{3CEA4816-DFB6-D046-9272-34FBBB758DC3}" type="datetime1">
-              <a:rPr lang="Zyyy" smtClean="0"/>
+              <a:rPr lang="x-none" smtClean="0"/>
               <a:t>23/06/15</a:t>
             </a:fld>
             <a:endParaRPr lang="it-IT"/>
@@ -1847,7 +1932,7 @@
           <a:lstStyle/>
           <a:p>
             <a:fld id="{DE1E0CD3-E5A4-0C46-A90D-E68799C9DBAD}" type="datetime1">
-              <a:rPr lang="Zyyy" smtClean="0"/>
+              <a:rPr lang="x-none" smtClean="0"/>
               <a:t>23/06/15</a:t>
             </a:fld>
             <a:endParaRPr lang="it-IT"/>
@@ -2021,7 +2106,7 @@
           <a:lstStyle/>
           <a:p>
             <a:fld id="{34E5F666-D8A4-E043-BBA8-F9DBB0149C54}" type="datetime1">
-              <a:rPr lang="Zyyy" smtClean="0"/>
+              <a:rPr lang="x-none" smtClean="0"/>
               <a:t>23/06/15</a:t>
             </a:fld>
             <a:endParaRPr lang="it-IT"/>
@@ -2271,7 +2356,7 @@
           <a:lstStyle/>
           <a:p>
             <a:fld id="{7D17FDC4-B4F0-274C-899A-A740C1289A53}" type="datetime1">
-              <a:rPr lang="Zyyy" smtClean="0"/>
+              <a:rPr lang="x-none" smtClean="0"/>
               <a:t>23/06/15</a:t>
             </a:fld>
             <a:endParaRPr lang="it-IT"/>
@@ -2563,7 +2648,7 @@
           <a:lstStyle/>
           <a:p>
             <a:fld id="{29F3F420-0932-A044-9D0E-7A23FDE9816D}" type="datetime1">
-              <a:rPr lang="Zyyy" smtClean="0"/>
+              <a:rPr lang="x-none" smtClean="0"/>
               <a:t>23/06/15</a:t>
             </a:fld>
             <a:endParaRPr lang="it-IT"/>
@@ -2989,7 +3074,7 @@
           <a:lstStyle/>
           <a:p>
             <a:fld id="{77EFCFE9-29F8-6649-A783-7939F40A056A}" type="datetime1">
-              <a:rPr lang="Zyyy" smtClean="0"/>
+              <a:rPr lang="x-none" smtClean="0"/>
               <a:t>23/06/15</a:t>
             </a:fld>
             <a:endParaRPr lang="it-IT"/>
@@ -3111,7 +3196,7 @@
           <a:lstStyle/>
           <a:p>
             <a:fld id="{70AB03B6-CBA2-BE4A-A7F5-30652FBC9E06}" type="datetime1">
-              <a:rPr lang="Zyyy" smtClean="0"/>
+              <a:rPr lang="x-none" smtClean="0"/>
               <a:t>23/06/15</a:t>
             </a:fld>
             <a:endParaRPr lang="it-IT"/>
@@ -3210,7 +3295,7 @@
           <a:lstStyle/>
           <a:p>
             <a:fld id="{0A3F665A-A66A-F545-87F8-53051B5D74E9}" type="datetime1">
-              <a:rPr lang="Zyyy" smtClean="0"/>
+              <a:rPr lang="x-none" smtClean="0"/>
               <a:t>23/06/15</a:t>
             </a:fld>
             <a:endParaRPr lang="it-IT"/>
@@ -3491,7 +3576,7 @@
           <a:lstStyle/>
           <a:p>
             <a:fld id="{5ECEBAAF-DFE5-5849-BC9C-7A7DF235CC45}" type="datetime1">
-              <a:rPr lang="Zyyy" smtClean="0"/>
+              <a:rPr lang="x-none" smtClean="0"/>
               <a:t>23/06/15</a:t>
             </a:fld>
             <a:endParaRPr lang="it-IT"/>
@@ -3748,7 +3833,7 @@
           <a:lstStyle/>
           <a:p>
             <a:fld id="{E848CE0A-858B-2640-91E5-DA1440EEBC05}" type="datetime1">
-              <a:rPr lang="Zyyy" smtClean="0"/>
+              <a:rPr lang="x-none" smtClean="0"/>
               <a:t>23/06/15</a:t>
             </a:fld>
             <a:endParaRPr lang="it-IT"/>
@@ -3970,7 +4055,7 @@
           </a:lstStyle>
           <a:p>
             <a:fld id="{8554DD78-0100-C74F-B6DC-B2111832CB69}" type="datetime1">
-              <a:rPr lang="Zyyy" smtClean="0"/>
+              <a:rPr lang="x-none" smtClean="0"/>
               <a:t>23/06/15</a:t>
             </a:fld>
             <a:endParaRPr lang="it-IT"/>
@@ -4361,7 +4446,7 @@
         </p:nvSpPr>
         <p:spPr>
           <a:xfrm>
-            <a:off x="1765720" y="1337442"/>
+            <a:off x="1765720" y="1616480"/>
             <a:ext cx="5748644" cy="3290685"/>
           </a:xfrm>
           <a:prstGeom prst="rect">
@@ -4465,8 +4550,27 @@
                 <a:ea typeface="AppleGothic"/>
                 <a:cs typeface="Avenir Light"/>
               </a:rPr>
-              <a:t> Trading</a:t>
-            </a:r>
+              <a:t> </a:t>
+            </a:r>
+            <a:r>
+              <a:rPr lang="it-IT" sz="3200" dirty="0" smtClean="0">
+                <a:solidFill>
+                  <a:srgbClr val="FFFFFF"/>
+                </a:solidFill>
+                <a:latin typeface="Avenir Light"/>
+                <a:ea typeface="AppleGothic"/>
+                <a:cs typeface="Avenir Light"/>
+              </a:rPr>
+              <a:t>Trading</a:t>
+            </a:r>
+            <a:endParaRPr lang="it-IT" sz="3200" dirty="0" smtClean="0">
+              <a:solidFill>
+                <a:srgbClr val="FFFFFF"/>
+              </a:solidFill>
+              <a:latin typeface="Avenir Light"/>
+              <a:ea typeface="AppleGothic"/>
+              <a:cs typeface="Avenir Light"/>
+            </a:endParaRPr>
           </a:p>
           <a:p>
             <a:r>
@@ -6140,6 +6244,16 @@
           </a:p>
           <a:p>
             <a:r>
+              <a:rPr lang="it-IT" sz="1600" dirty="0" err="1" smtClean="0">
+                <a:solidFill>
+                  <a:srgbClr val="FFFFFF"/>
+                </a:solidFill>
+                <a:latin typeface="Avenir Light"/>
+                <a:cs typeface="Avenir Light"/>
+              </a:rPr>
+              <a:t>Most</a:t>
+            </a:r>
+            <a:r>
               <a:rPr lang="it-IT" sz="1600" dirty="0" smtClean="0">
                 <a:solidFill>
                   <a:srgbClr val="FFFFFF"/>
@@ -6147,7 +6261,7 @@
                 <a:latin typeface="Avenir Light"/>
                 <a:cs typeface="Avenir Light"/>
               </a:rPr>
-              <a:t>Best option </a:t>
+              <a:t> of option </a:t>
             </a:r>
             <a:r>
               <a:rPr lang="it-IT" sz="1600" dirty="0" err="1" smtClean="0">
@@ -6262,7 +6376,7 @@
       </p:sp>
       <p:pic>
         <p:nvPicPr>
-          <p:cNvPr id="8" name="Immagine 7" descr="supportresistance.jpg"/>
+          <p:cNvPr id="4" name="Immagine 3" descr="SP2009.jpg"/>
           <p:cNvPicPr>
             <a:picLocks noChangeAspect="1"/>
           </p:cNvPicPr>
@@ -6282,8 +6396,8 @@
         </p:blipFill>
         <p:spPr>
           <a:xfrm>
-            <a:off x="2283309" y="2872182"/>
-            <a:ext cx="4657725" cy="2752725"/>
+            <a:off x="2082800" y="2379185"/>
+            <a:ext cx="4965700" cy="3568700"/>
           </a:xfrm>
           <a:prstGeom prst="rect">
             <a:avLst/>
@@ -7846,7 +7960,7 @@
                 <a:latin typeface="Avenir Light"/>
                 <a:cs typeface="Avenir Light"/>
               </a:rPr>
-              <a:t>fluctuation</a:t>
+              <a:t>movement</a:t>
             </a:r>
             <a:r>
               <a:rPr lang="it-IT" sz="1600" dirty="0" smtClean="0">
@@ -8207,7 +8321,7 @@
       </p:sp>
       <p:pic>
         <p:nvPicPr>
-          <p:cNvPr id="7" name="Immagine 6" descr="supportresistance.jpg"/>
+          <p:cNvPr id="4" name="Immagine 3" descr="SP2009.png"/>
           <p:cNvPicPr>
             <a:picLocks noChangeAspect="1"/>
           </p:cNvPicPr>
@@ -8227,8 +8341,8 @@
         </p:blipFill>
         <p:spPr>
           <a:xfrm>
-            <a:off x="4415451" y="1813775"/>
-            <a:ext cx="4657725" cy="2752725"/>
+            <a:off x="5330365" y="2581245"/>
+            <a:ext cx="3475990" cy="2498090"/>
           </a:xfrm>
           <a:prstGeom prst="rect">
             <a:avLst/>
@@ -8343,8 +8457,8 @@
         </p:nvSpPr>
         <p:spPr>
           <a:xfrm>
-            <a:off x="673503" y="683153"/>
-            <a:ext cx="7735658" cy="4964679"/>
+            <a:off x="1193036" y="683153"/>
+            <a:ext cx="6735025" cy="4964679"/>
           </a:xfrm>
           <a:prstGeom prst="rect">
             <a:avLst/>
@@ -8573,6 +8687,16 @@
           <a:p>
             <a:pPr algn="just"/>
             <a:r>
+              <a:rPr lang="it-IT" sz="1600" dirty="0" smtClean="0">
+                <a:solidFill>
+                  <a:srgbClr val="FFFFFF"/>
+                </a:solidFill>
+                <a:latin typeface="Avenir Light"/>
+                <a:cs typeface="Avenir Light"/>
+              </a:rPr>
+              <a:t>An </a:t>
+            </a:r>
+            <a:r>
               <a:rPr lang="it-IT" sz="1600" dirty="0" err="1" smtClean="0">
                 <a:solidFill>
                   <a:srgbClr val="FFFFFF"/>
@@ -8580,7 +8704,7 @@
                 <a:latin typeface="Avenir Light"/>
                 <a:cs typeface="Avenir Light"/>
               </a:rPr>
-              <a:t>Customized</a:t>
+              <a:t>Indicator</a:t>
             </a:r>
             <a:r>
               <a:rPr lang="it-IT" sz="1600" dirty="0" smtClean="0">
@@ -8590,6 +8714,106 @@
                 <a:latin typeface="Avenir Light"/>
                 <a:cs typeface="Avenir Light"/>
               </a:rPr>
+              <a:t> I </a:t>
+            </a:r>
+            <a:r>
+              <a:rPr lang="it-IT" sz="1600" dirty="0" err="1" smtClean="0">
+                <a:solidFill>
+                  <a:srgbClr val="FFFFFF"/>
+                </a:solidFill>
+                <a:latin typeface="Avenir Light"/>
+                <a:cs typeface="Avenir Light"/>
+              </a:rPr>
+              <a:t>developed</a:t>
+            </a:r>
+            <a:r>
+              <a:rPr lang="it-IT" sz="1600" dirty="0" smtClean="0">
+                <a:solidFill>
+                  <a:srgbClr val="FFFFFF"/>
+                </a:solidFill>
+                <a:latin typeface="Avenir Light"/>
+                <a:cs typeface="Avenir Light"/>
+              </a:rPr>
+              <a:t> to </a:t>
+            </a:r>
+            <a:r>
+              <a:rPr lang="it-IT" sz="1600" dirty="0" err="1" smtClean="0">
+                <a:solidFill>
+                  <a:srgbClr val="FFFFFF"/>
+                </a:solidFill>
+                <a:latin typeface="Avenir Light"/>
+                <a:cs typeface="Avenir Light"/>
+              </a:rPr>
+              <a:t>measure</a:t>
+            </a:r>
+            <a:r>
+              <a:rPr lang="it-IT" sz="1600" dirty="0" smtClean="0">
+                <a:solidFill>
+                  <a:srgbClr val="FFFFFF"/>
+                </a:solidFill>
+                <a:latin typeface="Avenir Light"/>
+                <a:cs typeface="Avenir Light"/>
+              </a:rPr>
+              <a:t> the </a:t>
+            </a:r>
+            <a:r>
+              <a:rPr lang="it-IT" sz="1600" dirty="0" err="1" smtClean="0">
+                <a:solidFill>
+                  <a:srgbClr val="FFFFFF"/>
+                </a:solidFill>
+                <a:latin typeface="Avenir Light"/>
+                <a:cs typeface="Avenir Light"/>
+              </a:rPr>
+              <a:t>distance</a:t>
+            </a:r>
+            <a:r>
+              <a:rPr lang="it-IT" sz="1600" dirty="0" smtClean="0">
+                <a:solidFill>
+                  <a:srgbClr val="FFFFFF"/>
+                </a:solidFill>
+                <a:latin typeface="Avenir Light"/>
+                <a:cs typeface="Avenir Light"/>
+              </a:rPr>
+              <a:t> (in %) </a:t>
+            </a:r>
+            <a:r>
+              <a:rPr lang="it-IT" sz="1600" dirty="0" err="1" smtClean="0">
+                <a:solidFill>
+                  <a:srgbClr val="FFFFFF"/>
+                </a:solidFill>
+                <a:latin typeface="Avenir Light"/>
+                <a:cs typeface="Avenir Light"/>
+              </a:rPr>
+              <a:t>between</a:t>
+            </a:r>
+            <a:r>
+              <a:rPr lang="it-IT" sz="1600" dirty="0" smtClean="0">
+                <a:solidFill>
+                  <a:srgbClr val="FFFFFF"/>
+                </a:solidFill>
+                <a:latin typeface="Avenir Light"/>
+                <a:cs typeface="Avenir Light"/>
+              </a:rPr>
+              <a:t> the </a:t>
+            </a:r>
+            <a:r>
+              <a:rPr lang="it-IT" sz="1600" dirty="0" err="1" smtClean="0">
+                <a:solidFill>
+                  <a:srgbClr val="FFFFFF"/>
+                </a:solidFill>
+                <a:latin typeface="Avenir Light"/>
+                <a:cs typeface="Avenir Light"/>
+              </a:rPr>
+              <a:t>current</a:t>
+            </a:r>
+            <a:r>
+              <a:rPr lang="it-IT" sz="1600" dirty="0" smtClean="0">
+                <a:solidFill>
+                  <a:srgbClr val="FFFFFF"/>
+                </a:solidFill>
+                <a:latin typeface="Avenir Light"/>
+                <a:cs typeface="Avenir Light"/>
+              </a:rPr>
               <a:t> </a:t>
             </a:r>
             <a:r>
@@ -8600,7 +8824,7 @@
                 <a:latin typeface="Avenir Light"/>
                 <a:cs typeface="Avenir Light"/>
               </a:rPr>
-              <a:t>indicator</a:t>
+              <a:t>price</a:t>
             </a:r>
             <a:r>
               <a:rPr lang="it-IT" sz="1600" dirty="0" smtClean="0">
@@ -8610,6 +8834,86 @@
                 <a:latin typeface="Avenir Light"/>
                 <a:cs typeface="Avenir Light"/>
               </a:rPr>
+              <a:t> and the </a:t>
+            </a:r>
+            <a:r>
+              <a:rPr lang="it-IT" sz="1600" dirty="0" err="1" smtClean="0">
+                <a:solidFill>
+                  <a:srgbClr val="FFFFFF"/>
+                </a:solidFill>
+                <a:latin typeface="Avenir Light"/>
+                <a:cs typeface="Avenir Light"/>
+              </a:rPr>
+              <a:t>most</a:t>
+            </a:r>
+            <a:r>
+              <a:rPr lang="it-IT" sz="1600" dirty="0" smtClean="0">
+                <a:solidFill>
+                  <a:srgbClr val="FFFFFF"/>
+                </a:solidFill>
+                <a:latin typeface="Avenir Light"/>
+                <a:cs typeface="Avenir Light"/>
+              </a:rPr>
+              <a:t> “</a:t>
+            </a:r>
+            <a:r>
+              <a:rPr lang="it-IT" sz="1600" dirty="0" err="1" smtClean="0">
+                <a:solidFill>
+                  <a:srgbClr val="FFFFFF"/>
+                </a:solidFill>
+                <a:latin typeface="Avenir Light"/>
+                <a:cs typeface="Avenir Light"/>
+              </a:rPr>
+              <a:t>crowded</a:t>
+            </a:r>
+            <a:r>
+              <a:rPr lang="it-IT" sz="1600" dirty="0" smtClean="0">
+                <a:solidFill>
+                  <a:srgbClr val="FFFFFF"/>
+                </a:solidFill>
+                <a:latin typeface="Avenir Light"/>
+                <a:cs typeface="Avenir Light"/>
+              </a:rPr>
+              <a:t>” </a:t>
+            </a:r>
+            <a:r>
+              <a:rPr lang="it-IT" sz="1600" dirty="0" err="1" smtClean="0">
+                <a:solidFill>
+                  <a:srgbClr val="FFFFFF"/>
+                </a:solidFill>
+                <a:latin typeface="Avenir Light"/>
+                <a:cs typeface="Avenir Light"/>
+              </a:rPr>
+              <a:t>options</a:t>
+            </a:r>
+            <a:r>
+              <a:rPr lang="it-IT" sz="1600" dirty="0" smtClean="0">
+                <a:solidFill>
+                  <a:srgbClr val="FFFFFF"/>
+                </a:solidFill>
+                <a:latin typeface="Avenir Light"/>
+                <a:cs typeface="Avenir Light"/>
+              </a:rPr>
+              <a:t> strikes, </a:t>
+            </a:r>
+            <a:r>
+              <a:rPr lang="it-IT" sz="1600" dirty="0" err="1" smtClean="0">
+                <a:solidFill>
+                  <a:srgbClr val="FFFFFF"/>
+                </a:solidFill>
+                <a:latin typeface="Avenir Light"/>
+                <a:cs typeface="Avenir Light"/>
+              </a:rPr>
+              <a:t>that</a:t>
+            </a:r>
+            <a:r>
+              <a:rPr lang="it-IT" sz="1600" dirty="0" smtClean="0">
+                <a:solidFill>
+                  <a:srgbClr val="FFFFFF"/>
+                </a:solidFill>
+                <a:latin typeface="Avenir Light"/>
+                <a:cs typeface="Avenir Light"/>
+              </a:rPr>
               <a:t> </a:t>
             </a:r>
             <a:r>
@@ -8620,7 +8924,7 @@
                 <a:latin typeface="Avenir Light"/>
                 <a:cs typeface="Avenir Light"/>
               </a:rPr>
-              <a:t>that</a:t>
+              <a:t>tend</a:t>
             </a:r>
             <a:r>
               <a:rPr lang="it-IT" sz="1600" dirty="0" smtClean="0">
@@ -8630,6 +8934,46 @@
                 <a:latin typeface="Avenir Light"/>
                 <a:cs typeface="Avenir Light"/>
               </a:rPr>
+              <a:t> to </a:t>
+            </a:r>
+            <a:r>
+              <a:rPr lang="it-IT" sz="1600" dirty="0" err="1" smtClean="0">
+                <a:solidFill>
+                  <a:srgbClr val="FFFFFF"/>
+                </a:solidFill>
+                <a:latin typeface="Avenir Light"/>
+                <a:cs typeface="Avenir Light"/>
+              </a:rPr>
+              <a:t>attract</a:t>
+            </a:r>
+            <a:r>
+              <a:rPr lang="it-IT" sz="1600" dirty="0" smtClean="0">
+                <a:solidFill>
+                  <a:srgbClr val="FFFFFF"/>
+                </a:solidFill>
+                <a:latin typeface="Avenir Light"/>
+                <a:cs typeface="Avenir Light"/>
+              </a:rPr>
+              <a:t> the </a:t>
+            </a:r>
+            <a:r>
+              <a:rPr lang="it-IT" sz="1600" dirty="0" err="1" smtClean="0">
+                <a:solidFill>
+                  <a:srgbClr val="FFFFFF"/>
+                </a:solidFill>
+                <a:latin typeface="Avenir Light"/>
+                <a:cs typeface="Avenir Light"/>
+              </a:rPr>
+              <a:t>price</a:t>
+            </a:r>
+            <a:r>
+              <a:rPr lang="it-IT" sz="1600" dirty="0" smtClean="0">
+                <a:solidFill>
+                  <a:srgbClr val="FFFFFF"/>
+                </a:solidFill>
+                <a:latin typeface="Avenir Light"/>
+                <a:cs typeface="Avenir Light"/>
+              </a:rPr>
               <a:t> </a:t>
             </a:r>
             <a:r>
@@ -8640,7 +8984,7 @@
                 <a:latin typeface="Avenir Light"/>
                 <a:cs typeface="Avenir Light"/>
               </a:rPr>
-              <a:t>measures</a:t>
+              <a:t>when</a:t>
             </a:r>
             <a:r>
               <a:rPr lang="it-IT" sz="1600" dirty="0" smtClean="0">
@@ -8650,227 +8994,7 @@
                 <a:latin typeface="Avenir Light"/>
                 <a:cs typeface="Avenir Light"/>
               </a:rPr>
-              <a:t> the </a:t>
-            </a:r>
-            <a:r>
-              <a:rPr lang="it-IT" sz="1600" dirty="0" err="1" smtClean="0">
-                <a:solidFill>
-                  <a:srgbClr val="FFFFFF"/>
-                </a:solidFill>
-                <a:latin typeface="Avenir Light"/>
-                <a:cs typeface="Avenir Light"/>
-              </a:rPr>
-              <a:t>distance</a:t>
-            </a:r>
-            <a:r>
-              <a:rPr lang="it-IT" sz="1600" dirty="0" smtClean="0">
-                <a:solidFill>
-                  <a:srgbClr val="FFFFFF"/>
-                </a:solidFill>
-                <a:latin typeface="Avenir Light"/>
-                <a:cs typeface="Avenir Light"/>
-              </a:rPr>
-              <a:t> (in %) </a:t>
-            </a:r>
-            <a:r>
-              <a:rPr lang="it-IT" sz="1600" dirty="0" err="1" smtClean="0">
-                <a:solidFill>
-                  <a:srgbClr val="FFFFFF"/>
-                </a:solidFill>
-                <a:latin typeface="Avenir Light"/>
-                <a:cs typeface="Avenir Light"/>
-              </a:rPr>
-              <a:t>between</a:t>
-            </a:r>
-            <a:r>
-              <a:rPr lang="it-IT" sz="1600" dirty="0" smtClean="0">
-                <a:solidFill>
-                  <a:srgbClr val="FFFFFF"/>
-                </a:solidFill>
-                <a:latin typeface="Avenir Light"/>
-                <a:cs typeface="Avenir Light"/>
-              </a:rPr>
-              <a:t> the </a:t>
-            </a:r>
-            <a:r>
-              <a:rPr lang="it-IT" sz="1600" dirty="0" err="1" smtClean="0">
-                <a:solidFill>
-                  <a:srgbClr val="FFFFFF"/>
-                </a:solidFill>
-                <a:latin typeface="Avenir Light"/>
-                <a:cs typeface="Avenir Light"/>
-              </a:rPr>
-              <a:t>current</a:t>
-            </a:r>
-            <a:r>
-              <a:rPr lang="it-IT" sz="1600" dirty="0" smtClean="0">
-                <a:solidFill>
-                  <a:srgbClr val="FFFFFF"/>
-                </a:solidFill>
-                <a:latin typeface="Avenir Light"/>
-                <a:cs typeface="Avenir Light"/>
-              </a:rPr>
               <a:t> </a:t>
-            </a:r>
-            <a:r>
-              <a:rPr lang="it-IT" sz="1600" dirty="0" err="1" smtClean="0">
-                <a:solidFill>
-                  <a:srgbClr val="FFFFFF"/>
-                </a:solidFill>
-                <a:latin typeface="Avenir Light"/>
-                <a:cs typeface="Avenir Light"/>
-              </a:rPr>
-              <a:t>price</a:t>
-            </a:r>
-            <a:r>
-              <a:rPr lang="it-IT" sz="1600" dirty="0" smtClean="0">
-                <a:solidFill>
-                  <a:srgbClr val="FFFFFF"/>
-                </a:solidFill>
-                <a:latin typeface="Avenir Light"/>
-                <a:cs typeface="Avenir Light"/>
-              </a:rPr>
-              <a:t> and the </a:t>
-            </a:r>
-            <a:r>
-              <a:rPr lang="it-IT" sz="1600" dirty="0" err="1" smtClean="0">
-                <a:solidFill>
-                  <a:srgbClr val="FFFFFF"/>
-                </a:solidFill>
-                <a:latin typeface="Avenir Light"/>
-                <a:cs typeface="Avenir Light"/>
-              </a:rPr>
-              <a:t>most</a:t>
-            </a:r>
-            <a:r>
-              <a:rPr lang="it-IT" sz="1600" dirty="0" smtClean="0">
-                <a:solidFill>
-                  <a:srgbClr val="FFFFFF"/>
-                </a:solidFill>
-                <a:latin typeface="Avenir Light"/>
-                <a:cs typeface="Avenir Light"/>
-              </a:rPr>
-              <a:t> “</a:t>
-            </a:r>
-            <a:r>
-              <a:rPr lang="it-IT" sz="1600" dirty="0" err="1" smtClean="0">
-                <a:solidFill>
-                  <a:srgbClr val="FFFFFF"/>
-                </a:solidFill>
-                <a:latin typeface="Avenir Light"/>
-                <a:cs typeface="Avenir Light"/>
-              </a:rPr>
-              <a:t>crowded</a:t>
-            </a:r>
-            <a:r>
-              <a:rPr lang="it-IT" sz="1600" dirty="0" smtClean="0">
-                <a:solidFill>
-                  <a:srgbClr val="FFFFFF"/>
-                </a:solidFill>
-                <a:latin typeface="Avenir Light"/>
-                <a:cs typeface="Avenir Light"/>
-              </a:rPr>
-              <a:t>” option strikes, </a:t>
-            </a:r>
-            <a:r>
-              <a:rPr lang="it-IT" sz="1600" dirty="0" err="1" smtClean="0">
-                <a:solidFill>
-                  <a:srgbClr val="FFFFFF"/>
-                </a:solidFill>
-                <a:latin typeface="Avenir Light"/>
-                <a:cs typeface="Avenir Light"/>
-              </a:rPr>
-              <a:t>where</a:t>
-            </a:r>
-            <a:r>
-              <a:rPr lang="it-IT" sz="1600" dirty="0" smtClean="0">
-                <a:solidFill>
-                  <a:srgbClr val="FFFFFF"/>
-                </a:solidFill>
-                <a:latin typeface="Avenir Light"/>
-                <a:cs typeface="Avenir Light"/>
-              </a:rPr>
-              <a:t> the </a:t>
-            </a:r>
-            <a:r>
-              <a:rPr lang="it-IT" sz="1600" dirty="0" err="1" smtClean="0">
-                <a:solidFill>
-                  <a:srgbClr val="FFFFFF"/>
-                </a:solidFill>
-                <a:latin typeface="Avenir Light"/>
-                <a:cs typeface="Avenir Light"/>
-              </a:rPr>
-              <a:t>price</a:t>
-            </a:r>
-            <a:r>
-              <a:rPr lang="it-IT" sz="1600" dirty="0" smtClean="0">
-                <a:solidFill>
-                  <a:srgbClr val="FFFFFF"/>
-                </a:solidFill>
-                <a:latin typeface="Avenir Light"/>
-                <a:cs typeface="Avenir Light"/>
-              </a:rPr>
-              <a:t> </a:t>
-            </a:r>
-            <a:r>
-              <a:rPr lang="it-IT" sz="1600" dirty="0" err="1" smtClean="0">
-                <a:solidFill>
-                  <a:srgbClr val="FFFFFF"/>
-                </a:solidFill>
-                <a:latin typeface="Avenir Light"/>
-                <a:cs typeface="Avenir Light"/>
-              </a:rPr>
-              <a:t>tends</a:t>
-            </a:r>
-            <a:r>
-              <a:rPr lang="it-IT" sz="1600" dirty="0" smtClean="0">
-                <a:solidFill>
-                  <a:srgbClr val="FFFFFF"/>
-                </a:solidFill>
-                <a:latin typeface="Avenir Light"/>
-                <a:cs typeface="Avenir Light"/>
-              </a:rPr>
-              <a:t> to </a:t>
-            </a:r>
-            <a:r>
-              <a:rPr lang="it-IT" sz="1600" dirty="0" err="1" smtClean="0">
-                <a:solidFill>
-                  <a:srgbClr val="FFFFFF"/>
-                </a:solidFill>
-                <a:latin typeface="Avenir Light"/>
-                <a:cs typeface="Avenir Light"/>
-              </a:rPr>
-              <a:t>move</a:t>
-            </a:r>
-            <a:r>
-              <a:rPr lang="it-IT" sz="1600" dirty="0" smtClean="0">
-                <a:solidFill>
-                  <a:srgbClr val="FFFFFF"/>
-                </a:solidFill>
-                <a:latin typeface="Avenir Light"/>
-                <a:cs typeface="Avenir Light"/>
-              </a:rPr>
-              <a:t> </a:t>
-            </a:r>
-            <a:r>
-              <a:rPr lang="it-IT" sz="1600" dirty="0" err="1" smtClean="0">
-                <a:solidFill>
-                  <a:srgbClr val="FFFFFF"/>
-                </a:solidFill>
-                <a:latin typeface="Avenir Light"/>
-                <a:cs typeface="Avenir Light"/>
-              </a:rPr>
-              <a:t>when</a:t>
-            </a:r>
-            <a:r>
-              <a:rPr lang="it-IT" sz="1600" dirty="0" smtClean="0">
-                <a:solidFill>
-                  <a:srgbClr val="FFFFFF"/>
-                </a:solidFill>
-                <a:latin typeface="Avenir Light"/>
-                <a:cs typeface="Avenir Light"/>
-              </a:rPr>
-              <a:t> the </a:t>
             </a:r>
             <a:r>
               <a:rPr lang="it-IT" sz="1600" dirty="0" err="1" smtClean="0">
@@ -9023,7 +9147,7 @@
                 <a:latin typeface="Avenir Light"/>
                 <a:cs typeface="Avenir Light"/>
               </a:rPr>
-              <a:t>: </a:t>
+              <a:t>, and </a:t>
             </a:r>
             <a:r>
               <a:rPr lang="it-IT" sz="1600" dirty="0" err="1" smtClean="0">
@@ -9033,7 +9157,17 @@
                 <a:latin typeface="Avenir Light"/>
                 <a:cs typeface="Avenir Light"/>
               </a:rPr>
-              <a:t>when</a:t>
+              <a:t>matche</a:t>
+            </a:r>
+            <a:r>
+              <a:rPr lang="it-IT" sz="1600" dirty="0" err="1" smtClean="0">
+                <a:solidFill>
+                  <a:srgbClr val="FFFFFF"/>
+                </a:solidFill>
+                <a:latin typeface="Avenir Light"/>
+                <a:cs typeface="Avenir Light"/>
+              </a:rPr>
+              <a:t>d</a:t>
             </a:r>
             <a:r>
               <a:rPr lang="it-IT" sz="1600" dirty="0" smtClean="0">
@@ -9043,7 +9177,7 @@
                 <a:latin typeface="Avenir Light"/>
                 <a:cs typeface="Avenir Light"/>
               </a:rPr>
-              <a:t> the </a:t>
+              <a:t> with the </a:t>
             </a:r>
             <a:r>
               <a:rPr lang="it-IT" sz="1600" dirty="0" err="1" smtClean="0">
@@ -9053,7 +9187,7 @@
                 <a:latin typeface="Avenir Light"/>
                 <a:cs typeface="Avenir Light"/>
               </a:rPr>
-              <a:t>underlying</a:t>
+              <a:t>predicted</a:t>
             </a:r>
             <a:r>
               <a:rPr lang="it-IT" sz="1600" dirty="0" smtClean="0">
@@ -9093,392 +9227,108 @@
                 <a:latin typeface="Avenir Light"/>
                 <a:cs typeface="Avenir Light"/>
               </a:rPr>
-              <a:t>lays</a:t>
-            </a:r>
-            <a:r>
-              <a:rPr lang="it-IT" sz="1600" dirty="0" smtClean="0">
-                <a:solidFill>
-                  <a:srgbClr val="FFFFFF"/>
-                </a:solidFill>
-                <a:latin typeface="Avenir Light"/>
-                <a:cs typeface="Avenir Light"/>
-              </a:rPr>
-              <a:t> </a:t>
-            </a:r>
-            <a:r>
-              <a:rPr lang="it-IT" sz="1600" dirty="0" err="1" smtClean="0">
-                <a:solidFill>
-                  <a:srgbClr val="FFFFFF"/>
-                </a:solidFill>
-                <a:latin typeface="Avenir Light"/>
-                <a:cs typeface="Avenir Light"/>
-              </a:rPr>
-              <a:t>outside</a:t>
-            </a:r>
-            <a:r>
-              <a:rPr lang="it-IT" sz="1600" dirty="0" smtClean="0">
-                <a:solidFill>
-                  <a:srgbClr val="FFFFFF"/>
-                </a:solidFill>
-                <a:latin typeface="Avenir Light"/>
-                <a:cs typeface="Avenir Light"/>
-              </a:rPr>
-              <a:t> the </a:t>
-            </a:r>
-            <a:r>
-              <a:rPr lang="it-IT" sz="1600" dirty="0" err="1" smtClean="0">
-                <a:solidFill>
-                  <a:srgbClr val="FFFFFF"/>
-                </a:solidFill>
-                <a:latin typeface="Avenir Light"/>
-                <a:cs typeface="Avenir Light"/>
-              </a:rPr>
-              <a:t>predicted</a:t>
-            </a:r>
-            <a:r>
-              <a:rPr lang="it-IT" sz="1600" dirty="0" smtClean="0">
-                <a:solidFill>
-                  <a:srgbClr val="FFFFFF"/>
-                </a:solidFill>
-                <a:latin typeface="Avenir Light"/>
-                <a:cs typeface="Avenir Light"/>
-              </a:rPr>
-              <a:t> </a:t>
-            </a:r>
-            <a:r>
-              <a:rPr lang="it-IT" sz="1600" dirty="0" err="1" smtClean="0">
-                <a:solidFill>
-                  <a:srgbClr val="FFFFFF"/>
-                </a:solidFill>
-                <a:latin typeface="Avenir Light"/>
-                <a:cs typeface="Avenir Light"/>
-              </a:rPr>
-              <a:t>movement</a:t>
-            </a:r>
-            <a:r>
-              <a:rPr lang="it-IT" sz="1600" dirty="0" smtClean="0">
-                <a:solidFill>
-                  <a:srgbClr val="FFFFFF"/>
-                </a:solidFill>
-                <a:latin typeface="Avenir Light"/>
-                <a:cs typeface="Avenir Light"/>
-              </a:rPr>
-              <a:t> </a:t>
-            </a:r>
-            <a:r>
-              <a:rPr lang="it-IT" sz="1600" dirty="0" err="1" smtClean="0">
-                <a:solidFill>
-                  <a:srgbClr val="FFFFFF"/>
-                </a:solidFill>
-                <a:latin typeface="Avenir Light"/>
-                <a:cs typeface="Avenir Light"/>
-              </a:rPr>
               <a:t>range</a:t>
             </a:r>
-            <a:r>
-              <a:rPr lang="it-IT" sz="1600" dirty="0" smtClean="0">
-                <a:solidFill>
-                  <a:srgbClr val="FFFFFF"/>
-                </a:solidFill>
-                <a:latin typeface="Avenir Light"/>
-                <a:cs typeface="Avenir Light"/>
-              </a:rPr>
-              <a:t>, and the </a:t>
-            </a:r>
-            <a:r>
-              <a:rPr lang="it-IT" sz="1600" dirty="0" err="1" smtClean="0">
-                <a:solidFill>
-                  <a:srgbClr val="FFFFFF"/>
-                </a:solidFill>
-                <a:latin typeface="Avenir Light"/>
-                <a:cs typeface="Avenir Light"/>
-              </a:rPr>
-              <a:t>indicator</a:t>
-            </a:r>
-            <a:r>
-              <a:rPr lang="it-IT" sz="1600" dirty="0" smtClean="0">
-                <a:solidFill>
-                  <a:srgbClr val="FFFFFF"/>
-                </a:solidFill>
-                <a:latin typeface="Avenir Light"/>
-                <a:cs typeface="Avenir Light"/>
-              </a:rPr>
-              <a:t> </a:t>
-            </a:r>
-            <a:r>
-              <a:rPr lang="it-IT" sz="1600" dirty="0" err="1" smtClean="0">
-                <a:solidFill>
-                  <a:srgbClr val="FFFFFF"/>
-                </a:solidFill>
-                <a:latin typeface="Avenir Light"/>
-                <a:cs typeface="Avenir Light"/>
-              </a:rPr>
-              <a:t>point</a:t>
-            </a:r>
-            <a:r>
-              <a:rPr lang="it-IT" sz="1600" dirty="0" smtClean="0">
-                <a:solidFill>
-                  <a:srgbClr val="FFFFFF"/>
-                </a:solidFill>
-                <a:latin typeface="Avenir Light"/>
-                <a:cs typeface="Avenir Light"/>
-              </a:rPr>
-              <a:t> to the middle of the </a:t>
-            </a:r>
-            <a:r>
-              <a:rPr lang="it-IT" sz="1600" dirty="0" err="1" smtClean="0">
-                <a:solidFill>
-                  <a:srgbClr val="FFFFFF"/>
-                </a:solidFill>
-                <a:latin typeface="Avenir Light"/>
-                <a:cs typeface="Avenir Light"/>
-              </a:rPr>
-              <a:t>predicted</a:t>
-            </a:r>
-            <a:r>
-              <a:rPr lang="it-IT" sz="1600" dirty="0" smtClean="0">
-                <a:solidFill>
-                  <a:srgbClr val="FFFFFF"/>
-                </a:solidFill>
-                <a:latin typeface="Avenir Light"/>
-                <a:cs typeface="Avenir Light"/>
-              </a:rPr>
-              <a:t> </a:t>
-            </a:r>
-            <a:r>
-              <a:rPr lang="it-IT" sz="1600" dirty="0" err="1" smtClean="0">
-                <a:solidFill>
-                  <a:srgbClr val="FFFFFF"/>
-                </a:solidFill>
-                <a:latin typeface="Avenir Light"/>
-                <a:cs typeface="Avenir Light"/>
-              </a:rPr>
-              <a:t>range</a:t>
-            </a:r>
-            <a:r>
-              <a:rPr lang="it-IT" sz="1600" dirty="0" smtClean="0">
-                <a:solidFill>
-                  <a:srgbClr val="FFFFFF"/>
-                </a:solidFill>
-                <a:latin typeface="Avenir Light"/>
-                <a:cs typeface="Avenir Light"/>
-              </a:rPr>
-              <a:t>, with a </a:t>
-            </a:r>
-            <a:r>
-              <a:rPr lang="it-IT" sz="1600" dirty="0" err="1" smtClean="0">
-                <a:solidFill>
-                  <a:srgbClr val="FFFFFF"/>
-                </a:solidFill>
-                <a:latin typeface="Avenir Light"/>
-                <a:cs typeface="Avenir Light"/>
-              </a:rPr>
-              <a:t>value</a:t>
-            </a:r>
-            <a:r>
-              <a:rPr lang="it-IT" sz="1600" dirty="0" smtClean="0">
-                <a:solidFill>
-                  <a:srgbClr val="FFFFFF"/>
-                </a:solidFill>
-                <a:latin typeface="Avenir Light"/>
-                <a:cs typeface="Avenir Light"/>
-              </a:rPr>
-              <a:t> </a:t>
-            </a:r>
-            <a:r>
-              <a:rPr lang="it-IT" sz="1600" dirty="0" err="1" smtClean="0">
-                <a:solidFill>
-                  <a:srgbClr val="FFFFFF"/>
-                </a:solidFill>
-                <a:latin typeface="Avenir Light"/>
-                <a:cs typeface="Avenir Light"/>
-              </a:rPr>
-              <a:t>bigger</a:t>
-            </a:r>
-            <a:r>
-              <a:rPr lang="it-IT" sz="1600" dirty="0" smtClean="0">
-                <a:solidFill>
-                  <a:srgbClr val="FFFFFF"/>
-                </a:solidFill>
-                <a:latin typeface="Avenir Light"/>
-                <a:cs typeface="Avenir Light"/>
-              </a:rPr>
-              <a:t> </a:t>
-            </a:r>
-            <a:r>
-              <a:rPr lang="it-IT" sz="1600" dirty="0" err="1" smtClean="0">
-                <a:solidFill>
-                  <a:srgbClr val="FFFFFF"/>
-                </a:solidFill>
-                <a:latin typeface="Avenir Light"/>
-                <a:cs typeface="Avenir Light"/>
-              </a:rPr>
-              <a:t>than</a:t>
-            </a:r>
-            <a:r>
-              <a:rPr lang="it-IT" sz="1600" dirty="0" smtClean="0">
-                <a:solidFill>
-                  <a:srgbClr val="FFFFFF"/>
-                </a:solidFill>
-                <a:latin typeface="Avenir Light"/>
-                <a:cs typeface="Avenir Light"/>
-              </a:rPr>
-              <a:t> </a:t>
-            </a:r>
-            <a:r>
-              <a:rPr lang="it-IT" sz="1600" dirty="0" err="1" smtClean="0">
-                <a:solidFill>
-                  <a:srgbClr val="FFFFFF"/>
-                </a:solidFill>
-                <a:latin typeface="Avenir Light"/>
-                <a:cs typeface="Avenir Light"/>
-              </a:rPr>
-              <a:t>one</a:t>
-            </a:r>
-            <a:r>
-              <a:rPr lang="it-IT" sz="1600" dirty="0" smtClean="0">
-                <a:solidFill>
-                  <a:srgbClr val="FFFFFF"/>
-                </a:solidFill>
-                <a:latin typeface="Avenir Light"/>
-                <a:cs typeface="Avenir Light"/>
-              </a:rPr>
-              <a:t>, </a:t>
-            </a:r>
-            <a:r>
-              <a:rPr lang="it-IT" sz="1600" dirty="0" err="1" smtClean="0">
-                <a:solidFill>
-                  <a:srgbClr val="FFFFFF"/>
-                </a:solidFill>
-                <a:latin typeface="Avenir Light"/>
-                <a:cs typeface="Avenir Light"/>
-              </a:rPr>
-              <a:t>that’s</a:t>
-            </a:r>
-            <a:r>
-              <a:rPr lang="it-IT" sz="1600" dirty="0" smtClean="0">
-                <a:solidFill>
-                  <a:srgbClr val="FFFFFF"/>
-                </a:solidFill>
-                <a:latin typeface="Avenir Light"/>
-                <a:cs typeface="Avenir Light"/>
-              </a:rPr>
-              <a:t> the right timing to </a:t>
-            </a:r>
-            <a:r>
-              <a:rPr lang="it-IT" sz="1600" dirty="0" err="1" smtClean="0">
-                <a:solidFill>
-                  <a:srgbClr val="FFFFFF"/>
-                </a:solidFill>
-                <a:latin typeface="Avenir Light"/>
-                <a:cs typeface="Avenir Light"/>
-              </a:rPr>
-              <a:t>buy</a:t>
-            </a:r>
-            <a:r>
-              <a:rPr lang="it-IT" sz="1600" dirty="0" smtClean="0">
-                <a:solidFill>
-                  <a:srgbClr val="FFFFFF"/>
-                </a:solidFill>
-                <a:latin typeface="Avenir Light"/>
-                <a:cs typeface="Avenir Light"/>
-              </a:rPr>
-              <a:t> or sell </a:t>
-            </a:r>
-            <a:r>
-              <a:rPr lang="it-IT" sz="1600" dirty="0" err="1" smtClean="0">
-                <a:solidFill>
-                  <a:srgbClr val="FFFFFF"/>
-                </a:solidFill>
-                <a:latin typeface="Avenir Light"/>
-                <a:cs typeface="Avenir Light"/>
-              </a:rPr>
-              <a:t>options</a:t>
-            </a:r>
-            <a:r>
-              <a:rPr lang="it-IT" sz="1600" dirty="0">
-                <a:solidFill>
-                  <a:srgbClr val="FFFFFF"/>
-                </a:solidFill>
-                <a:latin typeface="Avenir Light"/>
-                <a:cs typeface="Avenir Light"/>
-              </a:rPr>
-              <a:t> </a:t>
-            </a:r>
-            <a:r>
-              <a:rPr lang="it-IT" sz="1600" dirty="0" smtClean="0">
-                <a:solidFill>
-                  <a:srgbClr val="FFFFFF"/>
-                </a:solidFill>
-                <a:latin typeface="Avenir Light"/>
-                <a:cs typeface="Avenir Light"/>
-              </a:rPr>
-              <a:t>to </a:t>
-            </a:r>
-            <a:r>
-              <a:rPr lang="it-IT" sz="1600" dirty="0" err="1" smtClean="0">
-                <a:solidFill>
-                  <a:srgbClr val="FFFFFF"/>
-                </a:solidFill>
-                <a:latin typeface="Avenir Light"/>
-                <a:cs typeface="Avenir Light"/>
-              </a:rPr>
-              <a:t>get</a:t>
-            </a:r>
-            <a:r>
-              <a:rPr lang="it-IT" sz="1600" dirty="0" smtClean="0">
-                <a:solidFill>
-                  <a:srgbClr val="FFFFFF"/>
-                </a:solidFill>
-                <a:latin typeface="Avenir Light"/>
-                <a:cs typeface="Avenir Light"/>
-              </a:rPr>
-              <a:t> the </a:t>
-            </a:r>
-            <a:r>
-              <a:rPr lang="it-IT" sz="1600" dirty="0" err="1" smtClean="0">
-                <a:solidFill>
-                  <a:srgbClr val="FFFFFF"/>
-                </a:solidFill>
-                <a:latin typeface="Avenir Light"/>
-                <a:cs typeface="Avenir Light"/>
-              </a:rPr>
-              <a:t>most</a:t>
-            </a:r>
-            <a:r>
-              <a:rPr lang="it-IT" sz="1600" dirty="0" smtClean="0">
-                <a:solidFill>
-                  <a:srgbClr val="FFFFFF"/>
-                </a:solidFill>
-                <a:latin typeface="Avenir Light"/>
-                <a:cs typeface="Avenir Light"/>
-              </a:rPr>
-              <a:t> of </a:t>
-            </a:r>
-            <a:r>
-              <a:rPr lang="it-IT" sz="1600" dirty="0" err="1" smtClean="0">
-                <a:solidFill>
-                  <a:srgbClr val="FFFFFF"/>
-                </a:solidFill>
-                <a:latin typeface="Avenir Light"/>
-                <a:cs typeface="Avenir Light"/>
-              </a:rPr>
-              <a:t>expected</a:t>
-            </a:r>
-            <a:r>
-              <a:rPr lang="it-IT" sz="1600" dirty="0" smtClean="0">
-                <a:solidFill>
-                  <a:srgbClr val="FFFFFF"/>
-                </a:solidFill>
-                <a:latin typeface="Avenir Light"/>
-                <a:cs typeface="Avenir Light"/>
-              </a:rPr>
-              <a:t> profit.</a:t>
-            </a:r>
+            <a:endParaRPr lang="it-IT" sz="1600" dirty="0" smtClean="0">
+              <a:solidFill>
+                <a:srgbClr val="FFFFFF"/>
+              </a:solidFill>
+              <a:latin typeface="Avenir Light"/>
+              <a:cs typeface="Avenir Light"/>
+            </a:endParaRPr>
           </a:p>
           <a:p>
             <a:pPr algn="just"/>
             <a:endParaRPr lang="it-IT" sz="1600" dirty="0" smtClean="0">
+              <a:solidFill>
+                <a:srgbClr val="FFFFFF"/>
+              </a:solidFill>
+              <a:latin typeface="Avenir Light"/>
+              <a:cs typeface="Avenir Light"/>
+            </a:endParaRPr>
+          </a:p>
+          <a:p>
+            <a:pPr algn="just"/>
+            <a:endParaRPr lang="it-IT" sz="1600" dirty="0" smtClean="0">
+              <a:solidFill>
+                <a:srgbClr val="FFFFFF"/>
+              </a:solidFill>
+              <a:latin typeface="Avenir Light"/>
+              <a:cs typeface="Avenir Light"/>
+            </a:endParaRPr>
+          </a:p>
+          <a:p>
+            <a:r>
+              <a:rPr lang="it-IT" sz="2000" dirty="0" smtClean="0">
+                <a:solidFill>
+                  <a:srgbClr val="FFFFFF"/>
+                </a:solidFill>
+                <a:latin typeface="Avenir Light"/>
+                <a:cs typeface="Avenir Light"/>
+              </a:rPr>
+              <a:t>For </a:t>
+            </a:r>
+            <a:r>
+              <a:rPr lang="it-IT" sz="2000" dirty="0" err="1" smtClean="0">
+                <a:solidFill>
+                  <a:srgbClr val="FFFFFF"/>
+                </a:solidFill>
+                <a:latin typeface="Avenir Light"/>
+                <a:cs typeface="Avenir Light"/>
+              </a:rPr>
+              <a:t>instance</a:t>
+            </a:r>
+            <a:r>
+              <a:rPr lang="it-IT" sz="2000" dirty="0" smtClean="0">
+                <a:solidFill>
+                  <a:srgbClr val="FFFFFF"/>
+                </a:solidFill>
+                <a:latin typeface="Avenir Light"/>
+                <a:cs typeface="Avenir Light"/>
+              </a:rPr>
+              <a:t> (</a:t>
+            </a:r>
+            <a:r>
+              <a:rPr lang="it-IT" sz="2000" dirty="0" err="1" smtClean="0">
+                <a:solidFill>
+                  <a:srgbClr val="FFFFFF"/>
+                </a:solidFill>
+                <a:latin typeface="Avenir Light"/>
+                <a:cs typeface="Avenir Light"/>
+              </a:rPr>
+              <a:t>remember</a:t>
+            </a:r>
+            <a:r>
+              <a:rPr lang="it-IT" sz="2000" dirty="0" smtClean="0">
+                <a:solidFill>
+                  <a:srgbClr val="FFFFFF"/>
+                </a:solidFill>
+                <a:latin typeface="Avenir Light"/>
+                <a:cs typeface="Avenir Light"/>
+              </a:rPr>
+              <a:t> the first </a:t>
+            </a:r>
+            <a:r>
+              <a:rPr lang="it-IT" sz="2000" dirty="0" err="1" smtClean="0">
+                <a:solidFill>
+                  <a:srgbClr val="FFFFFF"/>
+                </a:solidFill>
+                <a:latin typeface="Avenir Light"/>
+                <a:cs typeface="Avenir Light"/>
+              </a:rPr>
+              <a:t>graph</a:t>
+            </a:r>
+            <a:r>
+              <a:rPr lang="it-IT" sz="2000" dirty="0" smtClean="0">
+                <a:solidFill>
+                  <a:srgbClr val="FFFFFF"/>
+                </a:solidFill>
+                <a:latin typeface="Avenir Light"/>
+                <a:cs typeface="Avenir Light"/>
+              </a:rPr>
+              <a:t>):</a:t>
+            </a:r>
+            <a:endParaRPr lang="it-IT" sz="2000" dirty="0">
               <a:solidFill>
                 <a:srgbClr val="FFFFFF"/>
               </a:solidFill>
@@ -9729,7 +9579,7 @@
         </p:nvSpPr>
         <p:spPr>
           <a:xfrm>
-            <a:off x="987200" y="3132885"/>
+            <a:off x="2004207" y="3967128"/>
             <a:ext cx="1603946" cy="606181"/>
           </a:xfrm>
           <a:prstGeom prst="rect">
@@ -9958,7 +9808,7 @@
         </p:nvSpPr>
         <p:spPr>
           <a:xfrm>
-            <a:off x="2442767" y="2721403"/>
+            <a:off x="3336097" y="3604852"/>
             <a:ext cx="1371600" cy="1371600"/>
           </a:xfrm>
           <a:prstGeom prst="mathMinus">
@@ -9996,7 +9846,7 @@
         </p:nvCxnSpPr>
         <p:spPr>
           <a:xfrm>
-            <a:off x="2714823" y="1751367"/>
+            <a:off x="3588905" y="2993240"/>
             <a:ext cx="1739351" cy="0"/>
           </a:xfrm>
           <a:prstGeom prst="line">
@@ -10026,7 +9876,7 @@
         </p:nvCxnSpPr>
         <p:spPr>
           <a:xfrm>
-            <a:off x="2714823" y="5055549"/>
+            <a:off x="3608153" y="5541948"/>
             <a:ext cx="1640472" cy="0"/>
           </a:xfrm>
           <a:prstGeom prst="line">
@@ -10056,8 +9906,8 @@
         </p:nvSpPr>
         <p:spPr>
           <a:xfrm>
-            <a:off x="3870663" y="1766578"/>
-            <a:ext cx="484632" cy="3288971"/>
+            <a:off x="4763993" y="3021272"/>
+            <a:ext cx="484632" cy="2520676"/>
           </a:xfrm>
           <a:prstGeom prst="upDownArrow">
             <a:avLst/>
@@ -10094,8 +9944,8 @@
         </p:nvSpPr>
         <p:spPr>
           <a:xfrm rot="16200000">
-            <a:off x="2416335" y="2236414"/>
-            <a:ext cx="1424303" cy="484632"/>
+            <a:off x="3486942" y="3313831"/>
+            <a:ext cx="1069749" cy="484632"/>
           </a:xfrm>
           <a:prstGeom prst="stripedRightArrow">
             <a:avLst/>
@@ -10132,8 +9982,8 @@
         </p:nvSpPr>
         <p:spPr>
           <a:xfrm rot="5400000">
-            <a:off x="2416889" y="4101635"/>
-            <a:ext cx="1423195" cy="484632"/>
+            <a:off x="3497553" y="4775369"/>
+            <a:ext cx="1048527" cy="484632"/>
           </a:xfrm>
           <a:prstGeom prst="stripedRightArrow">
             <a:avLst/>
@@ -10172,7 +10022,7 @@
         </p:nvSpPr>
         <p:spPr>
           <a:xfrm>
-            <a:off x="4355295" y="2005836"/>
+            <a:off x="5145955" y="3270628"/>
             <a:ext cx="1747689" cy="1112617"/>
           </a:xfrm>
           <a:prstGeom prst="rect">
@@ -10506,7 +10356,7 @@
         </p:nvSpPr>
         <p:spPr>
           <a:xfrm>
-            <a:off x="2610394" y="1426635"/>
+            <a:off x="3484476" y="2668508"/>
             <a:ext cx="2049372" cy="403904"/>
           </a:xfrm>
           <a:prstGeom prst="rect">
@@ -10764,7 +10614,7 @@
         </p:nvSpPr>
         <p:spPr>
           <a:xfrm>
-            <a:off x="2591146" y="5055549"/>
+            <a:off x="3484476" y="5541948"/>
             <a:ext cx="2058993" cy="403904"/>
           </a:xfrm>
           <a:prstGeom prst="rect">
@@ -11249,9 +11099,9 @@
           <p:nvPr/>
         </p:nvCxnSpPr>
         <p:spPr>
-          <a:xfrm>
-            <a:off x="5700152" y="5544753"/>
-            <a:ext cx="1426233" cy="0"/>
+          <a:xfrm flipV="1">
+            <a:off x="3608153" y="6031152"/>
+            <a:ext cx="4411562" cy="10682"/>
           </a:xfrm>
           <a:prstGeom prst="line">
             <a:avLst/>
@@ -11280,7 +11130,7 @@
         </p:nvSpPr>
         <p:spPr>
           <a:xfrm rot="16200000">
-            <a:off x="5595757" y="4126316"/>
+            <a:off x="6489087" y="4612715"/>
             <a:ext cx="1647903" cy="1188965"/>
           </a:xfrm>
           <a:prstGeom prst="notchedRightArrow">
@@ -11348,7 +11198,7 @@
         </p:nvSpPr>
         <p:spPr>
           <a:xfrm>
-            <a:off x="5539832" y="5555435"/>
+            <a:off x="6433162" y="6041834"/>
             <a:ext cx="1721247" cy="403904"/>
           </a:xfrm>
           <a:prstGeom prst="rect">
@@ -11586,8 +11436,8 @@
         </p:nvSpPr>
         <p:spPr>
           <a:xfrm>
-            <a:off x="6726832" y="4675162"/>
-            <a:ext cx="1922865" cy="403904"/>
+            <a:off x="7620162" y="5161561"/>
+            <a:ext cx="1077643" cy="403904"/>
           </a:xfrm>
           <a:prstGeom prst="rect">
             <a:avLst/>
@@ -11762,17 +11612,7 @@
                 <a:latin typeface="Avenir Light"/>
                 <a:cs typeface="Avenir Light"/>
               </a:rPr>
-              <a:t>5th </a:t>
-            </a:r>
-            <a:r>
-              <a:rPr lang="it-IT" sz="1400" dirty="0" err="1">
-                <a:solidFill>
-                  <a:srgbClr val="FFFFFF"/>
-                </a:solidFill>
-                <a:latin typeface="Avenir Light"/>
-                <a:cs typeface="Avenir Light"/>
-              </a:rPr>
-              <a:t>e</a:t>
+              <a:t>5° </a:t>
             </a:r>
             <a:r>
               <a:rPr lang="it-IT" sz="1400" dirty="0" err="1" smtClean="0">
@@ -11782,27 +11622,7 @@
                 <a:latin typeface="Avenir Light"/>
                 <a:cs typeface="Avenir Light"/>
               </a:rPr>
-              <a:t>lement</a:t>
-            </a:r>
-            <a:r>
-              <a:rPr lang="it-IT" sz="1400" dirty="0" smtClean="0">
-                <a:solidFill>
-                  <a:srgbClr val="FFFFFF"/>
-                </a:solidFill>
-                <a:latin typeface="Avenir Light"/>
-                <a:cs typeface="Avenir Light"/>
-              </a:rPr>
-              <a:t> </a:t>
-            </a:r>
-            <a:r>
-              <a:rPr lang="it-IT" sz="1400" dirty="0" err="1" smtClean="0">
-                <a:solidFill>
-                  <a:srgbClr val="FFFFFF"/>
-                </a:solidFill>
-                <a:latin typeface="Avenir Light"/>
-                <a:cs typeface="Avenir Light"/>
-              </a:rPr>
-              <a:t>indicator</a:t>
+              <a:t>Element</a:t>
             </a:r>
             <a:endParaRPr lang="it-IT" sz="1400" dirty="0">
               <a:solidFill>
@@ -11822,8 +11642,8 @@
         </p:nvSpPr>
         <p:spPr>
           <a:xfrm>
-            <a:off x="6638811" y="2030218"/>
-            <a:ext cx="1330600" cy="369332"/>
+            <a:off x="769717" y="1004858"/>
+            <a:ext cx="7639444" cy="1384995"/>
           </a:xfrm>
           <a:prstGeom prst="rect">
             <a:avLst/>
@@ -11831,31 +11651,294 @@
           <a:noFill/>
         </p:spPr>
         <p:txBody>
-          <a:bodyPr wrap="none" rtlCol="0">
+          <a:bodyPr wrap="square" rtlCol="0">
             <a:spAutoFit/>
           </a:bodyPr>
           <a:lstStyle/>
           <a:p>
-            <a:r>
-              <a:rPr lang="it-IT" dirty="0" smtClean="0">
+            <a:pPr algn="ctr"/>
+            <a:r>
+              <a:rPr lang="it-IT" sz="2000" dirty="0" smtClean="0">
                 <a:solidFill>
                   <a:schemeClr val="bg1"/>
                 </a:solidFill>
+                <a:latin typeface="Avenir Light"/>
+                <a:cs typeface="Avenir Light"/>
               </a:rPr>
               <a:t>3 </a:t>
             </a:r>
             <a:r>
-              <a:rPr lang="it-IT" dirty="0" err="1" smtClean="0">
+              <a:rPr lang="it-IT" sz="2000" dirty="0" err="1" smtClean="0">
                 <a:solidFill>
                   <a:schemeClr val="bg1"/>
                 </a:solidFill>
+                <a:latin typeface="Avenir Light"/>
+                <a:cs typeface="Avenir Light"/>
               </a:rPr>
               <a:t>conditions</a:t>
             </a:r>
-            <a:endParaRPr lang="it-IT" dirty="0">
+            <a:r>
+              <a:rPr lang="it-IT" sz="2000" dirty="0" smtClean="0">
+                <a:solidFill>
+                  <a:schemeClr val="bg1"/>
+                </a:solidFill>
+                <a:latin typeface="Avenir Light"/>
+                <a:cs typeface="Avenir Light"/>
+              </a:rPr>
+              <a:t> to be </a:t>
+            </a:r>
+            <a:r>
+              <a:rPr lang="it-IT" sz="2000" dirty="0" err="1" smtClean="0">
+                <a:solidFill>
+                  <a:schemeClr val="bg1"/>
+                </a:solidFill>
+                <a:latin typeface="Avenir Light"/>
+                <a:cs typeface="Avenir Light"/>
+              </a:rPr>
+              <a:t>verified</a:t>
+            </a:r>
+            <a:r>
+              <a:rPr lang="it-IT" sz="2000" dirty="0">
+                <a:solidFill>
+                  <a:schemeClr val="bg1"/>
+                </a:solidFill>
+                <a:latin typeface="Avenir Light"/>
+                <a:cs typeface="Avenir Light"/>
+              </a:rPr>
+              <a:t>:</a:t>
+            </a:r>
+            <a:endParaRPr lang="it-IT" sz="2000" dirty="0" smtClean="0">
               <a:solidFill>
                 <a:schemeClr val="bg1"/>
               </a:solidFill>
+              <a:latin typeface="Avenir Light"/>
+              <a:cs typeface="Avenir Light"/>
+            </a:endParaRPr>
+          </a:p>
+          <a:p>
+            <a:pPr algn="ctr"/>
+            <a:endParaRPr lang="it-IT" sz="1600" dirty="0">
+              <a:solidFill>
+                <a:schemeClr val="bg1"/>
+              </a:solidFill>
+              <a:latin typeface="Avenir Light"/>
+              <a:cs typeface="Avenir Light"/>
+            </a:endParaRPr>
+          </a:p>
+          <a:p>
+            <a:pPr marL="342900" indent="-342900" algn="ctr">
+              <a:buAutoNum type="arabicPeriod"/>
+            </a:pPr>
+            <a:r>
+              <a:rPr lang="it-IT" sz="1600" dirty="0" err="1" smtClean="0">
+                <a:solidFill>
+                  <a:schemeClr val="bg1"/>
+                </a:solidFill>
+                <a:latin typeface="Avenir Light"/>
+                <a:cs typeface="Avenir Light"/>
+              </a:rPr>
+              <a:t>Current</a:t>
+            </a:r>
+            <a:r>
+              <a:rPr lang="it-IT" sz="1600" dirty="0" smtClean="0">
+                <a:solidFill>
+                  <a:schemeClr val="bg1"/>
+                </a:solidFill>
+                <a:latin typeface="Avenir Light"/>
+                <a:cs typeface="Avenir Light"/>
+              </a:rPr>
+              <a:t> Price </a:t>
+            </a:r>
+            <a:r>
+              <a:rPr lang="it-IT" sz="1600" dirty="0" err="1" smtClean="0">
+                <a:solidFill>
+                  <a:schemeClr val="bg1"/>
+                </a:solidFill>
+                <a:latin typeface="Avenir Light"/>
+                <a:cs typeface="Avenir Light"/>
+              </a:rPr>
+              <a:t>outside</a:t>
+            </a:r>
+            <a:r>
+              <a:rPr lang="it-IT" sz="1600" dirty="0" smtClean="0">
+                <a:solidFill>
+                  <a:schemeClr val="bg1"/>
+                </a:solidFill>
+                <a:latin typeface="Avenir Light"/>
+                <a:cs typeface="Avenir Light"/>
+              </a:rPr>
+              <a:t> the </a:t>
+            </a:r>
+            <a:r>
+              <a:rPr lang="it-IT" sz="1600" dirty="0" err="1">
+                <a:solidFill>
+                  <a:schemeClr val="bg1"/>
+                </a:solidFill>
+                <a:latin typeface="Avenir Light"/>
+                <a:cs typeface="Avenir Light"/>
+              </a:rPr>
+              <a:t>P</a:t>
+            </a:r>
+            <a:r>
+              <a:rPr lang="it-IT" sz="1600" dirty="0" err="1" smtClean="0">
+                <a:solidFill>
+                  <a:schemeClr val="bg1"/>
+                </a:solidFill>
+                <a:latin typeface="Avenir Light"/>
+                <a:cs typeface="Avenir Light"/>
+              </a:rPr>
+              <a:t>redicted</a:t>
+            </a:r>
+            <a:r>
+              <a:rPr lang="it-IT" sz="1600" dirty="0" smtClean="0">
+                <a:solidFill>
+                  <a:schemeClr val="bg1"/>
+                </a:solidFill>
+                <a:latin typeface="Avenir Light"/>
+                <a:cs typeface="Avenir Light"/>
+              </a:rPr>
+              <a:t> Price </a:t>
+            </a:r>
+            <a:r>
+              <a:rPr lang="it-IT" sz="1600" dirty="0" err="1" smtClean="0">
+                <a:solidFill>
+                  <a:schemeClr val="bg1"/>
+                </a:solidFill>
+                <a:latin typeface="Avenir Light"/>
+                <a:cs typeface="Avenir Light"/>
+              </a:rPr>
+              <a:t>Range</a:t>
+            </a:r>
+            <a:endParaRPr lang="it-IT" sz="1600" dirty="0" smtClean="0">
+              <a:solidFill>
+                <a:schemeClr val="bg1"/>
+              </a:solidFill>
+              <a:latin typeface="Avenir Light"/>
+              <a:cs typeface="Avenir Light"/>
+            </a:endParaRPr>
+          </a:p>
+          <a:p>
+            <a:pPr marL="342900" indent="-342900" algn="ctr">
+              <a:buAutoNum type="arabicPeriod"/>
+            </a:pPr>
+            <a:r>
+              <a:rPr lang="it-IT" sz="1600" dirty="0" smtClean="0">
+                <a:solidFill>
+                  <a:schemeClr val="bg1"/>
+                </a:solidFill>
+                <a:latin typeface="Avenir Light"/>
+                <a:cs typeface="Avenir Light"/>
+              </a:rPr>
+              <a:t>5th </a:t>
+            </a:r>
+            <a:r>
+              <a:rPr lang="it-IT" sz="1600" dirty="0" err="1" smtClean="0">
+                <a:solidFill>
+                  <a:schemeClr val="bg1"/>
+                </a:solidFill>
+                <a:latin typeface="Avenir Light"/>
+                <a:cs typeface="Avenir Light"/>
+              </a:rPr>
+              <a:t>Element</a:t>
+            </a:r>
+            <a:r>
+              <a:rPr lang="it-IT" sz="1600" dirty="0" smtClean="0">
+                <a:solidFill>
+                  <a:schemeClr val="bg1"/>
+                </a:solidFill>
+                <a:latin typeface="Avenir Light"/>
+                <a:cs typeface="Avenir Light"/>
+              </a:rPr>
+              <a:t> </a:t>
+            </a:r>
+            <a:r>
+              <a:rPr lang="it-IT" sz="1600" dirty="0" err="1" smtClean="0">
+                <a:solidFill>
+                  <a:schemeClr val="bg1"/>
+                </a:solidFill>
+                <a:latin typeface="Avenir Light"/>
+                <a:cs typeface="Avenir Light"/>
+              </a:rPr>
+              <a:t>pointing</a:t>
+            </a:r>
+            <a:r>
+              <a:rPr lang="it-IT" sz="1600" dirty="0" smtClean="0">
+                <a:solidFill>
+                  <a:schemeClr val="bg1"/>
+                </a:solidFill>
+                <a:latin typeface="Avenir Light"/>
+                <a:cs typeface="Avenir Light"/>
+              </a:rPr>
+              <a:t> to the Price </a:t>
+            </a:r>
+            <a:r>
+              <a:rPr lang="it-IT" sz="1600" dirty="0" err="1">
+                <a:solidFill>
+                  <a:schemeClr val="bg1"/>
+                </a:solidFill>
+                <a:latin typeface="Avenir Light"/>
+                <a:cs typeface="Avenir Light"/>
+              </a:rPr>
+              <a:t>R</a:t>
+            </a:r>
+            <a:r>
+              <a:rPr lang="it-IT" sz="1600" dirty="0" err="1" smtClean="0">
+                <a:solidFill>
+                  <a:schemeClr val="bg1"/>
+                </a:solidFill>
+                <a:latin typeface="Avenir Light"/>
+                <a:cs typeface="Avenir Light"/>
+              </a:rPr>
+              <a:t>ange</a:t>
+            </a:r>
+            <a:endParaRPr lang="it-IT" sz="1600" dirty="0" smtClean="0">
+              <a:solidFill>
+                <a:schemeClr val="bg1"/>
+              </a:solidFill>
+              <a:latin typeface="Avenir Light"/>
+              <a:cs typeface="Avenir Light"/>
+            </a:endParaRPr>
+          </a:p>
+          <a:p>
+            <a:pPr marL="342900" indent="-342900" algn="ctr">
+              <a:buAutoNum type="arabicPeriod"/>
+            </a:pPr>
+            <a:r>
+              <a:rPr lang="it-IT" sz="1600" dirty="0" smtClean="0">
+                <a:solidFill>
+                  <a:schemeClr val="bg1"/>
+                </a:solidFill>
+                <a:latin typeface="Avenir Light"/>
+                <a:cs typeface="Avenir Light"/>
+              </a:rPr>
+              <a:t>5th </a:t>
+            </a:r>
+            <a:r>
+              <a:rPr lang="it-IT" sz="1600" dirty="0" err="1" smtClean="0">
+                <a:solidFill>
+                  <a:schemeClr val="bg1"/>
+                </a:solidFill>
+                <a:latin typeface="Avenir Light"/>
+                <a:cs typeface="Avenir Light"/>
+              </a:rPr>
+              <a:t>Element</a:t>
+            </a:r>
+            <a:r>
+              <a:rPr lang="it-IT" sz="1600" dirty="0" smtClean="0">
+                <a:solidFill>
+                  <a:schemeClr val="bg1"/>
+                </a:solidFill>
+                <a:latin typeface="Avenir Light"/>
+                <a:cs typeface="Avenir Light"/>
+              </a:rPr>
+              <a:t> Value &gt; 1%</a:t>
+            </a:r>
+            <a:endParaRPr lang="it-IT" sz="1600" dirty="0">
+              <a:solidFill>
+                <a:schemeClr val="bg1"/>
+              </a:solidFill>
+              <a:latin typeface="Avenir Light"/>
+              <a:cs typeface="Avenir Light"/>
             </a:endParaRPr>
           </a:p>
         </p:txBody>
@@ -11968,7 +12051,7 @@
         </p:nvSpPr>
         <p:spPr>
           <a:xfrm>
-            <a:off x="327130" y="384874"/>
+            <a:off x="327130" y="186966"/>
             <a:ext cx="8495754" cy="2915433"/>
           </a:xfrm>
           <a:prstGeom prst="rect">
@@ -12164,7 +12247,7 @@
             </a:endParaRPr>
           </a:p>
           <a:p>
-            <a:endParaRPr lang="it-IT" sz="2400" dirty="0" smtClean="0">
+            <a:endParaRPr lang="it-IT" sz="1800" dirty="0" smtClean="0">
               <a:solidFill>
                 <a:srgbClr val="FFFFFF"/>
               </a:solidFill>
@@ -12255,6 +12338,255 @@
             </a:r>
           </a:p>
           <a:p>
+            <a:endParaRPr lang="it-IT" sz="1000" dirty="0" smtClean="0">
+              <a:solidFill>
+                <a:srgbClr val="FFFFFF"/>
+              </a:solidFill>
+              <a:latin typeface="Avenir Light"/>
+              <a:cs typeface="Avenir Light"/>
+            </a:endParaRPr>
+          </a:p>
+          <a:p>
+            <a:r>
+              <a:rPr lang="it-IT" sz="1600" dirty="0" smtClean="0">
+                <a:solidFill>
+                  <a:srgbClr val="FFFFFF"/>
+                </a:solidFill>
+                <a:latin typeface="Avenir Light"/>
+                <a:cs typeface="Avenir Light"/>
+              </a:rPr>
+              <a:t>The </a:t>
+            </a:r>
+            <a:r>
+              <a:rPr lang="it-IT" sz="1600" dirty="0" err="1" smtClean="0">
+                <a:solidFill>
+                  <a:srgbClr val="FFFFFF"/>
+                </a:solidFill>
+                <a:latin typeface="Avenir Light"/>
+                <a:cs typeface="Avenir Light"/>
+              </a:rPr>
+              <a:t>perfect</a:t>
+            </a:r>
+            <a:r>
+              <a:rPr lang="it-IT" sz="1600" dirty="0" smtClean="0">
+                <a:solidFill>
+                  <a:srgbClr val="FFFFFF"/>
+                </a:solidFill>
+                <a:latin typeface="Avenir Light"/>
+                <a:cs typeface="Avenir Light"/>
+              </a:rPr>
+              <a:t> scenario </a:t>
+            </a:r>
+            <a:r>
+              <a:rPr lang="it-IT" sz="1600" dirty="0" err="1" smtClean="0">
+                <a:solidFill>
+                  <a:srgbClr val="FFFFFF"/>
+                </a:solidFill>
+                <a:latin typeface="Avenir Light"/>
+                <a:cs typeface="Avenir Light"/>
+              </a:rPr>
+              <a:t>occurred</a:t>
+            </a:r>
+            <a:r>
+              <a:rPr lang="it-IT" sz="1600" dirty="0" smtClean="0">
+                <a:solidFill>
+                  <a:srgbClr val="FFFFFF"/>
+                </a:solidFill>
+                <a:latin typeface="Avenir Light"/>
+                <a:cs typeface="Avenir Light"/>
+              </a:rPr>
+              <a:t> in </a:t>
+            </a:r>
+            <a:r>
+              <a:rPr lang="it-IT" sz="1600" dirty="0" err="1" smtClean="0">
+                <a:solidFill>
+                  <a:srgbClr val="FFFFFF"/>
+                </a:solidFill>
+                <a:latin typeface="Avenir Light"/>
+                <a:cs typeface="Avenir Light"/>
+              </a:rPr>
+              <a:t>about</a:t>
+            </a:r>
+            <a:r>
+              <a:rPr lang="it-IT" sz="1600" dirty="0" smtClean="0">
+                <a:solidFill>
+                  <a:srgbClr val="FFFFFF"/>
+                </a:solidFill>
+                <a:latin typeface="Avenir Light"/>
+                <a:cs typeface="Avenir Light"/>
+              </a:rPr>
+              <a:t> 52% of the </a:t>
+            </a:r>
+            <a:r>
+              <a:rPr lang="it-IT" sz="1600" dirty="0" err="1" smtClean="0">
+                <a:solidFill>
+                  <a:srgbClr val="FFFFFF"/>
+                </a:solidFill>
+                <a:latin typeface="Avenir Light"/>
+                <a:cs typeface="Avenir Light"/>
+              </a:rPr>
+              <a:t>analyzed</a:t>
+            </a:r>
+            <a:r>
+              <a:rPr lang="it-IT" sz="1600" dirty="0" smtClean="0">
+                <a:solidFill>
+                  <a:srgbClr val="FFFFFF"/>
+                </a:solidFill>
+                <a:latin typeface="Avenir Light"/>
+                <a:cs typeface="Avenir Light"/>
+              </a:rPr>
+              <a:t> </a:t>
+            </a:r>
+            <a:r>
+              <a:rPr lang="it-IT" sz="1600" dirty="0" err="1" smtClean="0">
+                <a:solidFill>
+                  <a:srgbClr val="FFFFFF"/>
+                </a:solidFill>
+                <a:latin typeface="Avenir Light"/>
+                <a:cs typeface="Avenir Light"/>
+              </a:rPr>
+              <a:t>samples</a:t>
+            </a:r>
+            <a:r>
+              <a:rPr lang="it-IT" sz="1600" dirty="0" smtClean="0">
+                <a:solidFill>
+                  <a:srgbClr val="FFFFFF"/>
+                </a:solidFill>
+                <a:latin typeface="Avenir Light"/>
+                <a:cs typeface="Avenir Light"/>
+              </a:rPr>
+              <a:t>, </a:t>
+            </a:r>
+            <a:r>
+              <a:rPr lang="it-IT" sz="1600" dirty="0" err="1" smtClean="0">
+                <a:solidFill>
+                  <a:srgbClr val="FFFFFF"/>
+                </a:solidFill>
+                <a:latin typeface="Avenir Light"/>
+                <a:cs typeface="Avenir Light"/>
+              </a:rPr>
+              <a:t>but</a:t>
+            </a:r>
+            <a:r>
+              <a:rPr lang="it-IT" sz="1600" dirty="0" smtClean="0">
+                <a:solidFill>
+                  <a:srgbClr val="FFFFFF"/>
+                </a:solidFill>
+                <a:latin typeface="Avenir Light"/>
+                <a:cs typeface="Avenir Light"/>
+              </a:rPr>
+              <a:t> </a:t>
+            </a:r>
+            <a:r>
+              <a:rPr lang="it-IT" sz="1600" dirty="0" err="1" smtClean="0">
+                <a:solidFill>
+                  <a:srgbClr val="FFFFFF"/>
+                </a:solidFill>
+                <a:latin typeface="Avenir Light"/>
+                <a:cs typeface="Avenir Light"/>
+              </a:rPr>
+              <a:t>indications</a:t>
+            </a:r>
+            <a:r>
+              <a:rPr lang="it-IT" sz="1600" dirty="0" smtClean="0">
+                <a:solidFill>
+                  <a:srgbClr val="FFFFFF"/>
+                </a:solidFill>
+                <a:latin typeface="Avenir Light"/>
+                <a:cs typeface="Avenir Light"/>
+              </a:rPr>
+              <a:t> from the model can be </a:t>
+            </a:r>
+            <a:r>
+              <a:rPr lang="it-IT" sz="1600" dirty="0" err="1" smtClean="0">
+                <a:solidFill>
+                  <a:srgbClr val="FFFFFF"/>
+                </a:solidFill>
+                <a:latin typeface="Avenir Light"/>
+                <a:cs typeface="Avenir Light"/>
+              </a:rPr>
+              <a:t>useful</a:t>
+            </a:r>
+            <a:r>
+              <a:rPr lang="it-IT" sz="1600" dirty="0" smtClean="0">
+                <a:solidFill>
+                  <a:srgbClr val="FFFFFF"/>
+                </a:solidFill>
+                <a:latin typeface="Avenir Light"/>
+                <a:cs typeface="Avenir Light"/>
+              </a:rPr>
+              <a:t> </a:t>
+            </a:r>
+            <a:r>
+              <a:rPr lang="it-IT" sz="1600" dirty="0" err="1" smtClean="0">
+                <a:solidFill>
+                  <a:srgbClr val="FFFFFF"/>
+                </a:solidFill>
+                <a:latin typeface="Avenir Light"/>
+                <a:cs typeface="Avenir Light"/>
+              </a:rPr>
+              <a:t>even</a:t>
+            </a:r>
+            <a:r>
+              <a:rPr lang="it-IT" sz="1600" dirty="0" smtClean="0">
+                <a:solidFill>
+                  <a:srgbClr val="FFFFFF"/>
+                </a:solidFill>
+                <a:latin typeface="Avenir Light"/>
+                <a:cs typeface="Avenir Light"/>
+              </a:rPr>
+              <a:t> in </a:t>
+            </a:r>
+            <a:r>
+              <a:rPr lang="it-IT" sz="1600" dirty="0" err="1" smtClean="0">
+                <a:solidFill>
+                  <a:srgbClr val="FFFFFF"/>
+                </a:solidFill>
+                <a:latin typeface="Avenir Light"/>
+                <a:cs typeface="Avenir Light"/>
+              </a:rPr>
+              <a:t>not</a:t>
+            </a:r>
+            <a:r>
+              <a:rPr lang="it-IT" sz="1600" dirty="0" smtClean="0">
+                <a:solidFill>
+                  <a:srgbClr val="FFFFFF"/>
+                </a:solidFill>
+                <a:latin typeface="Avenir Light"/>
+                <a:cs typeface="Avenir Light"/>
+              </a:rPr>
+              <a:t> </a:t>
+            </a:r>
+            <a:r>
+              <a:rPr lang="it-IT" sz="1600" dirty="0" err="1" smtClean="0">
+                <a:solidFill>
+                  <a:srgbClr val="FFFFFF"/>
+                </a:solidFill>
+                <a:latin typeface="Avenir Light"/>
+                <a:cs typeface="Avenir Light"/>
+              </a:rPr>
+              <a:t>perfect</a:t>
+            </a:r>
+            <a:r>
+              <a:rPr lang="it-IT" sz="1600" dirty="0" smtClean="0">
+                <a:solidFill>
+                  <a:srgbClr val="FFFFFF"/>
+                </a:solidFill>
+                <a:latin typeface="Avenir Light"/>
+                <a:cs typeface="Avenir Light"/>
+              </a:rPr>
+              <a:t> </a:t>
+            </a:r>
+            <a:r>
+              <a:rPr lang="it-IT" sz="1600" dirty="0" err="1" smtClean="0">
+                <a:solidFill>
+                  <a:srgbClr val="FFFFFF"/>
+                </a:solidFill>
+                <a:latin typeface="Avenir Light"/>
+                <a:cs typeface="Avenir Light"/>
+              </a:rPr>
+              <a:t>scenarios</a:t>
+            </a:r>
             <a:endParaRPr lang="it-IT" sz="1600" dirty="0" smtClean="0">
               <a:solidFill>
                 <a:srgbClr val="FFFFFF"/>
@@ -12264,6 +12596,15 @@
             </a:endParaRPr>
           </a:p>
           <a:p>
+            <a:endParaRPr lang="it-IT" sz="1000" dirty="0">
+              <a:solidFill>
+                <a:srgbClr val="FFFFFF"/>
+              </a:solidFill>
+              <a:latin typeface="Avenir Light"/>
+              <a:cs typeface="Avenir Light"/>
+            </a:endParaRPr>
+          </a:p>
+          <a:p>
             <a:r>
               <a:rPr lang="it-IT" sz="1600" dirty="0" smtClean="0">
                 <a:solidFill>
@@ -12272,7 +12613,7 @@
                 <a:latin typeface="Avenir Light"/>
                 <a:cs typeface="Avenir Light"/>
               </a:rPr>
-              <a:t>The </a:t>
+              <a:t>A subset of the </a:t>
             </a:r>
             <a:r>
               <a:rPr lang="it-IT" sz="1600" dirty="0" err="1" smtClean="0">
@@ -12282,7 +12623,7 @@
                 <a:latin typeface="Avenir Light"/>
                 <a:cs typeface="Avenir Light"/>
               </a:rPr>
-              <a:t>perfect</a:t>
+              <a:t>indicators</a:t>
             </a:r>
             <a:r>
               <a:rPr lang="it-IT" sz="1600" dirty="0" smtClean="0">
@@ -12292,7 +12633,7 @@
                 <a:latin typeface="Avenir Light"/>
                 <a:cs typeface="Avenir Light"/>
               </a:rPr>
-              <a:t> scenario </a:t>
+              <a:t> </a:t>
             </a:r>
             <a:r>
               <a:rPr lang="it-IT" sz="1600" dirty="0" err="1" smtClean="0">
@@ -12302,7 +12643,7 @@
                 <a:latin typeface="Avenir Light"/>
                 <a:cs typeface="Avenir Light"/>
               </a:rPr>
-              <a:t>occurred</a:t>
+              <a:t>used</a:t>
             </a:r>
             <a:r>
               <a:rPr lang="it-IT" sz="1600" dirty="0" smtClean="0">
@@ -12312,6 +12653,66 @@
                 <a:latin typeface="Avenir Light"/>
                 <a:cs typeface="Avenir Light"/>
               </a:rPr>
+              <a:t> in the model </a:t>
+            </a:r>
+            <a:r>
+              <a:rPr lang="it-IT" sz="1600" dirty="0" err="1" smtClean="0">
+                <a:solidFill>
+                  <a:srgbClr val="FFFFFF"/>
+                </a:solidFill>
+                <a:latin typeface="Avenir Light"/>
+                <a:cs typeface="Avenir Light"/>
+              </a:rPr>
+              <a:t>worked</a:t>
+            </a:r>
+            <a:r>
+              <a:rPr lang="it-IT" sz="1600" dirty="0" smtClean="0">
+                <a:solidFill>
+                  <a:srgbClr val="FFFFFF"/>
+                </a:solidFill>
+                <a:latin typeface="Avenir Light"/>
+                <a:cs typeface="Avenir Light"/>
+              </a:rPr>
+              <a:t> </a:t>
+            </a:r>
+            <a:r>
+              <a:rPr lang="it-IT" sz="1600" dirty="0" err="1" smtClean="0">
+                <a:solidFill>
+                  <a:srgbClr val="FFFFFF"/>
+                </a:solidFill>
+                <a:latin typeface="Avenir Light"/>
+                <a:cs typeface="Avenir Light"/>
+              </a:rPr>
+              <a:t>pretty</a:t>
+            </a:r>
+            <a:r>
+              <a:rPr lang="it-IT" sz="1600" dirty="0" smtClean="0">
+                <a:solidFill>
+                  <a:srgbClr val="FFFFFF"/>
+                </a:solidFill>
+                <a:latin typeface="Avenir Light"/>
+                <a:cs typeface="Avenir Light"/>
+              </a:rPr>
+              <a:t> </a:t>
+            </a:r>
+            <a:r>
+              <a:rPr lang="it-IT" sz="1600" dirty="0" err="1" smtClean="0">
+                <a:solidFill>
+                  <a:srgbClr val="FFFFFF"/>
+                </a:solidFill>
+                <a:latin typeface="Avenir Light"/>
+                <a:cs typeface="Avenir Light"/>
+              </a:rPr>
+              <a:t>well</a:t>
+            </a:r>
+            <a:r>
+              <a:rPr lang="it-IT" sz="1600" dirty="0" smtClean="0">
+                <a:solidFill>
+                  <a:srgbClr val="FFFFFF"/>
+                </a:solidFill>
+                <a:latin typeface="Avenir Light"/>
+                <a:cs typeface="Avenir Light"/>
+              </a:rPr>
               <a:t> in </a:t>
             </a:r>
             <a:r>
@@ -12322,7 +12723,7 @@
                 <a:latin typeface="Avenir Light"/>
                 <a:cs typeface="Avenir Light"/>
               </a:rPr>
-              <a:t>about</a:t>
+              <a:t>real</a:t>
             </a:r>
             <a:r>
               <a:rPr lang="it-IT" sz="1600" dirty="0" smtClean="0">
@@ -12332,17 +12733,7 @@
                 <a:latin typeface="Avenir Light"/>
                 <a:cs typeface="Avenir Light"/>
               </a:rPr>
-              <a:t> 52% of the </a:t>
-            </a:r>
-            <a:r>
-              <a:rPr lang="it-IT" sz="1600" dirty="0" err="1" smtClean="0">
-                <a:solidFill>
-                  <a:srgbClr val="FFFFFF"/>
-                </a:solidFill>
-                <a:latin typeface="Avenir Light"/>
-                <a:cs typeface="Avenir Light"/>
-              </a:rPr>
-              <a:t>analyzed</a:t>
+              <a:t> </a:t>
             </a:r>
             <a:r>
               <a:rPr lang="it-IT" sz="1600" dirty="0" smtClean="0">
@@ -12352,17 +12743,7 @@
                 <a:latin typeface="Avenir Light"/>
                 <a:cs typeface="Avenir Light"/>
               </a:rPr>
-              <a:t> </a:t>
-            </a:r>
-            <a:r>
-              <a:rPr lang="it-IT" sz="1600" dirty="0" err="1" smtClean="0">
-                <a:solidFill>
-                  <a:srgbClr val="FFFFFF"/>
-                </a:solidFill>
-                <a:latin typeface="Avenir Light"/>
-                <a:cs typeface="Avenir Light"/>
-              </a:rPr>
-              <a:t>samples</a:t>
+              <a:t>trading</a:t>
             </a:r>
             <a:r>
               <a:rPr lang="it-IT" sz="1600" dirty="0" smtClean="0">
@@ -12372,137 +12753,7 @@
                 <a:latin typeface="Avenir Light"/>
                 <a:cs typeface="Avenir Light"/>
               </a:rPr>
-              <a:t>, </a:t>
-            </a:r>
-            <a:r>
-              <a:rPr lang="it-IT" sz="1600" dirty="0" err="1" smtClean="0">
-                <a:solidFill>
-                  <a:srgbClr val="FFFFFF"/>
-                </a:solidFill>
-                <a:latin typeface="Avenir Light"/>
-                <a:cs typeface="Avenir Light"/>
-              </a:rPr>
-              <a:t>but</a:t>
-            </a:r>
-            <a:r>
-              <a:rPr lang="it-IT" sz="1600" dirty="0" smtClean="0">
-                <a:solidFill>
-                  <a:srgbClr val="FFFFFF"/>
-                </a:solidFill>
-                <a:latin typeface="Avenir Light"/>
-                <a:cs typeface="Avenir Light"/>
-              </a:rPr>
-              <a:t> </a:t>
-            </a:r>
-            <a:r>
-              <a:rPr lang="it-IT" sz="1600" dirty="0" err="1" smtClean="0">
-                <a:solidFill>
-                  <a:srgbClr val="FFFFFF"/>
-                </a:solidFill>
-                <a:latin typeface="Avenir Light"/>
-                <a:cs typeface="Avenir Light"/>
-              </a:rPr>
-              <a:t>indications</a:t>
-            </a:r>
-            <a:r>
-              <a:rPr lang="it-IT" sz="1600" dirty="0" smtClean="0">
-                <a:solidFill>
-                  <a:srgbClr val="FFFFFF"/>
-                </a:solidFill>
-                <a:latin typeface="Avenir Light"/>
-                <a:cs typeface="Avenir Light"/>
-              </a:rPr>
-              <a:t> from the model can be </a:t>
-            </a:r>
-            <a:r>
-              <a:rPr lang="it-IT" sz="1600" dirty="0" err="1" smtClean="0">
-                <a:solidFill>
-                  <a:srgbClr val="FFFFFF"/>
-                </a:solidFill>
-                <a:latin typeface="Avenir Light"/>
-                <a:cs typeface="Avenir Light"/>
-              </a:rPr>
-              <a:t>useful</a:t>
-            </a:r>
-            <a:r>
-              <a:rPr lang="it-IT" sz="1600" dirty="0" smtClean="0">
-                <a:solidFill>
-                  <a:srgbClr val="FFFFFF"/>
-                </a:solidFill>
-                <a:latin typeface="Avenir Light"/>
-                <a:cs typeface="Avenir Light"/>
-              </a:rPr>
-              <a:t> </a:t>
-            </a:r>
-            <a:r>
-              <a:rPr lang="it-IT" sz="1600" dirty="0" err="1" smtClean="0">
-                <a:solidFill>
-                  <a:srgbClr val="FFFFFF"/>
-                </a:solidFill>
-                <a:latin typeface="Avenir Light"/>
-                <a:cs typeface="Avenir Light"/>
-              </a:rPr>
-              <a:t>even</a:t>
-            </a:r>
-            <a:r>
-              <a:rPr lang="it-IT" sz="1600" dirty="0" smtClean="0">
-                <a:solidFill>
-                  <a:srgbClr val="FFFFFF"/>
-                </a:solidFill>
-                <a:latin typeface="Avenir Light"/>
-                <a:cs typeface="Avenir Light"/>
-              </a:rPr>
-              <a:t> in </a:t>
-            </a:r>
-            <a:r>
-              <a:rPr lang="it-IT" sz="1600" dirty="0" err="1" smtClean="0">
-                <a:solidFill>
-                  <a:srgbClr val="FFFFFF"/>
-                </a:solidFill>
-                <a:latin typeface="Avenir Light"/>
-                <a:cs typeface="Avenir Light"/>
-              </a:rPr>
-              <a:t>not</a:t>
-            </a:r>
-            <a:r>
-              <a:rPr lang="it-IT" sz="1600" dirty="0" smtClean="0">
-                <a:solidFill>
-                  <a:srgbClr val="FFFFFF"/>
-                </a:solidFill>
-                <a:latin typeface="Avenir Light"/>
-                <a:cs typeface="Avenir Light"/>
-              </a:rPr>
-              <a:t> </a:t>
-            </a:r>
-            <a:r>
-              <a:rPr lang="it-IT" sz="1600" dirty="0" err="1" smtClean="0">
-                <a:solidFill>
-                  <a:srgbClr val="FFFFFF"/>
-                </a:solidFill>
-                <a:latin typeface="Avenir Light"/>
-                <a:cs typeface="Avenir Light"/>
-              </a:rPr>
-              <a:t>perfect</a:t>
-            </a:r>
-            <a:r>
-              <a:rPr lang="it-IT" sz="1600" dirty="0" smtClean="0">
-                <a:solidFill>
-                  <a:srgbClr val="FFFFFF"/>
-                </a:solidFill>
-                <a:latin typeface="Avenir Light"/>
-                <a:cs typeface="Avenir Light"/>
-              </a:rPr>
-              <a:t> </a:t>
-            </a:r>
-            <a:r>
-              <a:rPr lang="it-IT" sz="1600" dirty="0" err="1" smtClean="0">
-                <a:solidFill>
-                  <a:srgbClr val="FFFFFF"/>
-                </a:solidFill>
-                <a:latin typeface="Avenir Light"/>
-                <a:cs typeface="Avenir Light"/>
-              </a:rPr>
-              <a:t>scenarios</a:t>
+              <a:t>:</a:t>
             </a:r>
             <a:endParaRPr lang="it-IT" sz="1600" dirty="0" smtClean="0">
               <a:solidFill>
@@ -12512,244 +12763,11 @@
               <a:cs typeface="Avenir Light"/>
             </a:endParaRPr>
           </a:p>
-          <a:p>
-            <a:endParaRPr lang="it-IT" sz="1600" dirty="0">
-              <a:solidFill>
-                <a:srgbClr val="FFFFFF"/>
-              </a:solidFill>
-              <a:latin typeface="Avenir Light"/>
-              <a:cs typeface="Avenir Light"/>
-            </a:endParaRPr>
-          </a:p>
-          <a:p>
-            <a:r>
-              <a:rPr lang="it-IT" sz="1600" dirty="0" smtClean="0">
-                <a:solidFill>
-                  <a:srgbClr val="FFFFFF"/>
-                </a:solidFill>
-                <a:latin typeface="Avenir Light"/>
-                <a:cs typeface="Avenir Light"/>
-              </a:rPr>
-              <a:t>A subset of the </a:t>
-            </a:r>
-            <a:r>
-              <a:rPr lang="it-IT" sz="1600" dirty="0" err="1" smtClean="0">
-                <a:solidFill>
-                  <a:srgbClr val="FFFFFF"/>
-                </a:solidFill>
-                <a:latin typeface="Avenir Light"/>
-                <a:cs typeface="Avenir Light"/>
-              </a:rPr>
-              <a:t>indicators</a:t>
-            </a:r>
-            <a:r>
-              <a:rPr lang="it-IT" sz="1600" dirty="0" smtClean="0">
-                <a:solidFill>
-                  <a:srgbClr val="FFFFFF"/>
-                </a:solidFill>
-                <a:latin typeface="Avenir Light"/>
-                <a:cs typeface="Avenir Light"/>
-              </a:rPr>
-              <a:t> </a:t>
-            </a:r>
-            <a:r>
-              <a:rPr lang="it-IT" sz="1600" dirty="0" err="1" smtClean="0">
-                <a:solidFill>
-                  <a:srgbClr val="FFFFFF"/>
-                </a:solidFill>
-                <a:latin typeface="Avenir Light"/>
-                <a:cs typeface="Avenir Light"/>
-              </a:rPr>
-              <a:t>used</a:t>
-            </a:r>
-            <a:r>
-              <a:rPr lang="it-IT" sz="1600" dirty="0" smtClean="0">
-                <a:solidFill>
-                  <a:srgbClr val="FFFFFF"/>
-                </a:solidFill>
-                <a:latin typeface="Avenir Light"/>
-                <a:cs typeface="Avenir Light"/>
-              </a:rPr>
-              <a:t> in the model </a:t>
-            </a:r>
-            <a:r>
-              <a:rPr lang="it-IT" sz="1600" dirty="0" err="1" smtClean="0">
-                <a:solidFill>
-                  <a:srgbClr val="FFFFFF"/>
-                </a:solidFill>
-                <a:latin typeface="Avenir Light"/>
-                <a:cs typeface="Avenir Light"/>
-              </a:rPr>
-              <a:t>worked</a:t>
-            </a:r>
-            <a:r>
-              <a:rPr lang="it-IT" sz="1600" dirty="0" smtClean="0">
-                <a:solidFill>
-                  <a:srgbClr val="FFFFFF"/>
-                </a:solidFill>
-                <a:latin typeface="Avenir Light"/>
-                <a:cs typeface="Avenir Light"/>
-              </a:rPr>
-              <a:t> </a:t>
-            </a:r>
-            <a:r>
-              <a:rPr lang="it-IT" sz="1600" dirty="0" err="1" smtClean="0">
-                <a:solidFill>
-                  <a:srgbClr val="FFFFFF"/>
-                </a:solidFill>
-                <a:latin typeface="Avenir Light"/>
-                <a:cs typeface="Avenir Light"/>
-              </a:rPr>
-              <a:t>pretty</a:t>
-            </a:r>
-            <a:r>
-              <a:rPr lang="it-IT" sz="1600" dirty="0" smtClean="0">
-                <a:solidFill>
-                  <a:srgbClr val="FFFFFF"/>
-                </a:solidFill>
-                <a:latin typeface="Avenir Light"/>
-                <a:cs typeface="Avenir Light"/>
-              </a:rPr>
-              <a:t> </a:t>
-            </a:r>
-            <a:r>
-              <a:rPr lang="it-IT" sz="1600" dirty="0" err="1" smtClean="0">
-                <a:solidFill>
-                  <a:srgbClr val="FFFFFF"/>
-                </a:solidFill>
-                <a:latin typeface="Avenir Light"/>
-                <a:cs typeface="Avenir Light"/>
-              </a:rPr>
-              <a:t>well</a:t>
-            </a:r>
-            <a:r>
-              <a:rPr lang="it-IT" sz="1600" dirty="0" smtClean="0">
-                <a:solidFill>
-                  <a:srgbClr val="FFFFFF"/>
-                </a:solidFill>
-                <a:latin typeface="Avenir Light"/>
-                <a:cs typeface="Avenir Light"/>
-              </a:rPr>
-              <a:t> in long-</a:t>
-            </a:r>
-            <a:r>
-              <a:rPr lang="it-IT" sz="1600" dirty="0" err="1" smtClean="0">
-                <a:solidFill>
-                  <a:srgbClr val="FFFFFF"/>
-                </a:solidFill>
-                <a:latin typeface="Avenir Light"/>
-                <a:cs typeface="Avenir Light"/>
-              </a:rPr>
-              <a:t>only</a:t>
-            </a:r>
-            <a:r>
-              <a:rPr lang="it-IT" sz="1600" dirty="0" smtClean="0">
-                <a:solidFill>
-                  <a:srgbClr val="FFFFFF"/>
-                </a:solidFill>
-                <a:latin typeface="Avenir Light"/>
-                <a:cs typeface="Avenir Light"/>
-              </a:rPr>
-              <a:t> stock trading:</a:t>
-            </a:r>
-          </a:p>
-          <a:p>
-            <a:r>
-              <a:rPr lang="it-IT" sz="1600" dirty="0" err="1" smtClean="0">
-                <a:solidFill>
-                  <a:srgbClr val="FFFFFF"/>
-                </a:solidFill>
-                <a:latin typeface="Avenir Light"/>
-                <a:cs typeface="Avenir Light"/>
-              </a:rPr>
-              <a:t>Actual</a:t>
-            </a:r>
-            <a:r>
-              <a:rPr lang="it-IT" sz="1600" dirty="0" smtClean="0">
-                <a:solidFill>
-                  <a:srgbClr val="FFFFFF"/>
-                </a:solidFill>
-                <a:latin typeface="Avenir Light"/>
-                <a:cs typeface="Avenir Light"/>
-              </a:rPr>
-              <a:t> </a:t>
-            </a:r>
-            <a:r>
-              <a:rPr lang="it-IT" sz="1600" dirty="0" err="1" smtClean="0">
-                <a:solidFill>
-                  <a:srgbClr val="FFFFFF"/>
-                </a:solidFill>
-                <a:latin typeface="Avenir Light"/>
-                <a:cs typeface="Avenir Light"/>
-              </a:rPr>
-              <a:t>trades</a:t>
-            </a:r>
-            <a:r>
-              <a:rPr lang="it-IT" sz="1600" dirty="0" smtClean="0">
-                <a:solidFill>
-                  <a:srgbClr val="FFFFFF"/>
-                </a:solidFill>
-                <a:latin typeface="Avenir Light"/>
-                <a:cs typeface="Avenir Light"/>
-              </a:rPr>
-              <a:t>, </a:t>
-            </a:r>
-            <a:r>
-              <a:rPr lang="it-IT" sz="1600" dirty="0" err="1" smtClean="0">
-                <a:solidFill>
-                  <a:srgbClr val="FFFFFF"/>
-                </a:solidFill>
-                <a:latin typeface="Avenir Light"/>
-                <a:cs typeface="Avenir Light"/>
-              </a:rPr>
-              <a:t>not</a:t>
-            </a:r>
-            <a:r>
-              <a:rPr lang="it-IT" sz="1600" dirty="0" smtClean="0">
-                <a:solidFill>
-                  <a:srgbClr val="FFFFFF"/>
-                </a:solidFill>
-                <a:latin typeface="Avenir Light"/>
-                <a:cs typeface="Avenir Light"/>
-              </a:rPr>
-              <a:t> </a:t>
-            </a:r>
-            <a:r>
-              <a:rPr lang="it-IT" sz="1600" dirty="0" err="1" smtClean="0">
-                <a:solidFill>
-                  <a:srgbClr val="FFFFFF"/>
-                </a:solidFill>
-                <a:latin typeface="Avenir Light"/>
-                <a:cs typeface="Avenir Light"/>
-              </a:rPr>
-              <a:t>backtesting</a:t>
-            </a:r>
-            <a:r>
-              <a:rPr lang="it-IT" sz="1600" dirty="0" smtClean="0">
-                <a:solidFill>
-                  <a:srgbClr val="FFFFFF"/>
-                </a:solidFill>
-                <a:latin typeface="Avenir Light"/>
-                <a:cs typeface="Avenir Light"/>
-              </a:rPr>
-              <a:t>:</a:t>
-            </a:r>
-          </a:p>
-          <a:p>
-            <a:pPr algn="just"/>
-            <a:endParaRPr lang="it-IT" sz="1600" dirty="0">
-              <a:solidFill>
-                <a:srgbClr val="FFFFFF"/>
-              </a:solidFill>
-              <a:latin typeface="Avenir Light"/>
-              <a:cs typeface="Avenir Light"/>
-            </a:endParaRPr>
-          </a:p>
         </p:txBody>
       </p:sp>
       <p:pic>
         <p:nvPicPr>
-          <p:cNvPr id="3" name="Immagine 2" descr="track.png"/>
+          <p:cNvPr id="7" name="Immagine 6" descr="track.jpg"/>
           <p:cNvPicPr>
             <a:picLocks noChangeAspect="1"/>
           </p:cNvPicPr>
@@ -12769,8 +12787,8 @@
         </p:blipFill>
         <p:spPr>
           <a:xfrm>
-            <a:off x="2126340" y="3530647"/>
-            <a:ext cx="4704895" cy="2646982"/>
+            <a:off x="2540060" y="2829886"/>
+            <a:ext cx="4145280" cy="3324860"/>
           </a:xfrm>
           <a:prstGeom prst="rect">
             <a:avLst/>
@@ -12781,6 +12799,420 @@
     <p:extLst>
       <p:ext uri="{BB962C8B-B14F-4D97-AF65-F5344CB8AC3E}">
         <p14:creationId xmlns:p14="http://schemas.microsoft.com/office/powerpoint/2010/main" val="268273869"/>
+      </p:ext>
+    </p:extLst>
+  </p:cSld>
+  <p:clrMapOvr>
+    <a:masterClrMapping/>
+  </p:clrMapOvr>
+  <p:timing>
+    <p:tnLst>
+      <p:par>
+        <p:cTn xmlns:p14="http://schemas.microsoft.com/office/powerpoint/2010/main" id="1" dur="indefinite" restart="never" nodeType="tmRoot"/>
+      </p:par>
+    </p:tnLst>
+  </p:timing>
+</p:sld>
+</file>
+
+<file path=ppt/slides/slide9.xml><?xml version="1.0" encoding="utf-8"?>
+<p:sld xmlns:a="http://schemas.openxmlformats.org/drawingml/2006/main" xmlns:r="http://schemas.openxmlformats.org/officeDocument/2006/relationships" xmlns:p="http://schemas.openxmlformats.org/presentationml/2006/main">
+  <p:cSld>
+    <p:spTree>
+      <p:nvGrpSpPr>
+        <p:cNvPr id="1" name=""/>
+        <p:cNvGrpSpPr/>
+        <p:nvPr/>
+      </p:nvGrpSpPr>
+      <p:grpSpPr>
+        <a:xfrm>
+          <a:off x="0" y="0"/>
+          <a:ext cx="0" cy="0"/>
+          <a:chOff x="0" y="0"/>
+          <a:chExt cx="0" cy="0"/>
+        </a:xfrm>
+      </p:grpSpPr>
+      <p:sp>
+        <p:nvSpPr>
+          <p:cNvPr id="4" name="Titolo 1"/>
+          <p:cNvSpPr txBox="1">
+            <a:spLocks/>
+          </p:cNvSpPr>
+          <p:nvPr/>
+        </p:nvSpPr>
+        <p:spPr>
+          <a:xfrm>
+            <a:off x="1765720" y="698681"/>
+            <a:ext cx="5748644" cy="5648047"/>
+          </a:xfrm>
+          <a:prstGeom prst="rect">
+            <a:avLst/>
+          </a:prstGeom>
+        </p:spPr>
+        <p:txBody>
+          <a:bodyPr vert="horz" lIns="91440" tIns="45720" rIns="91440" bIns="45720" rtlCol="0" anchor="ctr">
+            <a:normAutofit/>
+          </a:bodyPr>
+          <a:lstStyle>
+            <a:lvl1pPr algn="ctr" defTabSz="457200" rtl="0" eaLnBrk="1" latinLnBrk="0" hangingPunct="1">
+              <a:spcBef>
+                <a:spcPct val="0"/>
+              </a:spcBef>
+              <a:buNone/>
+              <a:defRPr sz="4400" kern="1200">
+                <a:solidFill>
+                  <a:schemeClr val="tx1"/>
+                </a:solidFill>
+                <a:latin typeface="+mj-lt"/>
+                <a:ea typeface="+mj-ea"/>
+                <a:cs typeface="+mj-cs"/>
+              </a:defRPr>
+            </a:lvl1pPr>
+          </a:lstStyle>
+          <a:p>
+            <a:r>
+              <a:rPr lang="it-IT" sz="3200" dirty="0" err="1" smtClean="0">
+                <a:solidFill>
+                  <a:srgbClr val="FFFFFF"/>
+                </a:solidFill>
+                <a:latin typeface="Avenir Light"/>
+                <a:ea typeface="AppleGothic"/>
+                <a:cs typeface="Avenir Light"/>
+              </a:rPr>
+              <a:t>Thank</a:t>
+            </a:r>
+            <a:r>
+              <a:rPr lang="it-IT" sz="3200" dirty="0" smtClean="0">
+                <a:solidFill>
+                  <a:srgbClr val="FFFFFF"/>
+                </a:solidFill>
+                <a:latin typeface="Avenir Light"/>
+                <a:ea typeface="AppleGothic"/>
+                <a:cs typeface="Avenir Light"/>
+              </a:rPr>
+              <a:t> </a:t>
+            </a:r>
+            <a:r>
+              <a:rPr lang="it-IT" sz="3200" dirty="0" err="1" smtClean="0">
+                <a:solidFill>
+                  <a:srgbClr val="FFFFFF"/>
+                </a:solidFill>
+                <a:latin typeface="Avenir Light"/>
+                <a:ea typeface="AppleGothic"/>
+                <a:cs typeface="Avenir Light"/>
+              </a:rPr>
+              <a:t>you</a:t>
+            </a:r>
+            <a:r>
+              <a:rPr lang="it-IT" sz="3200" dirty="0" smtClean="0">
+                <a:solidFill>
+                  <a:srgbClr val="FFFFFF"/>
+                </a:solidFill>
+                <a:latin typeface="Avenir Light"/>
+                <a:ea typeface="AppleGothic"/>
+                <a:cs typeface="Avenir Light"/>
+              </a:rPr>
+              <a:t>!</a:t>
+            </a:r>
+            <a:endParaRPr lang="it-IT" sz="3200" dirty="0" smtClean="0">
+              <a:solidFill>
+                <a:srgbClr val="FFFFFF"/>
+              </a:solidFill>
+              <a:latin typeface="Avenir Light"/>
+              <a:ea typeface="AppleGothic"/>
+              <a:cs typeface="Avenir Light"/>
+            </a:endParaRPr>
+          </a:p>
+          <a:p>
+            <a:endParaRPr lang="it-IT" sz="3200" dirty="0">
+              <a:solidFill>
+                <a:srgbClr val="FFFFFF"/>
+              </a:solidFill>
+              <a:latin typeface="Avenir Light"/>
+              <a:ea typeface="AppleGothic"/>
+              <a:cs typeface="Avenir Light"/>
+            </a:endParaRPr>
+          </a:p>
+          <a:p>
+            <a:endParaRPr lang="it-IT" sz="3200" dirty="0" smtClean="0">
+              <a:solidFill>
+                <a:srgbClr val="FFFFFF"/>
+              </a:solidFill>
+              <a:latin typeface="Avenir Light"/>
+              <a:ea typeface="AppleGothic"/>
+              <a:cs typeface="Avenir Light"/>
+            </a:endParaRPr>
+          </a:p>
+          <a:p>
+            <a:endParaRPr lang="it-IT" sz="2000" dirty="0" smtClean="0">
+              <a:solidFill>
+                <a:srgbClr val="FFFFFF"/>
+              </a:solidFill>
+              <a:latin typeface="Avenir Light"/>
+              <a:ea typeface="AppleGothic"/>
+              <a:cs typeface="Avenir Light"/>
+            </a:endParaRPr>
+          </a:p>
+          <a:p>
+            <a:endParaRPr lang="it-IT" sz="2000" dirty="0" smtClean="0">
+              <a:solidFill>
+                <a:srgbClr val="FFFFFF"/>
+              </a:solidFill>
+              <a:latin typeface="Avenir Light"/>
+              <a:ea typeface="AppleGothic"/>
+              <a:cs typeface="Avenir Light"/>
+            </a:endParaRPr>
+          </a:p>
+          <a:p>
+            <a:endParaRPr lang="it-IT" sz="2000" dirty="0">
+              <a:solidFill>
+                <a:srgbClr val="FFFFFF"/>
+              </a:solidFill>
+              <a:latin typeface="Avenir Light"/>
+              <a:ea typeface="AppleGothic"/>
+              <a:cs typeface="Avenir Light"/>
+            </a:endParaRPr>
+          </a:p>
+          <a:p>
+            <a:endParaRPr lang="it-IT" sz="2000" dirty="0" smtClean="0">
+              <a:solidFill>
+                <a:srgbClr val="FFFFFF"/>
+              </a:solidFill>
+              <a:latin typeface="Avenir Light"/>
+              <a:ea typeface="AppleGothic"/>
+              <a:cs typeface="Avenir Light"/>
+            </a:endParaRPr>
+          </a:p>
+          <a:p>
+            <a:endParaRPr lang="it-IT" sz="2000" dirty="0" smtClean="0">
+              <a:solidFill>
+                <a:srgbClr val="FFFFFF"/>
+              </a:solidFill>
+              <a:latin typeface="Avenir Light"/>
+              <a:ea typeface="AppleGothic"/>
+              <a:cs typeface="Avenir Light"/>
+            </a:endParaRPr>
+          </a:p>
+          <a:p>
+            <a:endParaRPr lang="it-IT" sz="2000" dirty="0" smtClean="0">
+              <a:solidFill>
+                <a:srgbClr val="FFFFFF"/>
+              </a:solidFill>
+              <a:latin typeface="Avenir Light"/>
+              <a:ea typeface="AppleGothic"/>
+              <a:cs typeface="Avenir Light"/>
+            </a:endParaRPr>
+          </a:p>
+          <a:p>
+            <a:endParaRPr lang="it-IT" sz="2000" dirty="0" smtClean="0">
+              <a:solidFill>
+                <a:srgbClr val="FFFFFF"/>
+              </a:solidFill>
+              <a:latin typeface="Avenir Light"/>
+              <a:ea typeface="AppleGothic"/>
+              <a:cs typeface="Avenir Light"/>
+            </a:endParaRPr>
+          </a:p>
+          <a:p>
+            <a:r>
+              <a:rPr lang="it-IT" sz="2400" dirty="0" smtClean="0">
+                <a:solidFill>
+                  <a:srgbClr val="FFFFFF"/>
+                </a:solidFill>
+                <a:latin typeface="Avenir Light"/>
+                <a:ea typeface="AppleGothic"/>
+                <a:cs typeface="Avenir Light"/>
+              </a:rPr>
+              <a:t>Marco Lunardi</a:t>
+            </a:r>
+            <a:endParaRPr lang="it-IT" sz="2400" dirty="0">
+              <a:solidFill>
+                <a:srgbClr val="FFFFFF"/>
+              </a:solidFill>
+              <a:latin typeface="Avenir Light"/>
+              <a:ea typeface="AppleGothic"/>
+              <a:cs typeface="Avenir Light"/>
+            </a:endParaRPr>
+          </a:p>
+          <a:p>
+            <a:endParaRPr lang="it-IT" sz="2000" dirty="0" smtClean="0">
+              <a:solidFill>
+                <a:srgbClr val="FFFFFF"/>
+              </a:solidFill>
+              <a:latin typeface="Avenir Light"/>
+              <a:ea typeface="AppleGothic"/>
+              <a:cs typeface="Avenir Light"/>
+            </a:endParaRPr>
+          </a:p>
+          <a:p>
+            <a:r>
+              <a:rPr lang="it-IT" sz="2000" dirty="0" err="1" smtClean="0">
+                <a:solidFill>
+                  <a:srgbClr val="FFFFFF"/>
+                </a:solidFill>
+                <a:latin typeface="Avenir Light"/>
+                <a:ea typeface="AppleGothic"/>
+                <a:cs typeface="Avenir Light"/>
+              </a:rPr>
+              <a:t>m</a:t>
+            </a:r>
+            <a:r>
+              <a:rPr lang="it-IT" sz="2000" dirty="0" err="1" smtClean="0">
+                <a:solidFill>
+                  <a:srgbClr val="FFFFFF"/>
+                </a:solidFill>
+                <a:latin typeface="Avenir Light"/>
+                <a:ea typeface="AppleGothic"/>
+                <a:cs typeface="Avenir Light"/>
+              </a:rPr>
+              <a:t>arcolunardi.github.io</a:t>
+            </a:r>
+            <a:endParaRPr lang="it-IT" sz="2000" dirty="0" smtClean="0">
+              <a:solidFill>
+                <a:srgbClr val="FFFFFF"/>
+              </a:solidFill>
+              <a:latin typeface="Avenir Light"/>
+              <a:ea typeface="AppleGothic"/>
+              <a:cs typeface="Avenir Light"/>
+            </a:endParaRPr>
+          </a:p>
+          <a:p>
+            <a:endParaRPr lang="it-IT" sz="2000" dirty="0" smtClean="0">
+              <a:solidFill>
+                <a:srgbClr val="FFFFFF"/>
+              </a:solidFill>
+              <a:latin typeface="Avenir Light"/>
+              <a:ea typeface="AppleGothic"/>
+              <a:cs typeface="Avenir Light"/>
+            </a:endParaRPr>
+          </a:p>
+          <a:p>
+            <a:r>
+              <a:rPr lang="it-IT" sz="2000" dirty="0" err="1" smtClean="0">
+                <a:solidFill>
+                  <a:srgbClr val="FFFFFF"/>
+                </a:solidFill>
+                <a:latin typeface="Avenir Light"/>
+                <a:ea typeface="AppleGothic"/>
+                <a:cs typeface="Avenir Light"/>
+              </a:rPr>
+              <a:t>marco@marcolunardi.com</a:t>
+            </a:r>
+            <a:endParaRPr lang="it-IT" sz="2000" dirty="0" smtClean="0">
+              <a:solidFill>
+                <a:srgbClr val="FFFFFF"/>
+              </a:solidFill>
+              <a:latin typeface="Avenir Light"/>
+              <a:ea typeface="AppleGothic"/>
+              <a:cs typeface="Avenir Light"/>
+            </a:endParaRPr>
+          </a:p>
+          <a:p>
+            <a:endParaRPr lang="it-IT" sz="3200" dirty="0" smtClean="0">
+              <a:solidFill>
+                <a:srgbClr val="FFFFFF"/>
+              </a:solidFill>
+              <a:latin typeface="Avenir Light"/>
+              <a:ea typeface="AppleGothic"/>
+              <a:cs typeface="Avenir Light"/>
+            </a:endParaRPr>
+          </a:p>
+        </p:txBody>
+      </p:sp>
+      <p:sp>
+        <p:nvSpPr>
+          <p:cNvPr id="2" name="Segnaposto piè di pagina 1"/>
+          <p:cNvSpPr>
+            <a:spLocks noGrp="1"/>
+          </p:cNvSpPr>
+          <p:nvPr>
+            <p:ph type="ftr" sz="quarter" idx="11"/>
+          </p:nvPr>
+        </p:nvSpPr>
+        <p:spPr/>
+        <p:txBody>
+          <a:bodyPr/>
+          <a:lstStyle/>
+          <a:p>
+            <a:r>
+              <a:rPr lang="it-IT" smtClean="0">
+                <a:solidFill>
+                  <a:srgbClr val="FFFFFF"/>
+                </a:solidFill>
+              </a:rPr>
+              <a:t>Marco Lunardi - Final Project</a:t>
+            </a:r>
+            <a:endParaRPr lang="it-IT" dirty="0">
+              <a:solidFill>
+                <a:srgbClr val="FFFFFF"/>
+              </a:solidFill>
+            </a:endParaRPr>
+          </a:p>
+        </p:txBody>
+      </p:sp>
+      <p:pic>
+        <p:nvPicPr>
+          <p:cNvPr id="5" name="Immagine 4" descr="metislogo.png"/>
+          <p:cNvPicPr>
+            <a:picLocks noChangeAspect="1"/>
+          </p:cNvPicPr>
+          <p:nvPr/>
+        </p:nvPicPr>
+        <p:blipFill>
+          <a:blip r:embed="rId3">
+            <a:extLst>
+              <a:ext uri="{28A0092B-C50C-407E-A947-70E740481C1C}">
+                <a14:useLocalDpi xmlns:a14="http://schemas.microsoft.com/office/drawing/2010/main" val="0"/>
+              </a:ext>
+            </a:extLst>
+          </a:blip>
+          <a:stretch>
+            <a:fillRect/>
+          </a:stretch>
+        </p:blipFill>
+        <p:spPr>
+          <a:xfrm>
+            <a:off x="8511836" y="71505"/>
+            <a:ext cx="561340" cy="904240"/>
+          </a:xfrm>
+          <a:prstGeom prst="rect">
+            <a:avLst/>
+          </a:prstGeom>
+        </p:spPr>
+      </p:pic>
+      <p:pic>
+        <p:nvPicPr>
+          <p:cNvPr id="3" name="Immagine 2" descr="Marco Lunardi Photo 201505.jpg"/>
+          <p:cNvPicPr>
+            <a:picLocks noChangeAspect="1"/>
+          </p:cNvPicPr>
+          <p:nvPr/>
+        </p:nvPicPr>
+        <p:blipFill rotWithShape="1">
+          <a:blip r:embed="rId4">
+            <a:extLst>
+              <a:ext uri="{28A0092B-C50C-407E-A947-70E740481C1C}">
+                <a14:useLocalDpi xmlns:a14="http://schemas.microsoft.com/office/drawing/2010/main" val="0"/>
+              </a:ext>
+            </a:extLst>
+          </a:blip>
+          <a:srcRect l="24553" t="1684" r="13968" b="5393"/>
+          <a:stretch/>
+        </p:blipFill>
+        <p:spPr>
+          <a:xfrm>
+            <a:off x="3694779" y="1858844"/>
+            <a:ext cx="1893600" cy="1908000"/>
+          </a:xfrm>
+          <a:prstGeom prst="rect">
+            <a:avLst/>
+          </a:prstGeom>
+        </p:spPr>
+      </p:pic>
+    </p:spTree>
+    <p:extLst>
+      <p:ext uri="{BB962C8B-B14F-4D97-AF65-F5344CB8AC3E}">
+        <p14:creationId xmlns:p14="http://schemas.microsoft.com/office/powerpoint/2010/main" val="2809961620"/>
       </p:ext>
     </p:extLst>
   </p:cSld>

</xml_diff>